<commit_message>
finishing first draft of slides
</commit_message>
<xml_diff>
--- a/assets/slides/rfc8594.pptx
+++ b/assets/slides/rfc8594.pptx
@@ -6,6 +6,11 @@
   </p:sldMasterIdLst>
   <p:sldIdLst>
     <p:sldId id="256" r:id="rId2"/>
+    <p:sldId id="260" r:id="rId3"/>
+    <p:sldId id="261" r:id="rId4"/>
+    <p:sldId id="257" r:id="rId5"/>
+    <p:sldId id="258" r:id="rId6"/>
+    <p:sldId id="259" r:id="rId7"/>
   </p:sldIdLst>
   <p:sldSz cx="12192000" cy="6858000"/>
   <p:notesSz cx="6858000" cy="9144000"/>
@@ -12371,6 +12376,11 @@
           <a:p>
             <a:r>
               <a:rPr lang="en-US" cap="none" dirty="0">
+                <a:effectLst>
+                  <a:outerShdw blurRad="63500" dist="60484" dir="2700000" sx="100475" sy="100475" algn="tl" rotWithShape="0">
+                    <a:schemeClr val="bg2"/>
+                  </a:outerShdw>
+                </a:effectLst>
                 <a:latin typeface="Ford Antenna Medium Cnd" panose="02000505000000020004" pitchFamily="2" charset="0"/>
               </a:rPr>
               <a:t>The Sunset HTTP Header Field</a:t>
@@ -12407,7 +12417,9 @@
           <a:lstStyle/>
           <a:p>
             <a:r>
-              <a:rPr lang="en-US" sz="3200" cap="none" dirty="0"/>
+              <a:rPr lang="en-US" sz="3200" cap="none" dirty="0">
+                <a:latin typeface="Ford Antenna Medium Cnd" panose="02000505000000020004" pitchFamily="2" charset="0"/>
+              </a:rPr>
               <a:t>Resources and APIs disappear at some point in time; the Sunset field allows to advertise that event to clients.</a:t>
             </a:r>
           </a:p>
@@ -12619,6 +12631,7 @@
                 <a:solidFill>
                   <a:schemeClr val="bg2"/>
                 </a:solidFill>
+                <a:latin typeface="Ford Antenna Medium" panose="02000505000000020004" pitchFamily="2" charset="0"/>
               </a:rPr>
               <a:t>Internet RFC 8594</a:t>
             </a:r>
@@ -12629,6 +12642,902 @@
     <p:extLst>
       <p:ext uri="{BB962C8B-B14F-4D97-AF65-F5344CB8AC3E}">
         <p14:creationId xmlns:p14="http://schemas.microsoft.com/office/powerpoint/2010/main" val="1274364689"/>
+      </p:ext>
+    </p:extLst>
+  </p:cSld>
+  <p:clrMapOvr>
+    <a:masterClrMapping/>
+  </p:clrMapOvr>
+</p:sld>
+</file>
+
+<file path=ppt/slides/slide2.xml><?xml version="1.0" encoding="utf-8"?>
+<p:sld xmlns:a="http://schemas.openxmlformats.org/drawingml/2006/main" xmlns:r="http://schemas.openxmlformats.org/officeDocument/2006/relationships" xmlns:p="http://schemas.openxmlformats.org/presentationml/2006/main">
+  <p:cSld>
+    <p:spTree>
+      <p:nvGrpSpPr>
+        <p:cNvPr id="1" name=""/>
+        <p:cNvGrpSpPr/>
+        <p:nvPr/>
+      </p:nvGrpSpPr>
+      <p:grpSpPr>
+        <a:xfrm>
+          <a:off x="0" y="0"/>
+          <a:ext cx="0" cy="0"/>
+          <a:chOff x="0" y="0"/>
+          <a:chExt cx="0" cy="0"/>
+        </a:xfrm>
+      </p:grpSpPr>
+      <p:sp>
+        <p:nvSpPr>
+          <p:cNvPr id="3" name="Content Placeholder 2">
+            <a:extLst>
+              <a:ext uri="{FF2B5EF4-FFF2-40B4-BE49-F238E27FC236}">
+                <a16:creationId xmlns:a16="http://schemas.microsoft.com/office/drawing/2014/main" id="{17956A75-E2B2-0F45-9348-FCC5353B9806}"/>
+              </a:ext>
+            </a:extLst>
+          </p:cNvPr>
+          <p:cNvSpPr>
+            <a:spLocks noGrp="1"/>
+          </p:cNvSpPr>
+          <p:nvPr>
+            <p:ph idx="1"/>
+          </p:nvPr>
+        </p:nvSpPr>
+        <p:spPr>
+          <a:xfrm>
+            <a:off x="1344613" y="2445807"/>
+            <a:ext cx="9145586" cy="3081868"/>
+          </a:xfrm>
+        </p:spPr>
+        <p:txBody>
+          <a:bodyPr/>
+          <a:lstStyle/>
+          <a:p>
+            <a:pPr marL="0" indent="0">
+              <a:buNone/>
+            </a:pPr>
+            <a:r>
+              <a:rPr lang="en-US" dirty="0">
+                <a:latin typeface="Ford Antenna Medium" panose="02000505000000020004" pitchFamily="2" charset="0"/>
+              </a:rPr>
+              <a:t>When a resource or an API is about to be retired, it would be useful for consumers of that resource/API to be notified in advance. By using an HTTP field, this information can be conveyed in-band, instead of having to rely on out-of-band channels such as announcements that are published on Web pages or sent by email.</a:t>
+            </a:r>
+          </a:p>
+        </p:txBody>
+      </p:sp>
+      <p:sp>
+        <p:nvSpPr>
+          <p:cNvPr id="6" name="Title 1">
+            <a:extLst>
+              <a:ext uri="{FF2B5EF4-FFF2-40B4-BE49-F238E27FC236}">
+                <a16:creationId xmlns:a16="http://schemas.microsoft.com/office/drawing/2014/main" id="{4D0CE8EE-FF7C-AF4D-B6BF-D600E6EA4B66}"/>
+              </a:ext>
+            </a:extLst>
+          </p:cNvPr>
+          <p:cNvSpPr txBox="1">
+            <a:spLocks/>
+          </p:cNvSpPr>
+          <p:nvPr/>
+        </p:nvSpPr>
+        <p:spPr>
+          <a:xfrm>
+            <a:off x="1698623" y="607218"/>
+            <a:ext cx="8791575" cy="919162"/>
+          </a:xfrm>
+          <a:prstGeom prst="rect">
+            <a:avLst/>
+          </a:prstGeom>
+        </p:spPr>
+        <p:txBody>
+          <a:bodyPr vert="horz" lIns="91440" tIns="45720" rIns="91440" bIns="45720" rtlCol="0" anchor="ctr">
+            <a:normAutofit/>
+          </a:bodyPr>
+          <a:lstStyle>
+            <a:lvl1pPr algn="l" defTabSz="914400" rtl="0" eaLnBrk="1" latinLnBrk="0" hangingPunct="1">
+              <a:lnSpc>
+                <a:spcPct val="90000"/>
+              </a:lnSpc>
+              <a:spcBef>
+                <a:spcPct val="0"/>
+              </a:spcBef>
+              <a:buNone/>
+              <a:defRPr sz="3600" kern="1200" cap="all" baseline="0">
+                <a:solidFill>
+                  <a:schemeClr val="tx1"/>
+                </a:solidFill>
+                <a:latin typeface="+mj-lt"/>
+                <a:ea typeface="+mj-ea"/>
+                <a:cs typeface="+mj-cs"/>
+              </a:defRPr>
+            </a:lvl1pPr>
+          </a:lstStyle>
+          <a:p>
+            <a:r>
+              <a:rPr lang="en-US" cap="none" dirty="0">
+                <a:solidFill>
+                  <a:schemeClr val="bg2"/>
+                </a:solidFill>
+                <a:latin typeface="Ford Antenna Medium Cnd" panose="02000505000000020004" pitchFamily="2" charset="0"/>
+              </a:rPr>
+              <a:t>The Sunset HTTP Header Field</a:t>
+            </a:r>
+          </a:p>
+        </p:txBody>
+      </p:sp>
+      <p:sp>
+        <p:nvSpPr>
+          <p:cNvPr id="7" name="Title 1">
+            <a:extLst>
+              <a:ext uri="{FF2B5EF4-FFF2-40B4-BE49-F238E27FC236}">
+                <a16:creationId xmlns:a16="http://schemas.microsoft.com/office/drawing/2014/main" id="{924EB63B-9391-8F4A-A2B2-162C9716D18E}"/>
+              </a:ext>
+            </a:extLst>
+          </p:cNvPr>
+          <p:cNvSpPr txBox="1">
+            <a:spLocks/>
+          </p:cNvSpPr>
+          <p:nvPr/>
+        </p:nvSpPr>
+        <p:spPr>
+          <a:xfrm>
+            <a:off x="1698623" y="1330325"/>
+            <a:ext cx="8791575" cy="919162"/>
+          </a:xfrm>
+          <a:prstGeom prst="rect">
+            <a:avLst/>
+          </a:prstGeom>
+        </p:spPr>
+        <p:txBody>
+          <a:bodyPr vert="horz" lIns="91440" tIns="45720" rIns="91440" bIns="45720" rtlCol="0" anchor="ctr">
+            <a:normAutofit/>
+          </a:bodyPr>
+          <a:lstStyle>
+            <a:lvl1pPr algn="l" defTabSz="914400" rtl="0" eaLnBrk="1" latinLnBrk="0" hangingPunct="1">
+              <a:lnSpc>
+                <a:spcPct val="90000"/>
+              </a:lnSpc>
+              <a:spcBef>
+                <a:spcPct val="0"/>
+              </a:spcBef>
+              <a:buNone/>
+              <a:defRPr sz="3600" kern="1200" cap="all" baseline="0">
+                <a:solidFill>
+                  <a:schemeClr val="tx1"/>
+                </a:solidFill>
+                <a:latin typeface="+mj-lt"/>
+                <a:ea typeface="+mj-ea"/>
+                <a:cs typeface="+mj-cs"/>
+              </a:defRPr>
+            </a:lvl1pPr>
+          </a:lstStyle>
+          <a:p>
+            <a:r>
+              <a:rPr lang="en-US" sz="2800" cap="none" dirty="0">
+                <a:latin typeface="Ford Antenna Medium Cnd" panose="02000505000000020004" pitchFamily="2" charset="0"/>
+              </a:rPr>
+              <a:t>Description</a:t>
+            </a:r>
+          </a:p>
+        </p:txBody>
+      </p:sp>
+    </p:spTree>
+    <p:extLst>
+      <p:ext uri="{BB962C8B-B14F-4D97-AF65-F5344CB8AC3E}">
+        <p14:creationId xmlns:p14="http://schemas.microsoft.com/office/powerpoint/2010/main" val="2069324029"/>
+      </p:ext>
+    </p:extLst>
+  </p:cSld>
+  <p:clrMapOvr>
+    <a:masterClrMapping/>
+  </p:clrMapOvr>
+</p:sld>
+</file>
+
+<file path=ppt/slides/slide3.xml><?xml version="1.0" encoding="utf-8"?>
+<p:sld xmlns:a="http://schemas.openxmlformats.org/drawingml/2006/main" xmlns:r="http://schemas.openxmlformats.org/officeDocument/2006/relationships" xmlns:p="http://schemas.openxmlformats.org/presentationml/2006/main">
+  <p:cSld>
+    <p:spTree>
+      <p:nvGrpSpPr>
+        <p:cNvPr id="1" name=""/>
+        <p:cNvGrpSpPr/>
+        <p:nvPr/>
+      </p:nvGrpSpPr>
+      <p:grpSpPr>
+        <a:xfrm>
+          <a:off x="0" y="0"/>
+          <a:ext cx="0" cy="0"/>
+          <a:chOff x="0" y="0"/>
+          <a:chExt cx="0" cy="0"/>
+        </a:xfrm>
+      </p:grpSpPr>
+      <p:sp>
+        <p:nvSpPr>
+          <p:cNvPr id="3" name="Content Placeholder 2">
+            <a:extLst>
+              <a:ext uri="{FF2B5EF4-FFF2-40B4-BE49-F238E27FC236}">
+                <a16:creationId xmlns:a16="http://schemas.microsoft.com/office/drawing/2014/main" id="{17956A75-E2B2-0F45-9348-FCC5353B9806}"/>
+              </a:ext>
+            </a:extLst>
+          </p:cNvPr>
+          <p:cNvSpPr>
+            <a:spLocks noGrp="1"/>
+          </p:cNvSpPr>
+          <p:nvPr>
+            <p:ph idx="1"/>
+          </p:nvPr>
+        </p:nvSpPr>
+        <p:spPr>
+          <a:xfrm>
+            <a:off x="1344613" y="2445807"/>
+            <a:ext cx="9145586" cy="3081868"/>
+          </a:xfrm>
+        </p:spPr>
+        <p:txBody>
+          <a:bodyPr/>
+          <a:lstStyle/>
+          <a:p>
+            <a:pPr marL="0" indent="0">
+              <a:buNone/>
+            </a:pPr>
+            <a:r>
+              <a:rPr lang="en-US" dirty="0">
+                <a:latin typeface="Ford Antenna Medium" panose="02000505000000020004" pitchFamily="2" charset="0"/>
+              </a:rPr>
+              <a:t>Erik Wilde, “The Sunset HTTP Header Field”, Internet RFC 8594, May 2019</a:t>
+            </a:r>
+          </a:p>
+        </p:txBody>
+      </p:sp>
+      <p:sp>
+        <p:nvSpPr>
+          <p:cNvPr id="6" name="Title 1">
+            <a:extLst>
+              <a:ext uri="{FF2B5EF4-FFF2-40B4-BE49-F238E27FC236}">
+                <a16:creationId xmlns:a16="http://schemas.microsoft.com/office/drawing/2014/main" id="{4D0CE8EE-FF7C-AF4D-B6BF-D600E6EA4B66}"/>
+              </a:ext>
+            </a:extLst>
+          </p:cNvPr>
+          <p:cNvSpPr txBox="1">
+            <a:spLocks/>
+          </p:cNvSpPr>
+          <p:nvPr/>
+        </p:nvSpPr>
+        <p:spPr>
+          <a:xfrm>
+            <a:off x="1698623" y="607218"/>
+            <a:ext cx="8791575" cy="919162"/>
+          </a:xfrm>
+          <a:prstGeom prst="rect">
+            <a:avLst/>
+          </a:prstGeom>
+        </p:spPr>
+        <p:txBody>
+          <a:bodyPr vert="horz" lIns="91440" tIns="45720" rIns="91440" bIns="45720" rtlCol="0" anchor="ctr">
+            <a:normAutofit/>
+          </a:bodyPr>
+          <a:lstStyle>
+            <a:lvl1pPr algn="l" defTabSz="914400" rtl="0" eaLnBrk="1" latinLnBrk="0" hangingPunct="1">
+              <a:lnSpc>
+                <a:spcPct val="90000"/>
+              </a:lnSpc>
+              <a:spcBef>
+                <a:spcPct val="0"/>
+              </a:spcBef>
+              <a:buNone/>
+              <a:defRPr sz="3600" kern="1200" cap="all" baseline="0">
+                <a:solidFill>
+                  <a:schemeClr val="tx1"/>
+                </a:solidFill>
+                <a:latin typeface="+mj-lt"/>
+                <a:ea typeface="+mj-ea"/>
+                <a:cs typeface="+mj-cs"/>
+              </a:defRPr>
+            </a:lvl1pPr>
+          </a:lstStyle>
+          <a:p>
+            <a:r>
+              <a:rPr lang="en-US" cap="none" dirty="0">
+                <a:solidFill>
+                  <a:schemeClr val="bg2"/>
+                </a:solidFill>
+                <a:latin typeface="Ford Antenna Medium Cnd" panose="02000505000000020004" pitchFamily="2" charset="0"/>
+              </a:rPr>
+              <a:t>The Sunset HTTP Header Field</a:t>
+            </a:r>
+          </a:p>
+        </p:txBody>
+      </p:sp>
+      <p:sp>
+        <p:nvSpPr>
+          <p:cNvPr id="7" name="Title 1">
+            <a:extLst>
+              <a:ext uri="{FF2B5EF4-FFF2-40B4-BE49-F238E27FC236}">
+                <a16:creationId xmlns:a16="http://schemas.microsoft.com/office/drawing/2014/main" id="{924EB63B-9391-8F4A-A2B2-162C9716D18E}"/>
+              </a:ext>
+            </a:extLst>
+          </p:cNvPr>
+          <p:cNvSpPr txBox="1">
+            <a:spLocks/>
+          </p:cNvSpPr>
+          <p:nvPr/>
+        </p:nvSpPr>
+        <p:spPr>
+          <a:xfrm>
+            <a:off x="1698623" y="1330325"/>
+            <a:ext cx="8791575" cy="919162"/>
+          </a:xfrm>
+          <a:prstGeom prst="rect">
+            <a:avLst/>
+          </a:prstGeom>
+        </p:spPr>
+        <p:txBody>
+          <a:bodyPr vert="horz" lIns="91440" tIns="45720" rIns="91440" bIns="45720" rtlCol="0" anchor="ctr">
+            <a:normAutofit/>
+          </a:bodyPr>
+          <a:lstStyle>
+            <a:lvl1pPr algn="l" defTabSz="914400" rtl="0" eaLnBrk="1" latinLnBrk="0" hangingPunct="1">
+              <a:lnSpc>
+                <a:spcPct val="90000"/>
+              </a:lnSpc>
+              <a:spcBef>
+                <a:spcPct val="0"/>
+              </a:spcBef>
+              <a:buNone/>
+              <a:defRPr sz="3600" kern="1200" cap="all" baseline="0">
+                <a:solidFill>
+                  <a:schemeClr val="tx1"/>
+                </a:solidFill>
+                <a:latin typeface="+mj-lt"/>
+                <a:ea typeface="+mj-ea"/>
+                <a:cs typeface="+mj-cs"/>
+              </a:defRPr>
+            </a:lvl1pPr>
+          </a:lstStyle>
+          <a:p>
+            <a:r>
+              <a:rPr lang="en-US" sz="2800" cap="none" dirty="0">
+                <a:latin typeface="Ford Antenna Medium Cnd" panose="02000505000000020004" pitchFamily="2" charset="0"/>
+              </a:rPr>
+              <a:t>History</a:t>
+            </a:r>
+          </a:p>
+        </p:txBody>
+      </p:sp>
+    </p:spTree>
+    <p:extLst>
+      <p:ext uri="{BB962C8B-B14F-4D97-AF65-F5344CB8AC3E}">
+        <p14:creationId xmlns:p14="http://schemas.microsoft.com/office/powerpoint/2010/main" val="1693794479"/>
+      </p:ext>
+    </p:extLst>
+  </p:cSld>
+  <p:clrMapOvr>
+    <a:masterClrMapping/>
+  </p:clrMapOvr>
+</p:sld>
+</file>
+
+<file path=ppt/slides/slide4.xml><?xml version="1.0" encoding="utf-8"?>
+<p:sld xmlns:a="http://schemas.openxmlformats.org/drawingml/2006/main" xmlns:r="http://schemas.openxmlformats.org/officeDocument/2006/relationships" xmlns:p="http://schemas.openxmlformats.org/presentationml/2006/main">
+  <p:cSld>
+    <p:spTree>
+      <p:nvGrpSpPr>
+        <p:cNvPr id="1" name=""/>
+        <p:cNvGrpSpPr/>
+        <p:nvPr/>
+      </p:nvGrpSpPr>
+      <p:grpSpPr>
+        <a:xfrm>
+          <a:off x="0" y="0"/>
+          <a:ext cx="0" cy="0"/>
+          <a:chOff x="0" y="0"/>
+          <a:chExt cx="0" cy="0"/>
+        </a:xfrm>
+      </p:grpSpPr>
+      <p:pic>
+        <p:nvPicPr>
+          <p:cNvPr id="4" name="Picture 3">
+            <a:extLst>
+              <a:ext uri="{FF2B5EF4-FFF2-40B4-BE49-F238E27FC236}">
+                <a16:creationId xmlns:a16="http://schemas.microsoft.com/office/drawing/2014/main" id="{F6A185C7-2CFC-FF48-8353-FF3CB84A9E88}"/>
+              </a:ext>
+            </a:extLst>
+          </p:cNvPr>
+          <p:cNvPicPr>
+            <a:picLocks noChangeAspect="1"/>
+          </p:cNvPicPr>
+          <p:nvPr/>
+        </p:nvPicPr>
+        <p:blipFill>
+          <a:blip r:embed="rId2"/>
+          <a:stretch>
+            <a:fillRect/>
+          </a:stretch>
+        </p:blipFill>
+        <p:spPr>
+          <a:xfrm>
+            <a:off x="1351408" y="1309874"/>
+            <a:ext cx="9489183" cy="4238252"/>
+          </a:xfrm>
+          <a:prstGeom prst="rect">
+            <a:avLst/>
+          </a:prstGeom>
+          <a:effectLst>
+            <a:outerShdw blurRad="50800" dist="129421" dir="2700000" algn="tl" rotWithShape="0">
+              <a:schemeClr val="bg2">
+                <a:alpha val="40000"/>
+              </a:schemeClr>
+            </a:outerShdw>
+          </a:effectLst>
+        </p:spPr>
+      </p:pic>
+    </p:spTree>
+    <p:extLst>
+      <p:ext uri="{BB962C8B-B14F-4D97-AF65-F5344CB8AC3E}">
+        <p14:creationId xmlns:p14="http://schemas.microsoft.com/office/powerpoint/2010/main" val="3388760805"/>
+      </p:ext>
+    </p:extLst>
+  </p:cSld>
+  <p:clrMapOvr>
+    <a:masterClrMapping/>
+  </p:clrMapOvr>
+</p:sld>
+</file>
+
+<file path=ppt/slides/slide5.xml><?xml version="1.0" encoding="utf-8"?>
+<p:sld xmlns:a="http://schemas.openxmlformats.org/drawingml/2006/main" xmlns:r="http://schemas.openxmlformats.org/officeDocument/2006/relationships" xmlns:p="http://schemas.openxmlformats.org/presentationml/2006/main">
+  <p:cSld>
+    <p:spTree>
+      <p:nvGrpSpPr>
+        <p:cNvPr id="1" name=""/>
+        <p:cNvGrpSpPr/>
+        <p:nvPr/>
+      </p:nvGrpSpPr>
+      <p:grpSpPr>
+        <a:xfrm>
+          <a:off x="0" y="0"/>
+          <a:ext cx="0" cy="0"/>
+          <a:chOff x="0" y="0"/>
+          <a:chExt cx="0" cy="0"/>
+        </a:xfrm>
+      </p:grpSpPr>
+      <p:sp>
+        <p:nvSpPr>
+          <p:cNvPr id="3" name="Content Placeholder 2">
+            <a:extLst>
+              <a:ext uri="{FF2B5EF4-FFF2-40B4-BE49-F238E27FC236}">
+                <a16:creationId xmlns:a16="http://schemas.microsoft.com/office/drawing/2014/main" id="{17956A75-E2B2-0F45-9348-FCC5353B9806}"/>
+              </a:ext>
+            </a:extLst>
+          </p:cNvPr>
+          <p:cNvSpPr>
+            <a:spLocks noGrp="1"/>
+          </p:cNvSpPr>
+          <p:nvPr>
+            <p:ph idx="1"/>
+          </p:nvPr>
+        </p:nvSpPr>
+        <p:spPr>
+          <a:xfrm>
+            <a:off x="1344613" y="2445807"/>
+            <a:ext cx="9145586" cy="3081868"/>
+          </a:xfrm>
+        </p:spPr>
+        <p:txBody>
+          <a:bodyPr/>
+          <a:lstStyle/>
+          <a:p>
+            <a:pPr marL="0" indent="0">
+              <a:buNone/>
+            </a:pPr>
+            <a:r>
+              <a:rPr lang="en-US" dirty="0">
+                <a:latin typeface="Consolas" panose="020B0609020204030204" pitchFamily="49" charset="0"/>
+                <a:cs typeface="Consolas" panose="020B0609020204030204" pitchFamily="49" charset="0"/>
+              </a:rPr>
+              <a:t>Sunset: Wed, 31 Dec 2025 23:59:59 GMT</a:t>
+            </a:r>
+          </a:p>
+        </p:txBody>
+      </p:sp>
+      <p:sp>
+        <p:nvSpPr>
+          <p:cNvPr id="6" name="Title 1">
+            <a:extLst>
+              <a:ext uri="{FF2B5EF4-FFF2-40B4-BE49-F238E27FC236}">
+                <a16:creationId xmlns:a16="http://schemas.microsoft.com/office/drawing/2014/main" id="{4D0CE8EE-FF7C-AF4D-B6BF-D600E6EA4B66}"/>
+              </a:ext>
+            </a:extLst>
+          </p:cNvPr>
+          <p:cNvSpPr txBox="1">
+            <a:spLocks/>
+          </p:cNvSpPr>
+          <p:nvPr/>
+        </p:nvSpPr>
+        <p:spPr>
+          <a:xfrm>
+            <a:off x="1698623" y="607218"/>
+            <a:ext cx="8791575" cy="919162"/>
+          </a:xfrm>
+          <a:prstGeom prst="rect">
+            <a:avLst/>
+          </a:prstGeom>
+        </p:spPr>
+        <p:txBody>
+          <a:bodyPr vert="horz" lIns="91440" tIns="45720" rIns="91440" bIns="45720" rtlCol="0" anchor="ctr">
+            <a:normAutofit/>
+          </a:bodyPr>
+          <a:lstStyle>
+            <a:lvl1pPr algn="l" defTabSz="914400" rtl="0" eaLnBrk="1" latinLnBrk="0" hangingPunct="1">
+              <a:lnSpc>
+                <a:spcPct val="90000"/>
+              </a:lnSpc>
+              <a:spcBef>
+                <a:spcPct val="0"/>
+              </a:spcBef>
+              <a:buNone/>
+              <a:defRPr sz="3600" kern="1200" cap="all" baseline="0">
+                <a:solidFill>
+                  <a:schemeClr val="tx1"/>
+                </a:solidFill>
+                <a:latin typeface="+mj-lt"/>
+                <a:ea typeface="+mj-ea"/>
+                <a:cs typeface="+mj-cs"/>
+              </a:defRPr>
+            </a:lvl1pPr>
+          </a:lstStyle>
+          <a:p>
+            <a:r>
+              <a:rPr lang="en-US" cap="none" dirty="0">
+                <a:solidFill>
+                  <a:schemeClr val="bg2"/>
+                </a:solidFill>
+                <a:latin typeface="Ford Antenna Medium Cnd" panose="02000505000000020004" pitchFamily="2" charset="0"/>
+              </a:rPr>
+              <a:t>The Sunset HTTP Header Field</a:t>
+            </a:r>
+          </a:p>
+        </p:txBody>
+      </p:sp>
+      <p:sp>
+        <p:nvSpPr>
+          <p:cNvPr id="7" name="Title 1">
+            <a:extLst>
+              <a:ext uri="{FF2B5EF4-FFF2-40B4-BE49-F238E27FC236}">
+                <a16:creationId xmlns:a16="http://schemas.microsoft.com/office/drawing/2014/main" id="{924EB63B-9391-8F4A-A2B2-162C9716D18E}"/>
+              </a:ext>
+            </a:extLst>
+          </p:cNvPr>
+          <p:cNvSpPr txBox="1">
+            <a:spLocks/>
+          </p:cNvSpPr>
+          <p:nvPr/>
+        </p:nvSpPr>
+        <p:spPr>
+          <a:xfrm>
+            <a:off x="1698623" y="1330325"/>
+            <a:ext cx="8791575" cy="919162"/>
+          </a:xfrm>
+          <a:prstGeom prst="rect">
+            <a:avLst/>
+          </a:prstGeom>
+        </p:spPr>
+        <p:txBody>
+          <a:bodyPr vert="horz" lIns="91440" tIns="45720" rIns="91440" bIns="45720" rtlCol="0" anchor="ctr">
+            <a:normAutofit/>
+          </a:bodyPr>
+          <a:lstStyle>
+            <a:lvl1pPr algn="l" defTabSz="914400" rtl="0" eaLnBrk="1" latinLnBrk="0" hangingPunct="1">
+              <a:lnSpc>
+                <a:spcPct val="90000"/>
+              </a:lnSpc>
+              <a:spcBef>
+                <a:spcPct val="0"/>
+              </a:spcBef>
+              <a:buNone/>
+              <a:defRPr sz="3600" kern="1200" cap="all" baseline="0">
+                <a:solidFill>
+                  <a:schemeClr val="tx1"/>
+                </a:solidFill>
+                <a:latin typeface="+mj-lt"/>
+                <a:ea typeface="+mj-ea"/>
+                <a:cs typeface="+mj-cs"/>
+              </a:defRPr>
+            </a:lvl1pPr>
+          </a:lstStyle>
+          <a:p>
+            <a:r>
+              <a:rPr lang="en-US" sz="2800" cap="none" dirty="0">
+                <a:latin typeface="Ford Antenna Medium Cnd" panose="02000505000000020004" pitchFamily="2" charset="0"/>
+              </a:rPr>
+              <a:t>Simple Example</a:t>
+            </a:r>
+          </a:p>
+        </p:txBody>
+      </p:sp>
+    </p:spTree>
+    <p:extLst>
+      <p:ext uri="{BB962C8B-B14F-4D97-AF65-F5344CB8AC3E}">
+        <p14:creationId xmlns:p14="http://schemas.microsoft.com/office/powerpoint/2010/main" val="1499967072"/>
+      </p:ext>
+    </p:extLst>
+  </p:cSld>
+  <p:clrMapOvr>
+    <a:masterClrMapping/>
+  </p:clrMapOvr>
+</p:sld>
+</file>
+
+<file path=ppt/slides/slide6.xml><?xml version="1.0" encoding="utf-8"?>
+<p:sld xmlns:a="http://schemas.openxmlformats.org/drawingml/2006/main" xmlns:r="http://schemas.openxmlformats.org/officeDocument/2006/relationships" xmlns:p="http://schemas.openxmlformats.org/presentationml/2006/main">
+  <p:cSld>
+    <p:spTree>
+      <p:nvGrpSpPr>
+        <p:cNvPr id="1" name=""/>
+        <p:cNvGrpSpPr/>
+        <p:nvPr/>
+      </p:nvGrpSpPr>
+      <p:grpSpPr>
+        <a:xfrm>
+          <a:off x="0" y="0"/>
+          <a:ext cx="0" cy="0"/>
+          <a:chOff x="0" y="0"/>
+          <a:chExt cx="0" cy="0"/>
+        </a:xfrm>
+      </p:grpSpPr>
+      <p:sp>
+        <p:nvSpPr>
+          <p:cNvPr id="3" name="Content Placeholder 2">
+            <a:extLst>
+              <a:ext uri="{FF2B5EF4-FFF2-40B4-BE49-F238E27FC236}">
+                <a16:creationId xmlns:a16="http://schemas.microsoft.com/office/drawing/2014/main" id="{17956A75-E2B2-0F45-9348-FCC5353B9806}"/>
+              </a:ext>
+            </a:extLst>
+          </p:cNvPr>
+          <p:cNvSpPr>
+            <a:spLocks noGrp="1"/>
+          </p:cNvSpPr>
+          <p:nvPr>
+            <p:ph idx="1"/>
+          </p:nvPr>
+        </p:nvSpPr>
+        <p:spPr>
+          <a:xfrm>
+            <a:off x="1344613" y="2445807"/>
+            <a:ext cx="9145586" cy="3081868"/>
+          </a:xfrm>
+        </p:spPr>
+        <p:txBody>
+          <a:bodyPr>
+            <a:normAutofit lnSpcReduction="10000"/>
+          </a:bodyPr>
+          <a:lstStyle/>
+          <a:p>
+            <a:pPr marL="0" indent="0">
+              <a:spcBef>
+                <a:spcPts val="0"/>
+              </a:spcBef>
+              <a:buNone/>
+            </a:pPr>
+            <a:r>
+              <a:rPr lang="en-US" dirty="0">
+                <a:latin typeface="Consolas" panose="020B0609020204030204" pitchFamily="49" charset="0"/>
+                <a:cs typeface="Consolas" panose="020B0609020204030204" pitchFamily="49" charset="0"/>
+              </a:rPr>
+              <a:t>HTTP/1.1 200 OK</a:t>
+            </a:r>
+          </a:p>
+          <a:p>
+            <a:pPr marL="0" indent="0">
+              <a:spcBef>
+                <a:spcPts val="0"/>
+              </a:spcBef>
+              <a:buNone/>
+            </a:pPr>
+            <a:r>
+              <a:rPr lang="en-US" dirty="0">
+                <a:latin typeface="Consolas" panose="020B0609020204030204" pitchFamily="49" charset="0"/>
+                <a:cs typeface="Consolas" panose="020B0609020204030204" pitchFamily="49" charset="0"/>
+              </a:rPr>
+              <a:t>Date: Mon, 27 Jul 2009 12:28:53 GMT</a:t>
+            </a:r>
+          </a:p>
+          <a:p>
+            <a:pPr marL="0" indent="0">
+              <a:spcBef>
+                <a:spcPts val="0"/>
+              </a:spcBef>
+              <a:buNone/>
+            </a:pPr>
+            <a:r>
+              <a:rPr lang="en-US" dirty="0">
+                <a:latin typeface="Consolas" panose="020B0609020204030204" pitchFamily="49" charset="0"/>
+                <a:cs typeface="Consolas" panose="020B0609020204030204" pitchFamily="49" charset="0"/>
+              </a:rPr>
+              <a:t>Server: Apache</a:t>
+            </a:r>
+          </a:p>
+          <a:p>
+            <a:pPr marL="0" indent="0">
+              <a:spcBef>
+                <a:spcPts val="0"/>
+              </a:spcBef>
+              <a:buNone/>
+            </a:pPr>
+            <a:r>
+              <a:rPr lang="en-US" dirty="0">
+                <a:latin typeface="Consolas" panose="020B0609020204030204" pitchFamily="49" charset="0"/>
+                <a:cs typeface="Consolas" panose="020B0609020204030204" pitchFamily="49" charset="0"/>
+              </a:rPr>
+              <a:t>Last-Modified: Wed, 22 Jul 2009 19:15:56 GMT</a:t>
+            </a:r>
+          </a:p>
+          <a:p>
+            <a:pPr marL="0" indent="0">
+              <a:spcBef>
+                <a:spcPts val="0"/>
+              </a:spcBef>
+              <a:buNone/>
+            </a:pPr>
+            <a:r>
+              <a:rPr lang="en-US" dirty="0">
+                <a:latin typeface="Consolas" panose="020B0609020204030204" pitchFamily="49" charset="0"/>
+                <a:cs typeface="Consolas" panose="020B0609020204030204" pitchFamily="49" charset="0"/>
+              </a:rPr>
+              <a:t>Sunset: Thu, 31 Dec 2009 23:59:59 GMT</a:t>
+            </a:r>
+          </a:p>
+          <a:p>
+            <a:pPr marL="0" indent="0">
+              <a:spcBef>
+                <a:spcPts val="0"/>
+              </a:spcBef>
+              <a:buNone/>
+            </a:pPr>
+            <a:r>
+              <a:rPr lang="en-US" dirty="0">
+                <a:latin typeface="Consolas" panose="020B0609020204030204" pitchFamily="49" charset="0"/>
+                <a:cs typeface="Consolas" panose="020B0609020204030204" pitchFamily="49" charset="0"/>
+              </a:rPr>
+              <a:t>Content-Length: 51</a:t>
+            </a:r>
+          </a:p>
+          <a:p>
+            <a:pPr marL="0" indent="0">
+              <a:spcBef>
+                <a:spcPts val="0"/>
+              </a:spcBef>
+              <a:buNone/>
+            </a:pPr>
+            <a:r>
+              <a:rPr lang="en-US" dirty="0">
+                <a:latin typeface="Consolas" panose="020B0609020204030204" pitchFamily="49" charset="0"/>
+                <a:cs typeface="Consolas" panose="020B0609020204030204" pitchFamily="49" charset="0"/>
+              </a:rPr>
+              <a:t>Content-Type: text/plain</a:t>
+            </a:r>
+          </a:p>
+        </p:txBody>
+      </p:sp>
+      <p:sp>
+        <p:nvSpPr>
+          <p:cNvPr id="6" name="Title 1">
+            <a:extLst>
+              <a:ext uri="{FF2B5EF4-FFF2-40B4-BE49-F238E27FC236}">
+                <a16:creationId xmlns:a16="http://schemas.microsoft.com/office/drawing/2014/main" id="{4D0CE8EE-FF7C-AF4D-B6BF-D600E6EA4B66}"/>
+              </a:ext>
+            </a:extLst>
+          </p:cNvPr>
+          <p:cNvSpPr txBox="1">
+            <a:spLocks/>
+          </p:cNvSpPr>
+          <p:nvPr/>
+        </p:nvSpPr>
+        <p:spPr>
+          <a:xfrm>
+            <a:off x="1698623" y="607218"/>
+            <a:ext cx="8791575" cy="919162"/>
+          </a:xfrm>
+          <a:prstGeom prst="rect">
+            <a:avLst/>
+          </a:prstGeom>
+        </p:spPr>
+        <p:txBody>
+          <a:bodyPr vert="horz" lIns="91440" tIns="45720" rIns="91440" bIns="45720" rtlCol="0" anchor="ctr">
+            <a:normAutofit/>
+          </a:bodyPr>
+          <a:lstStyle>
+            <a:lvl1pPr algn="l" defTabSz="914400" rtl="0" eaLnBrk="1" latinLnBrk="0" hangingPunct="1">
+              <a:lnSpc>
+                <a:spcPct val="90000"/>
+              </a:lnSpc>
+              <a:spcBef>
+                <a:spcPct val="0"/>
+              </a:spcBef>
+              <a:buNone/>
+              <a:defRPr sz="3600" kern="1200" cap="all" baseline="0">
+                <a:solidFill>
+                  <a:schemeClr val="tx1"/>
+                </a:solidFill>
+                <a:latin typeface="+mj-lt"/>
+                <a:ea typeface="+mj-ea"/>
+                <a:cs typeface="+mj-cs"/>
+              </a:defRPr>
+            </a:lvl1pPr>
+          </a:lstStyle>
+          <a:p>
+            <a:r>
+              <a:rPr lang="en-US" cap="none" dirty="0">
+                <a:solidFill>
+                  <a:schemeClr val="bg2"/>
+                </a:solidFill>
+                <a:latin typeface="Ford Antenna Medium Cnd" panose="02000505000000020004" pitchFamily="2" charset="0"/>
+              </a:rPr>
+              <a:t>The Sunset HTTP Header Field</a:t>
+            </a:r>
+          </a:p>
+        </p:txBody>
+      </p:sp>
+      <p:sp>
+        <p:nvSpPr>
+          <p:cNvPr id="7" name="Title 1">
+            <a:extLst>
+              <a:ext uri="{FF2B5EF4-FFF2-40B4-BE49-F238E27FC236}">
+                <a16:creationId xmlns:a16="http://schemas.microsoft.com/office/drawing/2014/main" id="{924EB63B-9391-8F4A-A2B2-162C9716D18E}"/>
+              </a:ext>
+            </a:extLst>
+          </p:cNvPr>
+          <p:cNvSpPr txBox="1">
+            <a:spLocks/>
+          </p:cNvSpPr>
+          <p:nvPr/>
+        </p:nvSpPr>
+        <p:spPr>
+          <a:xfrm>
+            <a:off x="1698623" y="1330325"/>
+            <a:ext cx="8791575" cy="919162"/>
+          </a:xfrm>
+          <a:prstGeom prst="rect">
+            <a:avLst/>
+          </a:prstGeom>
+        </p:spPr>
+        <p:txBody>
+          <a:bodyPr vert="horz" lIns="91440" tIns="45720" rIns="91440" bIns="45720" rtlCol="0" anchor="ctr">
+            <a:normAutofit/>
+          </a:bodyPr>
+          <a:lstStyle>
+            <a:lvl1pPr algn="l" defTabSz="914400" rtl="0" eaLnBrk="1" latinLnBrk="0" hangingPunct="1">
+              <a:lnSpc>
+                <a:spcPct val="90000"/>
+              </a:lnSpc>
+              <a:spcBef>
+                <a:spcPct val="0"/>
+              </a:spcBef>
+              <a:buNone/>
+              <a:defRPr sz="3600" kern="1200" cap="all" baseline="0">
+                <a:solidFill>
+                  <a:schemeClr val="tx1"/>
+                </a:solidFill>
+                <a:latin typeface="+mj-lt"/>
+                <a:ea typeface="+mj-ea"/>
+                <a:cs typeface="+mj-cs"/>
+              </a:defRPr>
+            </a:lvl1pPr>
+          </a:lstStyle>
+          <a:p>
+            <a:r>
+              <a:rPr lang="en-US" sz="2800" cap="none" dirty="0">
+                <a:latin typeface="Ford Antenna Medium Cnd" panose="02000505000000020004" pitchFamily="2" charset="0"/>
+              </a:rPr>
+              <a:t>Example in Context</a:t>
+            </a:r>
+          </a:p>
+        </p:txBody>
+      </p:sp>
+    </p:spTree>
+    <p:extLst>
+      <p:ext uri="{BB962C8B-B14F-4D97-AF65-F5344CB8AC3E}">
+        <p14:creationId xmlns:p14="http://schemas.microsoft.com/office/powerpoint/2010/main" val="1359794030"/>
       </p:ext>
     </p:extLst>
   </p:cSld>

</xml_diff>

<commit_message>
finished first draft of sunset slides
</commit_message>
<xml_diff>
--- a/assets/slides/rfc8594.pptx
+++ b/assets/slides/rfc8594.pptx
@@ -6,11 +6,12 @@
   </p:sldMasterIdLst>
   <p:sldIdLst>
     <p:sldId id="256" r:id="rId2"/>
-    <p:sldId id="260" r:id="rId3"/>
-    <p:sldId id="261" r:id="rId4"/>
-    <p:sldId id="257" r:id="rId5"/>
-    <p:sldId id="258" r:id="rId6"/>
-    <p:sldId id="259" r:id="rId7"/>
+    <p:sldId id="262" r:id="rId3"/>
+    <p:sldId id="260" r:id="rId4"/>
+    <p:sldId id="261" r:id="rId5"/>
+    <p:sldId id="257" r:id="rId6"/>
+    <p:sldId id="258" r:id="rId7"/>
+    <p:sldId id="259" r:id="rId8"/>
   </p:sldIdLst>
   <p:sldSz cx="12192000" cy="6858000"/>
   <p:notesSz cx="6858000" cy="9144000"/>
@@ -12366,6 +12367,145 @@
         </p:nvSpPr>
         <p:spPr>
           <a:xfrm>
+            <a:off x="2401357" y="2509838"/>
+            <a:ext cx="8791575" cy="919162"/>
+          </a:xfrm>
+        </p:spPr>
+        <p:txBody>
+          <a:bodyPr/>
+          <a:lstStyle/>
+          <a:p>
+            <a:r>
+              <a:rPr lang="en-US" cap="none" dirty="0">
+                <a:effectLst>
+                  <a:outerShdw blurRad="63500" dist="60484" dir="2700000" sx="100475" sy="100475" algn="tl" rotWithShape="0">
+                    <a:schemeClr val="bg2"/>
+                  </a:outerShdw>
+                </a:effectLst>
+                <a:latin typeface="Ford Antenna Medium Cnd" panose="02000505000000020004" pitchFamily="2" charset="0"/>
+              </a:rPr>
+              <a:t>The Sunset HTTP Header Field</a:t>
+            </a:r>
+          </a:p>
+        </p:txBody>
+      </p:sp>
+      <p:sp>
+        <p:nvSpPr>
+          <p:cNvPr id="5" name="Title 1">
+            <a:extLst>
+              <a:ext uri="{FF2B5EF4-FFF2-40B4-BE49-F238E27FC236}">
+                <a16:creationId xmlns:a16="http://schemas.microsoft.com/office/drawing/2014/main" id="{9B177A5A-F4AA-E947-A478-1BE0C29F7951}"/>
+              </a:ext>
+            </a:extLst>
+          </p:cNvPr>
+          <p:cNvSpPr txBox="1">
+            <a:spLocks/>
+          </p:cNvSpPr>
+          <p:nvPr/>
+        </p:nvSpPr>
+        <p:spPr>
+          <a:xfrm>
+            <a:off x="3132667" y="5409142"/>
+            <a:ext cx="8791575" cy="919162"/>
+          </a:xfrm>
+          <a:prstGeom prst="rect">
+            <a:avLst/>
+          </a:prstGeom>
+          <a:effectLst>
+            <a:outerShdw blurRad="50800" dist="38100" dir="2700000" algn="tl" rotWithShape="0">
+              <a:prstClr val="black"/>
+            </a:outerShdw>
+          </a:effectLst>
+        </p:spPr>
+        <p:txBody>
+          <a:bodyPr vert="horz" lIns="91440" tIns="45720" rIns="91440" bIns="45720" rtlCol="0" anchor="b">
+            <a:normAutofit/>
+          </a:bodyPr>
+          <a:lstStyle>
+            <a:lvl1pPr algn="l" defTabSz="914400" rtl="0" eaLnBrk="1" latinLnBrk="0" hangingPunct="1">
+              <a:lnSpc>
+                <a:spcPct val="90000"/>
+              </a:lnSpc>
+              <a:spcBef>
+                <a:spcPct val="0"/>
+              </a:spcBef>
+              <a:buNone/>
+              <a:defRPr sz="4800" kern="1200" cap="all" baseline="0">
+                <a:solidFill>
+                  <a:schemeClr val="tx1"/>
+                </a:solidFill>
+                <a:latin typeface="+mj-lt"/>
+                <a:ea typeface="+mj-ea"/>
+                <a:cs typeface="+mj-cs"/>
+              </a:defRPr>
+            </a:lvl1pPr>
+          </a:lstStyle>
+          <a:p>
+            <a:r>
+              <a:rPr lang="en-US" cap="none" dirty="0">
+                <a:solidFill>
+                  <a:srgbClr val="48A8E3"/>
+                </a:solidFill>
+                <a:effectLst>
+                  <a:outerShdw blurRad="63500" dist="60484" dir="2700000" sx="100475" sy="100475" algn="tl" rotWithShape="0">
+                    <a:schemeClr val="bg2"/>
+                  </a:outerShdw>
+                </a:effectLst>
+                <a:latin typeface="Ford Antenna Medium Cnd" panose="02000505000000020004" pitchFamily="2" charset="0"/>
+              </a:rPr>
+              <a:t>HTTP API Building Blocks</a:t>
+            </a:r>
+          </a:p>
+        </p:txBody>
+      </p:sp>
+    </p:spTree>
+    <p:extLst>
+      <p:ext uri="{BB962C8B-B14F-4D97-AF65-F5344CB8AC3E}">
+        <p14:creationId xmlns:p14="http://schemas.microsoft.com/office/powerpoint/2010/main" val="1274364689"/>
+      </p:ext>
+    </p:extLst>
+  </p:cSld>
+  <p:clrMapOvr>
+    <a:masterClrMapping/>
+  </p:clrMapOvr>
+</p:sld>
+</file>
+
+<file path=ppt/slides/slide2.xml><?xml version="1.0" encoding="utf-8"?>
+<p:sld xmlns:a="http://schemas.openxmlformats.org/drawingml/2006/main" xmlns:r="http://schemas.openxmlformats.org/officeDocument/2006/relationships" xmlns:p="http://schemas.openxmlformats.org/presentationml/2006/main">
+  <p:cSld>
+    <p:spTree>
+      <p:nvGrpSpPr>
+        <p:cNvPr id="1" name=""/>
+        <p:cNvGrpSpPr/>
+        <p:nvPr/>
+      </p:nvGrpSpPr>
+      <p:grpSpPr>
+        <a:xfrm>
+          <a:off x="0" y="0"/>
+          <a:ext cx="0" cy="0"/>
+          <a:chOff x="0" y="0"/>
+          <a:chExt cx="0" cy="0"/>
+        </a:xfrm>
+      </p:grpSpPr>
+      <p:sp>
+        <p:nvSpPr>
+          <p:cNvPr id="2" name="Title 1">
+            <a:extLst>
+              <a:ext uri="{FF2B5EF4-FFF2-40B4-BE49-F238E27FC236}">
+                <a16:creationId xmlns:a16="http://schemas.microsoft.com/office/drawing/2014/main" id="{2FFF2C9B-392B-164A-ADF8-CAF50655D050}"/>
+              </a:ext>
+            </a:extLst>
+          </p:cNvPr>
+          <p:cNvSpPr>
+            <a:spLocks noGrp="1"/>
+          </p:cNvSpPr>
+          <p:nvPr>
+            <p:ph type="ctrTitle"/>
+          </p:nvPr>
+        </p:nvSpPr>
+        <p:spPr>
+          <a:xfrm>
             <a:off x="1876424" y="2590800"/>
             <a:ext cx="8791575" cy="919162"/>
           </a:xfrm>
@@ -12638,80 +12778,12 @@
           </a:p>
         </p:txBody>
       </p:sp>
-    </p:spTree>
-    <p:extLst>
-      <p:ext uri="{BB962C8B-B14F-4D97-AF65-F5344CB8AC3E}">
-        <p14:creationId xmlns:p14="http://schemas.microsoft.com/office/powerpoint/2010/main" val="1274364689"/>
-      </p:ext>
-    </p:extLst>
-  </p:cSld>
-  <p:clrMapOvr>
-    <a:masterClrMapping/>
-  </p:clrMapOvr>
-</p:sld>
-</file>
-
-<file path=ppt/slides/slide2.xml><?xml version="1.0" encoding="utf-8"?>
-<p:sld xmlns:a="http://schemas.openxmlformats.org/drawingml/2006/main" xmlns:r="http://schemas.openxmlformats.org/officeDocument/2006/relationships" xmlns:p="http://schemas.openxmlformats.org/presentationml/2006/main">
-  <p:cSld>
-    <p:spTree>
-      <p:nvGrpSpPr>
-        <p:cNvPr id="1" name=""/>
-        <p:cNvGrpSpPr/>
-        <p:nvPr/>
-      </p:nvGrpSpPr>
-      <p:grpSpPr>
-        <a:xfrm>
-          <a:off x="0" y="0"/>
-          <a:ext cx="0" cy="0"/>
-          <a:chOff x="0" y="0"/>
-          <a:chExt cx="0" cy="0"/>
-        </a:xfrm>
-      </p:grpSpPr>
-      <p:sp>
-        <p:nvSpPr>
-          <p:cNvPr id="3" name="Content Placeholder 2">
-            <a:extLst>
-              <a:ext uri="{FF2B5EF4-FFF2-40B4-BE49-F238E27FC236}">
-                <a16:creationId xmlns:a16="http://schemas.microsoft.com/office/drawing/2014/main" id="{17956A75-E2B2-0F45-9348-FCC5353B9806}"/>
-              </a:ext>
-            </a:extLst>
-          </p:cNvPr>
-          <p:cNvSpPr>
-            <a:spLocks noGrp="1"/>
-          </p:cNvSpPr>
-          <p:nvPr>
-            <p:ph idx="1"/>
-          </p:nvPr>
-        </p:nvSpPr>
-        <p:spPr>
-          <a:xfrm>
-            <a:off x="1344613" y="2445807"/>
-            <a:ext cx="9145586" cy="3081868"/>
-          </a:xfrm>
-        </p:spPr>
-        <p:txBody>
-          <a:bodyPr/>
-          <a:lstStyle/>
-          <a:p>
-            <a:pPr marL="0" indent="0">
-              <a:buNone/>
-            </a:pPr>
-            <a:r>
-              <a:rPr lang="en-US" dirty="0">
-                <a:latin typeface="Ford Antenna Medium" panose="02000505000000020004" pitchFamily="2" charset="0"/>
-              </a:rPr>
-              <a:t>When a resource or an API is about to be retired, it would be useful for consumers of that resource/API to be notified in advance. By using an HTTP field, this information can be conveyed in-band, instead of having to rely on out-of-band channels such as announcements that are published on Web pages or sent by email.</a:t>
-            </a:r>
-          </a:p>
-        </p:txBody>
-      </p:sp>
       <p:sp>
         <p:nvSpPr>
           <p:cNvPr id="6" name="Title 1">
             <a:extLst>
               <a:ext uri="{FF2B5EF4-FFF2-40B4-BE49-F238E27FC236}">
-                <a16:creationId xmlns:a16="http://schemas.microsoft.com/office/drawing/2014/main" id="{4D0CE8EE-FF7C-AF4D-B6BF-D600E6EA4B66}"/>
+                <a16:creationId xmlns:a16="http://schemas.microsoft.com/office/drawing/2014/main" id="{164F923F-7AFE-9B47-8278-38DF883B5B72}"/>
               </a:ext>
             </a:extLst>
           </p:cNvPr>
@@ -12722,15 +12794,16 @@
         </p:nvSpPr>
         <p:spPr>
           <a:xfrm>
-            <a:off x="1698623" y="607218"/>
-            <a:ext cx="8791575" cy="919162"/>
+            <a:off x="2292878" y="6277503"/>
+            <a:ext cx="2346856" cy="508000"/>
           </a:xfrm>
           <a:prstGeom prst="rect">
             <a:avLst/>
           </a:prstGeom>
+          <a:effectLst/>
         </p:spPr>
         <p:txBody>
-          <a:bodyPr vert="horz" lIns="91440" tIns="45720" rIns="91440" bIns="45720" rtlCol="0" anchor="ctr">
+          <a:bodyPr vert="horz" lIns="91440" tIns="45720" rIns="91440" bIns="45720" rtlCol="0" anchor="b">
             <a:normAutofit/>
           </a:bodyPr>
           <a:lstStyle>
@@ -12742,7 +12815,7 @@
                 <a:spcPct val="0"/>
               </a:spcBef>
               <a:buNone/>
-              <a:defRPr sz="3600" kern="1200" cap="all" baseline="0">
+              <a:defRPr sz="4800" kern="1200" cap="all" baseline="0">
                 <a:solidFill>
                   <a:schemeClr val="tx1"/>
                 </a:solidFill>
@@ -12754,69 +12827,18 @@
           </a:lstStyle>
           <a:p>
             <a:r>
-              <a:rPr lang="en-US" cap="none" dirty="0">
+              <a:rPr lang="en-US" sz="2400" i="1" cap="none" dirty="0">
                 <a:solidFill>
-                  <a:schemeClr val="bg2"/>
+                  <a:srgbClr val="48A8E3"/>
                 </a:solidFill>
-                <a:latin typeface="Ford Antenna Medium Cnd" panose="02000505000000020004" pitchFamily="2" charset="0"/>
+                <a:effectLst>
+                  <a:outerShdw blurRad="63500" dist="60484" dir="2700000" sx="100475" sy="100475" algn="tl" rotWithShape="0">
+                    <a:schemeClr val="bg2"/>
+                  </a:outerShdw>
+                </a:effectLst>
+                <a:latin typeface="Ford Antenna Thin XCnd" panose="02000505000000020004" pitchFamily="2" charset="0"/>
               </a:rPr>
-              <a:t>The Sunset HTTP Header Field</a:t>
-            </a:r>
-          </a:p>
-        </p:txBody>
-      </p:sp>
-      <p:sp>
-        <p:nvSpPr>
-          <p:cNvPr id="7" name="Title 1">
-            <a:extLst>
-              <a:ext uri="{FF2B5EF4-FFF2-40B4-BE49-F238E27FC236}">
-                <a16:creationId xmlns:a16="http://schemas.microsoft.com/office/drawing/2014/main" id="{924EB63B-9391-8F4A-A2B2-162C9716D18E}"/>
-              </a:ext>
-            </a:extLst>
-          </p:cNvPr>
-          <p:cNvSpPr txBox="1">
-            <a:spLocks/>
-          </p:cNvSpPr>
-          <p:nvPr/>
-        </p:nvSpPr>
-        <p:spPr>
-          <a:xfrm>
-            <a:off x="1698623" y="1330325"/>
-            <a:ext cx="8791575" cy="919162"/>
-          </a:xfrm>
-          <a:prstGeom prst="rect">
-            <a:avLst/>
-          </a:prstGeom>
-        </p:spPr>
-        <p:txBody>
-          <a:bodyPr vert="horz" lIns="91440" tIns="45720" rIns="91440" bIns="45720" rtlCol="0" anchor="ctr">
-            <a:normAutofit/>
-          </a:bodyPr>
-          <a:lstStyle>
-            <a:lvl1pPr algn="l" defTabSz="914400" rtl="0" eaLnBrk="1" latinLnBrk="0" hangingPunct="1">
-              <a:lnSpc>
-                <a:spcPct val="90000"/>
-              </a:lnSpc>
-              <a:spcBef>
-                <a:spcPct val="0"/>
-              </a:spcBef>
-              <a:buNone/>
-              <a:defRPr sz="3600" kern="1200" cap="all" baseline="0">
-                <a:solidFill>
-                  <a:schemeClr val="tx1"/>
-                </a:solidFill>
-                <a:latin typeface="+mj-lt"/>
-                <a:ea typeface="+mj-ea"/>
-                <a:cs typeface="+mj-cs"/>
-              </a:defRPr>
-            </a:lvl1pPr>
-          </a:lstStyle>
-          <a:p>
-            <a:r>
-              <a:rPr lang="en-US" sz="2800" cap="none" dirty="0">
-                <a:latin typeface="Ford Antenna Medium Cnd" panose="02000505000000020004" pitchFamily="2" charset="0"/>
-              </a:rPr>
-              <a:t>Description</a:t>
+              <a:t>HTTP API Building Blocks</a:t>
             </a:r>
           </a:p>
         </p:txBody>
@@ -12824,7 +12846,7 @@
     </p:spTree>
     <p:extLst>
       <p:ext uri="{BB962C8B-B14F-4D97-AF65-F5344CB8AC3E}">
-        <p14:creationId xmlns:p14="http://schemas.microsoft.com/office/powerpoint/2010/main" val="2069324029"/>
+        <p14:creationId xmlns:p14="http://schemas.microsoft.com/office/powerpoint/2010/main" val="1595488542"/>
       </p:ext>
     </p:extLst>
   </p:cSld>
@@ -12884,7 +12906,7 @@
               <a:rPr lang="en-US" dirty="0">
                 <a:latin typeface="Ford Antenna Medium" panose="02000505000000020004" pitchFamily="2" charset="0"/>
               </a:rPr>
-              <a:t>Erik Wilde, “The Sunset HTTP Header Field”, Internet RFC 8594, May 2019</a:t>
+              <a:t>When a resource or an API is about to be retired, it would be useful for consumers of that resource/API to be notified in advance. By using an HTTP field, this information can be conveyed in-band, instead of having to rely on out-of-band channels such as announcements that are published on Web pages or sent by email.</a:t>
             </a:r>
           </a:p>
         </p:txBody>
@@ -12999,7 +13021,320 @@
               <a:rPr lang="en-US" sz="2800" cap="none" dirty="0">
                 <a:latin typeface="Ford Antenna Medium Cnd" panose="02000505000000020004" pitchFamily="2" charset="0"/>
               </a:rPr>
+              <a:t>Description</a:t>
+            </a:r>
+          </a:p>
+        </p:txBody>
+      </p:sp>
+      <p:sp>
+        <p:nvSpPr>
+          <p:cNvPr id="9" name="Title 1">
+            <a:extLst>
+              <a:ext uri="{FF2B5EF4-FFF2-40B4-BE49-F238E27FC236}">
+                <a16:creationId xmlns:a16="http://schemas.microsoft.com/office/drawing/2014/main" id="{E97A758C-3EE1-4E49-86C8-6017B063ABDB}"/>
+              </a:ext>
+            </a:extLst>
+          </p:cNvPr>
+          <p:cNvSpPr txBox="1">
+            <a:spLocks/>
+          </p:cNvSpPr>
+          <p:nvPr/>
+        </p:nvSpPr>
+        <p:spPr>
+          <a:xfrm>
+            <a:off x="1192211" y="6284649"/>
+            <a:ext cx="2346856" cy="508000"/>
+          </a:xfrm>
+          <a:prstGeom prst="rect">
+            <a:avLst/>
+          </a:prstGeom>
+          <a:effectLst/>
+        </p:spPr>
+        <p:txBody>
+          <a:bodyPr vert="horz" lIns="91440" tIns="45720" rIns="91440" bIns="45720" rtlCol="0" anchor="b">
+            <a:normAutofit/>
+          </a:bodyPr>
+          <a:lstStyle>
+            <a:lvl1pPr algn="l" defTabSz="914400" rtl="0" eaLnBrk="1" latinLnBrk="0" hangingPunct="1">
+              <a:lnSpc>
+                <a:spcPct val="90000"/>
+              </a:lnSpc>
+              <a:spcBef>
+                <a:spcPct val="0"/>
+              </a:spcBef>
+              <a:buNone/>
+              <a:defRPr sz="4800" kern="1200" cap="all" baseline="0">
+                <a:solidFill>
+                  <a:schemeClr val="tx1"/>
+                </a:solidFill>
+                <a:latin typeface="+mj-lt"/>
+                <a:ea typeface="+mj-ea"/>
+                <a:cs typeface="+mj-cs"/>
+              </a:defRPr>
+            </a:lvl1pPr>
+          </a:lstStyle>
+          <a:p>
+            <a:r>
+              <a:rPr lang="en-US" sz="2400" i="1" cap="none" dirty="0">
+                <a:solidFill>
+                  <a:srgbClr val="48A8E3"/>
+                </a:solidFill>
+                <a:effectLst>
+                  <a:outerShdw blurRad="63500" dist="60484" dir="2700000" sx="100475" sy="100475" algn="tl" rotWithShape="0">
+                    <a:schemeClr val="bg2"/>
+                  </a:outerShdw>
+                </a:effectLst>
+                <a:latin typeface="Ford Antenna Thin XCnd" panose="02000505000000020004" pitchFamily="2" charset="0"/>
+              </a:rPr>
+              <a:t>HTTP API Building Blocks</a:t>
+            </a:r>
+          </a:p>
+        </p:txBody>
+      </p:sp>
+    </p:spTree>
+    <p:extLst>
+      <p:ext uri="{BB962C8B-B14F-4D97-AF65-F5344CB8AC3E}">
+        <p14:creationId xmlns:p14="http://schemas.microsoft.com/office/powerpoint/2010/main" val="2069324029"/>
+      </p:ext>
+    </p:extLst>
+  </p:cSld>
+  <p:clrMapOvr>
+    <a:masterClrMapping/>
+  </p:clrMapOvr>
+</p:sld>
+</file>
+
+<file path=ppt/slides/slide4.xml><?xml version="1.0" encoding="utf-8"?>
+<p:sld xmlns:a="http://schemas.openxmlformats.org/drawingml/2006/main" xmlns:r="http://schemas.openxmlformats.org/officeDocument/2006/relationships" xmlns:p="http://schemas.openxmlformats.org/presentationml/2006/main">
+  <p:cSld>
+    <p:spTree>
+      <p:nvGrpSpPr>
+        <p:cNvPr id="1" name=""/>
+        <p:cNvGrpSpPr/>
+        <p:nvPr/>
+      </p:nvGrpSpPr>
+      <p:grpSpPr>
+        <a:xfrm>
+          <a:off x="0" y="0"/>
+          <a:ext cx="0" cy="0"/>
+          <a:chOff x="0" y="0"/>
+          <a:chExt cx="0" cy="0"/>
+        </a:xfrm>
+      </p:grpSpPr>
+      <p:sp>
+        <p:nvSpPr>
+          <p:cNvPr id="3" name="Content Placeholder 2">
+            <a:extLst>
+              <a:ext uri="{FF2B5EF4-FFF2-40B4-BE49-F238E27FC236}">
+                <a16:creationId xmlns:a16="http://schemas.microsoft.com/office/drawing/2014/main" id="{17956A75-E2B2-0F45-9348-FCC5353B9806}"/>
+              </a:ext>
+            </a:extLst>
+          </p:cNvPr>
+          <p:cNvSpPr>
+            <a:spLocks noGrp="1"/>
+          </p:cNvSpPr>
+          <p:nvPr>
+            <p:ph idx="1"/>
+          </p:nvPr>
+        </p:nvSpPr>
+        <p:spPr>
+          <a:xfrm>
+            <a:off x="1344613" y="2445807"/>
+            <a:ext cx="9145586" cy="3081868"/>
+          </a:xfrm>
+        </p:spPr>
+        <p:txBody>
+          <a:bodyPr/>
+          <a:lstStyle/>
+          <a:p>
+            <a:pPr marL="0" indent="0">
+              <a:buNone/>
+            </a:pPr>
+            <a:r>
+              <a:rPr lang="en-US" dirty="0">
+                <a:latin typeface="Ford Antenna Medium" panose="02000505000000020004" pitchFamily="2" charset="0"/>
+              </a:rPr>
+              <a:t>Erik Wilde, “The Sunset HTTP Header Field”, Internet RFC 8594, May 2019</a:t>
+            </a:r>
+          </a:p>
+        </p:txBody>
+      </p:sp>
+      <p:sp>
+        <p:nvSpPr>
+          <p:cNvPr id="6" name="Title 1">
+            <a:extLst>
+              <a:ext uri="{FF2B5EF4-FFF2-40B4-BE49-F238E27FC236}">
+                <a16:creationId xmlns:a16="http://schemas.microsoft.com/office/drawing/2014/main" id="{4D0CE8EE-FF7C-AF4D-B6BF-D600E6EA4B66}"/>
+              </a:ext>
+            </a:extLst>
+          </p:cNvPr>
+          <p:cNvSpPr txBox="1">
+            <a:spLocks/>
+          </p:cNvSpPr>
+          <p:nvPr/>
+        </p:nvSpPr>
+        <p:spPr>
+          <a:xfrm>
+            <a:off x="1698623" y="607218"/>
+            <a:ext cx="8791575" cy="919162"/>
+          </a:xfrm>
+          <a:prstGeom prst="rect">
+            <a:avLst/>
+          </a:prstGeom>
+        </p:spPr>
+        <p:txBody>
+          <a:bodyPr vert="horz" lIns="91440" tIns="45720" rIns="91440" bIns="45720" rtlCol="0" anchor="ctr">
+            <a:normAutofit/>
+          </a:bodyPr>
+          <a:lstStyle>
+            <a:lvl1pPr algn="l" defTabSz="914400" rtl="0" eaLnBrk="1" latinLnBrk="0" hangingPunct="1">
+              <a:lnSpc>
+                <a:spcPct val="90000"/>
+              </a:lnSpc>
+              <a:spcBef>
+                <a:spcPct val="0"/>
+              </a:spcBef>
+              <a:buNone/>
+              <a:defRPr sz="3600" kern="1200" cap="all" baseline="0">
+                <a:solidFill>
+                  <a:schemeClr val="tx1"/>
+                </a:solidFill>
+                <a:latin typeface="+mj-lt"/>
+                <a:ea typeface="+mj-ea"/>
+                <a:cs typeface="+mj-cs"/>
+              </a:defRPr>
+            </a:lvl1pPr>
+          </a:lstStyle>
+          <a:p>
+            <a:r>
+              <a:rPr lang="en-US" cap="none" dirty="0">
+                <a:solidFill>
+                  <a:schemeClr val="bg2"/>
+                </a:solidFill>
+                <a:latin typeface="Ford Antenna Medium Cnd" panose="02000505000000020004" pitchFamily="2" charset="0"/>
+              </a:rPr>
+              <a:t>The Sunset HTTP Header Field</a:t>
+            </a:r>
+          </a:p>
+        </p:txBody>
+      </p:sp>
+      <p:sp>
+        <p:nvSpPr>
+          <p:cNvPr id="7" name="Title 1">
+            <a:extLst>
+              <a:ext uri="{FF2B5EF4-FFF2-40B4-BE49-F238E27FC236}">
+                <a16:creationId xmlns:a16="http://schemas.microsoft.com/office/drawing/2014/main" id="{924EB63B-9391-8F4A-A2B2-162C9716D18E}"/>
+              </a:ext>
+            </a:extLst>
+          </p:cNvPr>
+          <p:cNvSpPr txBox="1">
+            <a:spLocks/>
+          </p:cNvSpPr>
+          <p:nvPr/>
+        </p:nvSpPr>
+        <p:spPr>
+          <a:xfrm>
+            <a:off x="1698623" y="1330325"/>
+            <a:ext cx="8791575" cy="919162"/>
+          </a:xfrm>
+          <a:prstGeom prst="rect">
+            <a:avLst/>
+          </a:prstGeom>
+        </p:spPr>
+        <p:txBody>
+          <a:bodyPr vert="horz" lIns="91440" tIns="45720" rIns="91440" bIns="45720" rtlCol="0" anchor="ctr">
+            <a:normAutofit/>
+          </a:bodyPr>
+          <a:lstStyle>
+            <a:lvl1pPr algn="l" defTabSz="914400" rtl="0" eaLnBrk="1" latinLnBrk="0" hangingPunct="1">
+              <a:lnSpc>
+                <a:spcPct val="90000"/>
+              </a:lnSpc>
+              <a:spcBef>
+                <a:spcPct val="0"/>
+              </a:spcBef>
+              <a:buNone/>
+              <a:defRPr sz="3600" kern="1200" cap="all" baseline="0">
+                <a:solidFill>
+                  <a:schemeClr val="tx1"/>
+                </a:solidFill>
+                <a:latin typeface="+mj-lt"/>
+                <a:ea typeface="+mj-ea"/>
+                <a:cs typeface="+mj-cs"/>
+              </a:defRPr>
+            </a:lvl1pPr>
+          </a:lstStyle>
+          <a:p>
+            <a:r>
+              <a:rPr lang="en-US" sz="2800" cap="none" dirty="0">
+                <a:latin typeface="Ford Antenna Medium Cnd" panose="02000505000000020004" pitchFamily="2" charset="0"/>
+              </a:rPr>
               <a:t>History</a:t>
+            </a:r>
+          </a:p>
+        </p:txBody>
+      </p:sp>
+      <p:sp>
+        <p:nvSpPr>
+          <p:cNvPr id="5" name="Title 1">
+            <a:extLst>
+              <a:ext uri="{FF2B5EF4-FFF2-40B4-BE49-F238E27FC236}">
+                <a16:creationId xmlns:a16="http://schemas.microsoft.com/office/drawing/2014/main" id="{FB21F8BE-2E89-EE41-8768-18BF9C179B4B}"/>
+              </a:ext>
+            </a:extLst>
+          </p:cNvPr>
+          <p:cNvSpPr txBox="1">
+            <a:spLocks/>
+          </p:cNvSpPr>
+          <p:nvPr/>
+        </p:nvSpPr>
+        <p:spPr>
+          <a:xfrm>
+            <a:off x="1192211" y="6284649"/>
+            <a:ext cx="2346856" cy="508000"/>
+          </a:xfrm>
+          <a:prstGeom prst="rect">
+            <a:avLst/>
+          </a:prstGeom>
+          <a:effectLst/>
+        </p:spPr>
+        <p:txBody>
+          <a:bodyPr vert="horz" lIns="91440" tIns="45720" rIns="91440" bIns="45720" rtlCol="0" anchor="b">
+            <a:normAutofit/>
+          </a:bodyPr>
+          <a:lstStyle>
+            <a:lvl1pPr algn="l" defTabSz="914400" rtl="0" eaLnBrk="1" latinLnBrk="0" hangingPunct="1">
+              <a:lnSpc>
+                <a:spcPct val="90000"/>
+              </a:lnSpc>
+              <a:spcBef>
+                <a:spcPct val="0"/>
+              </a:spcBef>
+              <a:buNone/>
+              <a:defRPr sz="4800" kern="1200" cap="all" baseline="0">
+                <a:solidFill>
+                  <a:schemeClr val="tx1"/>
+                </a:solidFill>
+                <a:latin typeface="+mj-lt"/>
+                <a:ea typeface="+mj-ea"/>
+                <a:cs typeface="+mj-cs"/>
+              </a:defRPr>
+            </a:lvl1pPr>
+          </a:lstStyle>
+          <a:p>
+            <a:r>
+              <a:rPr lang="en-US" sz="2400" i="1" cap="none" dirty="0">
+                <a:solidFill>
+                  <a:srgbClr val="48A8E3"/>
+                </a:solidFill>
+                <a:effectLst>
+                  <a:outerShdw blurRad="63500" dist="60484" dir="2700000" sx="100475" sy="100475" algn="tl" rotWithShape="0">
+                    <a:schemeClr val="bg2"/>
+                  </a:outerShdw>
+                </a:effectLst>
+                <a:latin typeface="Ford Antenna Thin XCnd" panose="02000505000000020004" pitchFamily="2" charset="0"/>
+              </a:rPr>
+              <a:t>HTTP API Building Blocks</a:t>
             </a:r>
           </a:p>
         </p:txBody>
@@ -13017,7 +13352,7 @@
 </p:sld>
 </file>
 
-<file path=ppt/slides/slide4.xml><?xml version="1.0" encoding="utf-8"?>
+<file path=ppt/slides/slide5.xml><?xml version="1.0" encoding="utf-8"?>
 <p:sld xmlns:a="http://schemas.openxmlformats.org/drawingml/2006/main" xmlns:r="http://schemas.openxmlformats.org/officeDocument/2006/relationships" xmlns:p="http://schemas.openxmlformats.org/presentationml/2006/main">
   <p:cSld>
     <p:spTree>
@@ -13071,81 +13406,12 @@
           </a:effectLst>
         </p:spPr>
       </p:pic>
-    </p:spTree>
-    <p:extLst>
-      <p:ext uri="{BB962C8B-B14F-4D97-AF65-F5344CB8AC3E}">
-        <p14:creationId xmlns:p14="http://schemas.microsoft.com/office/powerpoint/2010/main" val="3388760805"/>
-      </p:ext>
-    </p:extLst>
-  </p:cSld>
-  <p:clrMapOvr>
-    <a:masterClrMapping/>
-  </p:clrMapOvr>
-</p:sld>
-</file>
-
-<file path=ppt/slides/slide5.xml><?xml version="1.0" encoding="utf-8"?>
-<p:sld xmlns:a="http://schemas.openxmlformats.org/drawingml/2006/main" xmlns:r="http://schemas.openxmlformats.org/officeDocument/2006/relationships" xmlns:p="http://schemas.openxmlformats.org/presentationml/2006/main">
-  <p:cSld>
-    <p:spTree>
-      <p:nvGrpSpPr>
-        <p:cNvPr id="1" name=""/>
-        <p:cNvGrpSpPr/>
-        <p:nvPr/>
-      </p:nvGrpSpPr>
-      <p:grpSpPr>
-        <a:xfrm>
-          <a:off x="0" y="0"/>
-          <a:ext cx="0" cy="0"/>
-          <a:chOff x="0" y="0"/>
-          <a:chExt cx="0" cy="0"/>
-        </a:xfrm>
-      </p:grpSpPr>
       <p:sp>
         <p:nvSpPr>
-          <p:cNvPr id="3" name="Content Placeholder 2">
+          <p:cNvPr id="5" name="Title 1">
             <a:extLst>
               <a:ext uri="{FF2B5EF4-FFF2-40B4-BE49-F238E27FC236}">
-                <a16:creationId xmlns:a16="http://schemas.microsoft.com/office/drawing/2014/main" id="{17956A75-E2B2-0F45-9348-FCC5353B9806}"/>
-              </a:ext>
-            </a:extLst>
-          </p:cNvPr>
-          <p:cNvSpPr>
-            <a:spLocks noGrp="1"/>
-          </p:cNvSpPr>
-          <p:nvPr>
-            <p:ph idx="1"/>
-          </p:nvPr>
-        </p:nvSpPr>
-        <p:spPr>
-          <a:xfrm>
-            <a:off x="1344613" y="2445807"/>
-            <a:ext cx="9145586" cy="3081868"/>
-          </a:xfrm>
-        </p:spPr>
-        <p:txBody>
-          <a:bodyPr/>
-          <a:lstStyle/>
-          <a:p>
-            <a:pPr marL="0" indent="0">
-              <a:buNone/>
-            </a:pPr>
-            <a:r>
-              <a:rPr lang="en-US" dirty="0">
-                <a:latin typeface="Consolas" panose="020B0609020204030204" pitchFamily="49" charset="0"/>
-                <a:cs typeface="Consolas" panose="020B0609020204030204" pitchFamily="49" charset="0"/>
-              </a:rPr>
-              <a:t>Sunset: Wed, 31 Dec 2025 23:59:59 GMT</a:t>
-            </a:r>
-          </a:p>
-        </p:txBody>
-      </p:sp>
-      <p:sp>
-        <p:nvSpPr>
-          <p:cNvPr id="6" name="Title 1">
-            <a:extLst>
-              <a:ext uri="{FF2B5EF4-FFF2-40B4-BE49-F238E27FC236}">
-                <a16:creationId xmlns:a16="http://schemas.microsoft.com/office/drawing/2014/main" id="{4D0CE8EE-FF7C-AF4D-B6BF-D600E6EA4B66}"/>
+                <a16:creationId xmlns:a16="http://schemas.microsoft.com/office/drawing/2014/main" id="{7DC45237-4EA1-054E-95FB-AE8ACA1389A3}"/>
               </a:ext>
             </a:extLst>
           </p:cNvPr>
@@ -13156,15 +13422,16 @@
         </p:nvSpPr>
         <p:spPr>
           <a:xfrm>
-            <a:off x="1698623" y="607218"/>
-            <a:ext cx="8791575" cy="919162"/>
+            <a:off x="1192211" y="6284649"/>
+            <a:ext cx="2346856" cy="508000"/>
           </a:xfrm>
           <a:prstGeom prst="rect">
             <a:avLst/>
           </a:prstGeom>
+          <a:effectLst/>
         </p:spPr>
         <p:txBody>
-          <a:bodyPr vert="horz" lIns="91440" tIns="45720" rIns="91440" bIns="45720" rtlCol="0" anchor="ctr">
+          <a:bodyPr vert="horz" lIns="91440" tIns="45720" rIns="91440" bIns="45720" rtlCol="0" anchor="b">
             <a:normAutofit/>
           </a:bodyPr>
           <a:lstStyle>
@@ -13176,7 +13443,7 @@
                 <a:spcPct val="0"/>
               </a:spcBef>
               <a:buNone/>
-              <a:defRPr sz="3600" kern="1200" cap="all" baseline="0">
+              <a:defRPr sz="4800" kern="1200" cap="all" baseline="0">
                 <a:solidFill>
                   <a:schemeClr val="tx1"/>
                 </a:solidFill>
@@ -13188,69 +13455,18 @@
           </a:lstStyle>
           <a:p>
             <a:r>
-              <a:rPr lang="en-US" cap="none" dirty="0">
+              <a:rPr lang="en-US" sz="2400" i="1" cap="none" dirty="0">
                 <a:solidFill>
-                  <a:schemeClr val="bg2"/>
+                  <a:srgbClr val="48A8E3"/>
                 </a:solidFill>
-                <a:latin typeface="Ford Antenna Medium Cnd" panose="02000505000000020004" pitchFamily="2" charset="0"/>
+                <a:effectLst>
+                  <a:outerShdw blurRad="63500" dist="60484" dir="2700000" sx="100475" sy="100475" algn="tl" rotWithShape="0">
+                    <a:schemeClr val="bg2"/>
+                  </a:outerShdw>
+                </a:effectLst>
+                <a:latin typeface="Ford Antenna Thin XCnd" panose="02000505000000020004" pitchFamily="2" charset="0"/>
               </a:rPr>
-              <a:t>The Sunset HTTP Header Field</a:t>
-            </a:r>
-          </a:p>
-        </p:txBody>
-      </p:sp>
-      <p:sp>
-        <p:nvSpPr>
-          <p:cNvPr id="7" name="Title 1">
-            <a:extLst>
-              <a:ext uri="{FF2B5EF4-FFF2-40B4-BE49-F238E27FC236}">
-                <a16:creationId xmlns:a16="http://schemas.microsoft.com/office/drawing/2014/main" id="{924EB63B-9391-8F4A-A2B2-162C9716D18E}"/>
-              </a:ext>
-            </a:extLst>
-          </p:cNvPr>
-          <p:cNvSpPr txBox="1">
-            <a:spLocks/>
-          </p:cNvSpPr>
-          <p:nvPr/>
-        </p:nvSpPr>
-        <p:spPr>
-          <a:xfrm>
-            <a:off x="1698623" y="1330325"/>
-            <a:ext cx="8791575" cy="919162"/>
-          </a:xfrm>
-          <a:prstGeom prst="rect">
-            <a:avLst/>
-          </a:prstGeom>
-        </p:spPr>
-        <p:txBody>
-          <a:bodyPr vert="horz" lIns="91440" tIns="45720" rIns="91440" bIns="45720" rtlCol="0" anchor="ctr">
-            <a:normAutofit/>
-          </a:bodyPr>
-          <a:lstStyle>
-            <a:lvl1pPr algn="l" defTabSz="914400" rtl="0" eaLnBrk="1" latinLnBrk="0" hangingPunct="1">
-              <a:lnSpc>
-                <a:spcPct val="90000"/>
-              </a:lnSpc>
-              <a:spcBef>
-                <a:spcPct val="0"/>
-              </a:spcBef>
-              <a:buNone/>
-              <a:defRPr sz="3600" kern="1200" cap="all" baseline="0">
-                <a:solidFill>
-                  <a:schemeClr val="tx1"/>
-                </a:solidFill>
-                <a:latin typeface="+mj-lt"/>
-                <a:ea typeface="+mj-ea"/>
-                <a:cs typeface="+mj-cs"/>
-              </a:defRPr>
-            </a:lvl1pPr>
-          </a:lstStyle>
-          <a:p>
-            <a:r>
-              <a:rPr lang="en-US" sz="2800" cap="none" dirty="0">
-                <a:latin typeface="Ford Antenna Medium Cnd" panose="02000505000000020004" pitchFamily="2" charset="0"/>
-              </a:rPr>
-              <a:t>Simple Example</a:t>
+              <a:t>HTTP API Building Blocks</a:t>
             </a:r>
           </a:p>
         </p:txBody>
@@ -13258,7 +13474,7 @@
     </p:spTree>
     <p:extLst>
       <p:ext uri="{BB962C8B-B14F-4D97-AF65-F5344CB8AC3E}">
-        <p14:creationId xmlns:p14="http://schemas.microsoft.com/office/powerpoint/2010/main" val="1499967072"/>
+        <p14:creationId xmlns:p14="http://schemas.microsoft.com/office/powerpoint/2010/main" val="3388760805"/>
       </p:ext>
     </p:extLst>
   </p:cSld>
@@ -13308,15 +13524,10 @@
           </a:xfrm>
         </p:spPr>
         <p:txBody>
-          <a:bodyPr>
-            <a:normAutofit lnSpcReduction="10000"/>
-          </a:bodyPr>
+          <a:bodyPr/>
           <a:lstStyle/>
           <a:p>
             <a:pPr marL="0" indent="0">
-              <a:spcBef>
-                <a:spcPts val="0"/>
-              </a:spcBef>
               <a:buNone/>
             </a:pPr>
             <a:r>
@@ -13324,97 +13535,7 @@
                 <a:latin typeface="Consolas" panose="020B0609020204030204" pitchFamily="49" charset="0"/>
                 <a:cs typeface="Consolas" panose="020B0609020204030204" pitchFamily="49" charset="0"/>
               </a:rPr>
-              <a:t>HTTP/1.1 200 OK</a:t>
-            </a:r>
-          </a:p>
-          <a:p>
-            <a:pPr marL="0" indent="0">
-              <a:spcBef>
-                <a:spcPts val="0"/>
-              </a:spcBef>
-              <a:buNone/>
-            </a:pPr>
-            <a:r>
-              <a:rPr lang="en-US" dirty="0">
-                <a:latin typeface="Consolas" panose="020B0609020204030204" pitchFamily="49" charset="0"/>
-                <a:cs typeface="Consolas" panose="020B0609020204030204" pitchFamily="49" charset="0"/>
-              </a:rPr>
-              <a:t>Date: Mon, 27 Jul 2009 12:28:53 GMT</a:t>
-            </a:r>
-          </a:p>
-          <a:p>
-            <a:pPr marL="0" indent="0">
-              <a:spcBef>
-                <a:spcPts val="0"/>
-              </a:spcBef>
-              <a:buNone/>
-            </a:pPr>
-            <a:r>
-              <a:rPr lang="en-US" dirty="0">
-                <a:latin typeface="Consolas" panose="020B0609020204030204" pitchFamily="49" charset="0"/>
-                <a:cs typeface="Consolas" panose="020B0609020204030204" pitchFamily="49" charset="0"/>
-              </a:rPr>
-              <a:t>Server: Apache</a:t>
-            </a:r>
-          </a:p>
-          <a:p>
-            <a:pPr marL="0" indent="0">
-              <a:spcBef>
-                <a:spcPts val="0"/>
-              </a:spcBef>
-              <a:buNone/>
-            </a:pPr>
-            <a:r>
-              <a:rPr lang="en-US" dirty="0">
-                <a:latin typeface="Consolas" panose="020B0609020204030204" pitchFamily="49" charset="0"/>
-                <a:cs typeface="Consolas" panose="020B0609020204030204" pitchFamily="49" charset="0"/>
-              </a:rPr>
-              <a:t>Last-Modified: Wed, 22 Jul 2009 19:15:56 GMT</a:t>
-            </a:r>
-          </a:p>
-          <a:p>
-            <a:pPr marL="0" indent="0">
-              <a:spcBef>
-                <a:spcPts val="0"/>
-              </a:spcBef>
-              <a:buNone/>
-            </a:pPr>
-            <a:r>
-              <a:rPr lang="en-US" dirty="0">
-                <a:latin typeface="Consolas" panose="020B0609020204030204" pitchFamily="49" charset="0"/>
-                <a:cs typeface="Consolas" panose="020B0609020204030204" pitchFamily="49" charset="0"/>
-              </a:rPr>
-              <a:t>Sunset: Thu, 31 Dec 2009 23:59:59 GMT</a:t>
-            </a:r>
-          </a:p>
-          <a:p>
-            <a:pPr marL="0" indent="0">
-              <a:spcBef>
-                <a:spcPts val="0"/>
-              </a:spcBef>
-              <a:buNone/>
-            </a:pPr>
-            <a:r>
-              <a:rPr lang="en-US" dirty="0">
-                <a:latin typeface="Consolas" panose="020B0609020204030204" pitchFamily="49" charset="0"/>
-                <a:cs typeface="Consolas" panose="020B0609020204030204" pitchFamily="49" charset="0"/>
-              </a:rPr>
-              <a:t>Content-Length: 51</a:t>
-            </a:r>
-          </a:p>
-          <a:p>
-            <a:pPr marL="0" indent="0">
-              <a:spcBef>
-                <a:spcPts val="0"/>
-              </a:spcBef>
-              <a:buNone/>
-            </a:pPr>
-            <a:r>
-              <a:rPr lang="en-US" dirty="0">
-                <a:latin typeface="Consolas" panose="020B0609020204030204" pitchFamily="49" charset="0"/>
-                <a:cs typeface="Consolas" panose="020B0609020204030204" pitchFamily="49" charset="0"/>
-              </a:rPr>
-              <a:t>Content-Type: text/plain</a:t>
+              <a:t>Sunset: Wed, 31 Dec 2025 23:59:59 GMT</a:t>
             </a:r>
           </a:p>
         </p:txBody>
@@ -13529,7 +13650,416 @@
               <a:rPr lang="en-US" sz="2800" cap="none" dirty="0">
                 <a:latin typeface="Ford Antenna Medium Cnd" panose="02000505000000020004" pitchFamily="2" charset="0"/>
               </a:rPr>
+              <a:t>Simple Example</a:t>
+            </a:r>
+          </a:p>
+        </p:txBody>
+      </p:sp>
+      <p:sp>
+        <p:nvSpPr>
+          <p:cNvPr id="10" name="Title 1">
+            <a:extLst>
+              <a:ext uri="{FF2B5EF4-FFF2-40B4-BE49-F238E27FC236}">
+                <a16:creationId xmlns:a16="http://schemas.microsoft.com/office/drawing/2014/main" id="{E491C0FE-985C-F748-9481-047B051D4B39}"/>
+              </a:ext>
+            </a:extLst>
+          </p:cNvPr>
+          <p:cNvSpPr txBox="1">
+            <a:spLocks/>
+          </p:cNvSpPr>
+          <p:nvPr/>
+        </p:nvSpPr>
+        <p:spPr>
+          <a:xfrm>
+            <a:off x="1192211" y="6284649"/>
+            <a:ext cx="2346856" cy="508000"/>
+          </a:xfrm>
+          <a:prstGeom prst="rect">
+            <a:avLst/>
+          </a:prstGeom>
+          <a:effectLst/>
+        </p:spPr>
+        <p:txBody>
+          <a:bodyPr vert="horz" lIns="91440" tIns="45720" rIns="91440" bIns="45720" rtlCol="0" anchor="b">
+            <a:normAutofit/>
+          </a:bodyPr>
+          <a:lstStyle>
+            <a:lvl1pPr algn="l" defTabSz="914400" rtl="0" eaLnBrk="1" latinLnBrk="0" hangingPunct="1">
+              <a:lnSpc>
+                <a:spcPct val="90000"/>
+              </a:lnSpc>
+              <a:spcBef>
+                <a:spcPct val="0"/>
+              </a:spcBef>
+              <a:buNone/>
+              <a:defRPr sz="4800" kern="1200" cap="all" baseline="0">
+                <a:solidFill>
+                  <a:schemeClr val="tx1"/>
+                </a:solidFill>
+                <a:latin typeface="+mj-lt"/>
+                <a:ea typeface="+mj-ea"/>
+                <a:cs typeface="+mj-cs"/>
+              </a:defRPr>
+            </a:lvl1pPr>
+          </a:lstStyle>
+          <a:p>
+            <a:r>
+              <a:rPr lang="en-US" sz="2400" i="1" cap="none" dirty="0">
+                <a:solidFill>
+                  <a:srgbClr val="48A8E3"/>
+                </a:solidFill>
+                <a:effectLst>
+                  <a:outerShdw blurRad="63500" dist="60484" dir="2700000" sx="100475" sy="100475" algn="tl" rotWithShape="0">
+                    <a:schemeClr val="bg2"/>
+                  </a:outerShdw>
+                </a:effectLst>
+                <a:latin typeface="Ford Antenna Thin XCnd" panose="02000505000000020004" pitchFamily="2" charset="0"/>
+              </a:rPr>
+              <a:t>HTTP API Building Blocks</a:t>
+            </a:r>
+          </a:p>
+        </p:txBody>
+      </p:sp>
+    </p:spTree>
+    <p:extLst>
+      <p:ext uri="{BB962C8B-B14F-4D97-AF65-F5344CB8AC3E}">
+        <p14:creationId xmlns:p14="http://schemas.microsoft.com/office/powerpoint/2010/main" val="1499967072"/>
+      </p:ext>
+    </p:extLst>
+  </p:cSld>
+  <p:clrMapOvr>
+    <a:masterClrMapping/>
+  </p:clrMapOvr>
+</p:sld>
+</file>
+
+<file path=ppt/slides/slide7.xml><?xml version="1.0" encoding="utf-8"?>
+<p:sld xmlns:a="http://schemas.openxmlformats.org/drawingml/2006/main" xmlns:r="http://schemas.openxmlformats.org/officeDocument/2006/relationships" xmlns:p="http://schemas.openxmlformats.org/presentationml/2006/main">
+  <p:cSld>
+    <p:spTree>
+      <p:nvGrpSpPr>
+        <p:cNvPr id="1" name=""/>
+        <p:cNvGrpSpPr/>
+        <p:nvPr/>
+      </p:nvGrpSpPr>
+      <p:grpSpPr>
+        <a:xfrm>
+          <a:off x="0" y="0"/>
+          <a:ext cx="0" cy="0"/>
+          <a:chOff x="0" y="0"/>
+          <a:chExt cx="0" cy="0"/>
+        </a:xfrm>
+      </p:grpSpPr>
+      <p:sp>
+        <p:nvSpPr>
+          <p:cNvPr id="3" name="Content Placeholder 2">
+            <a:extLst>
+              <a:ext uri="{FF2B5EF4-FFF2-40B4-BE49-F238E27FC236}">
+                <a16:creationId xmlns:a16="http://schemas.microsoft.com/office/drawing/2014/main" id="{17956A75-E2B2-0F45-9348-FCC5353B9806}"/>
+              </a:ext>
+            </a:extLst>
+          </p:cNvPr>
+          <p:cNvSpPr>
+            <a:spLocks noGrp="1"/>
+          </p:cNvSpPr>
+          <p:nvPr>
+            <p:ph idx="1"/>
+          </p:nvPr>
+        </p:nvSpPr>
+        <p:spPr>
+          <a:xfrm>
+            <a:off x="1344613" y="2445807"/>
+            <a:ext cx="9145586" cy="3081868"/>
+          </a:xfrm>
+        </p:spPr>
+        <p:txBody>
+          <a:bodyPr>
+            <a:normAutofit lnSpcReduction="10000"/>
+          </a:bodyPr>
+          <a:lstStyle/>
+          <a:p>
+            <a:pPr marL="0" indent="0">
+              <a:spcBef>
+                <a:spcPts val="0"/>
+              </a:spcBef>
+              <a:buNone/>
+            </a:pPr>
+            <a:r>
+              <a:rPr lang="en-US" dirty="0">
+                <a:latin typeface="Consolas" panose="020B0609020204030204" pitchFamily="49" charset="0"/>
+                <a:cs typeface="Consolas" panose="020B0609020204030204" pitchFamily="49" charset="0"/>
+              </a:rPr>
+              <a:t>HTTP/1.1 200 OK</a:t>
+            </a:r>
+          </a:p>
+          <a:p>
+            <a:pPr marL="0" indent="0">
+              <a:spcBef>
+                <a:spcPts val="0"/>
+              </a:spcBef>
+              <a:buNone/>
+            </a:pPr>
+            <a:r>
+              <a:rPr lang="en-US" dirty="0">
+                <a:latin typeface="Consolas" panose="020B0609020204030204" pitchFamily="49" charset="0"/>
+                <a:cs typeface="Consolas" panose="020B0609020204030204" pitchFamily="49" charset="0"/>
+              </a:rPr>
+              <a:t>Date: Mon, 27 Jul 2009 12:28:53 GMT</a:t>
+            </a:r>
+          </a:p>
+          <a:p>
+            <a:pPr marL="0" indent="0">
+              <a:spcBef>
+                <a:spcPts val="0"/>
+              </a:spcBef>
+              <a:buNone/>
+            </a:pPr>
+            <a:r>
+              <a:rPr lang="en-US" dirty="0">
+                <a:latin typeface="Consolas" panose="020B0609020204030204" pitchFamily="49" charset="0"/>
+                <a:cs typeface="Consolas" panose="020B0609020204030204" pitchFamily="49" charset="0"/>
+              </a:rPr>
+              <a:t>Server: Apache</a:t>
+            </a:r>
+          </a:p>
+          <a:p>
+            <a:pPr marL="0" indent="0">
+              <a:spcBef>
+                <a:spcPts val="0"/>
+              </a:spcBef>
+              <a:buNone/>
+            </a:pPr>
+            <a:r>
+              <a:rPr lang="en-US" dirty="0">
+                <a:latin typeface="Consolas" panose="020B0609020204030204" pitchFamily="49" charset="0"/>
+                <a:cs typeface="Consolas" panose="020B0609020204030204" pitchFamily="49" charset="0"/>
+              </a:rPr>
+              <a:t>Last-Modified: Wed, 22 Jul 2009 19:15:56 GMT</a:t>
+            </a:r>
+          </a:p>
+          <a:p>
+            <a:pPr marL="0" indent="0">
+              <a:spcBef>
+                <a:spcPts val="0"/>
+              </a:spcBef>
+              <a:buNone/>
+            </a:pPr>
+            <a:r>
+              <a:rPr lang="en-US" dirty="0">
+                <a:latin typeface="Consolas" panose="020B0609020204030204" pitchFamily="49" charset="0"/>
+                <a:cs typeface="Consolas" panose="020B0609020204030204" pitchFamily="49" charset="0"/>
+              </a:rPr>
+              <a:t>Sunset: Thu, 31 Dec 2009 23:59:59 GMT</a:t>
+            </a:r>
+          </a:p>
+          <a:p>
+            <a:pPr marL="0" indent="0">
+              <a:spcBef>
+                <a:spcPts val="0"/>
+              </a:spcBef>
+              <a:buNone/>
+            </a:pPr>
+            <a:r>
+              <a:rPr lang="en-US" dirty="0">
+                <a:latin typeface="Consolas" panose="020B0609020204030204" pitchFamily="49" charset="0"/>
+                <a:cs typeface="Consolas" panose="020B0609020204030204" pitchFamily="49" charset="0"/>
+              </a:rPr>
+              <a:t>Content-Length: 51</a:t>
+            </a:r>
+          </a:p>
+          <a:p>
+            <a:pPr marL="0" indent="0">
+              <a:spcBef>
+                <a:spcPts val="0"/>
+              </a:spcBef>
+              <a:buNone/>
+            </a:pPr>
+            <a:r>
+              <a:rPr lang="en-US" dirty="0">
+                <a:latin typeface="Consolas" panose="020B0609020204030204" pitchFamily="49" charset="0"/>
+                <a:cs typeface="Consolas" panose="020B0609020204030204" pitchFamily="49" charset="0"/>
+              </a:rPr>
+              <a:t>Content-Type: text/plain</a:t>
+            </a:r>
+          </a:p>
+        </p:txBody>
+      </p:sp>
+      <p:sp>
+        <p:nvSpPr>
+          <p:cNvPr id="6" name="Title 1">
+            <a:extLst>
+              <a:ext uri="{FF2B5EF4-FFF2-40B4-BE49-F238E27FC236}">
+                <a16:creationId xmlns:a16="http://schemas.microsoft.com/office/drawing/2014/main" id="{4D0CE8EE-FF7C-AF4D-B6BF-D600E6EA4B66}"/>
+              </a:ext>
+            </a:extLst>
+          </p:cNvPr>
+          <p:cNvSpPr txBox="1">
+            <a:spLocks/>
+          </p:cNvSpPr>
+          <p:nvPr/>
+        </p:nvSpPr>
+        <p:spPr>
+          <a:xfrm>
+            <a:off x="1698623" y="607218"/>
+            <a:ext cx="8791575" cy="919162"/>
+          </a:xfrm>
+          <a:prstGeom prst="rect">
+            <a:avLst/>
+          </a:prstGeom>
+        </p:spPr>
+        <p:txBody>
+          <a:bodyPr vert="horz" lIns="91440" tIns="45720" rIns="91440" bIns="45720" rtlCol="0" anchor="ctr">
+            <a:normAutofit/>
+          </a:bodyPr>
+          <a:lstStyle>
+            <a:lvl1pPr algn="l" defTabSz="914400" rtl="0" eaLnBrk="1" latinLnBrk="0" hangingPunct="1">
+              <a:lnSpc>
+                <a:spcPct val="90000"/>
+              </a:lnSpc>
+              <a:spcBef>
+                <a:spcPct val="0"/>
+              </a:spcBef>
+              <a:buNone/>
+              <a:defRPr sz="3600" kern="1200" cap="all" baseline="0">
+                <a:solidFill>
+                  <a:schemeClr val="tx1"/>
+                </a:solidFill>
+                <a:latin typeface="+mj-lt"/>
+                <a:ea typeface="+mj-ea"/>
+                <a:cs typeface="+mj-cs"/>
+              </a:defRPr>
+            </a:lvl1pPr>
+          </a:lstStyle>
+          <a:p>
+            <a:r>
+              <a:rPr lang="en-US" cap="none" dirty="0">
+                <a:solidFill>
+                  <a:schemeClr val="bg2"/>
+                </a:solidFill>
+                <a:latin typeface="Ford Antenna Medium Cnd" panose="02000505000000020004" pitchFamily="2" charset="0"/>
+              </a:rPr>
+              <a:t>The Sunset HTTP Header Field</a:t>
+            </a:r>
+          </a:p>
+        </p:txBody>
+      </p:sp>
+      <p:sp>
+        <p:nvSpPr>
+          <p:cNvPr id="7" name="Title 1">
+            <a:extLst>
+              <a:ext uri="{FF2B5EF4-FFF2-40B4-BE49-F238E27FC236}">
+                <a16:creationId xmlns:a16="http://schemas.microsoft.com/office/drawing/2014/main" id="{924EB63B-9391-8F4A-A2B2-162C9716D18E}"/>
+              </a:ext>
+            </a:extLst>
+          </p:cNvPr>
+          <p:cNvSpPr txBox="1">
+            <a:spLocks/>
+          </p:cNvSpPr>
+          <p:nvPr/>
+        </p:nvSpPr>
+        <p:spPr>
+          <a:xfrm>
+            <a:off x="1698623" y="1330325"/>
+            <a:ext cx="8791575" cy="919162"/>
+          </a:xfrm>
+          <a:prstGeom prst="rect">
+            <a:avLst/>
+          </a:prstGeom>
+        </p:spPr>
+        <p:txBody>
+          <a:bodyPr vert="horz" lIns="91440" tIns="45720" rIns="91440" bIns="45720" rtlCol="0" anchor="ctr">
+            <a:normAutofit/>
+          </a:bodyPr>
+          <a:lstStyle>
+            <a:lvl1pPr algn="l" defTabSz="914400" rtl="0" eaLnBrk="1" latinLnBrk="0" hangingPunct="1">
+              <a:lnSpc>
+                <a:spcPct val="90000"/>
+              </a:lnSpc>
+              <a:spcBef>
+                <a:spcPct val="0"/>
+              </a:spcBef>
+              <a:buNone/>
+              <a:defRPr sz="3600" kern="1200" cap="all" baseline="0">
+                <a:solidFill>
+                  <a:schemeClr val="tx1"/>
+                </a:solidFill>
+                <a:latin typeface="+mj-lt"/>
+                <a:ea typeface="+mj-ea"/>
+                <a:cs typeface="+mj-cs"/>
+              </a:defRPr>
+            </a:lvl1pPr>
+          </a:lstStyle>
+          <a:p>
+            <a:r>
+              <a:rPr lang="en-US" sz="2800" cap="none" dirty="0">
+                <a:latin typeface="Ford Antenna Medium Cnd" panose="02000505000000020004" pitchFamily="2" charset="0"/>
+              </a:rPr>
               <a:t>Example in Context</a:t>
+            </a:r>
+          </a:p>
+        </p:txBody>
+      </p:sp>
+      <p:sp>
+        <p:nvSpPr>
+          <p:cNvPr id="5" name="Title 1">
+            <a:extLst>
+              <a:ext uri="{FF2B5EF4-FFF2-40B4-BE49-F238E27FC236}">
+                <a16:creationId xmlns:a16="http://schemas.microsoft.com/office/drawing/2014/main" id="{32F1B9D1-24A1-6447-9FB7-02AF7869A49F}"/>
+              </a:ext>
+            </a:extLst>
+          </p:cNvPr>
+          <p:cNvSpPr txBox="1">
+            <a:spLocks/>
+          </p:cNvSpPr>
+          <p:nvPr/>
+        </p:nvSpPr>
+        <p:spPr>
+          <a:xfrm>
+            <a:off x="1192211" y="6284649"/>
+            <a:ext cx="2346856" cy="508000"/>
+          </a:xfrm>
+          <a:prstGeom prst="rect">
+            <a:avLst/>
+          </a:prstGeom>
+          <a:effectLst/>
+        </p:spPr>
+        <p:txBody>
+          <a:bodyPr vert="horz" lIns="91440" tIns="45720" rIns="91440" bIns="45720" rtlCol="0" anchor="b">
+            <a:normAutofit/>
+          </a:bodyPr>
+          <a:lstStyle>
+            <a:lvl1pPr algn="l" defTabSz="914400" rtl="0" eaLnBrk="1" latinLnBrk="0" hangingPunct="1">
+              <a:lnSpc>
+                <a:spcPct val="90000"/>
+              </a:lnSpc>
+              <a:spcBef>
+                <a:spcPct val="0"/>
+              </a:spcBef>
+              <a:buNone/>
+              <a:defRPr sz="4800" kern="1200" cap="all" baseline="0">
+                <a:solidFill>
+                  <a:schemeClr val="tx1"/>
+                </a:solidFill>
+                <a:latin typeface="+mj-lt"/>
+                <a:ea typeface="+mj-ea"/>
+                <a:cs typeface="+mj-cs"/>
+              </a:defRPr>
+            </a:lvl1pPr>
+          </a:lstStyle>
+          <a:p>
+            <a:r>
+              <a:rPr lang="en-US" sz="2400" i="1" cap="none" dirty="0">
+                <a:solidFill>
+                  <a:srgbClr val="48A8E3"/>
+                </a:solidFill>
+                <a:effectLst>
+                  <a:outerShdw blurRad="63500" dist="60484" dir="2700000" sx="100475" sy="100475" algn="tl" rotWithShape="0">
+                    <a:schemeClr val="bg2"/>
+                  </a:outerShdw>
+                </a:effectLst>
+                <a:latin typeface="Ford Antenna Thin XCnd" panose="02000505000000020004" pitchFamily="2" charset="0"/>
+              </a:rPr>
+              <a:t>HTTP API Building Blocks</a:t>
             </a:r>
           </a:p>
         </p:txBody>

</xml_diff>

<commit_message>
renaming "description" to "why"
</commit_message>
<xml_diff>
--- a/assets/slides/rfc8594.pptx
+++ b/assets/slides/rfc8594.pptx
@@ -110,6 +110,11 @@
       </a:defRPr>
     </a:lvl9pPr>
   </p:defaultTextStyle>
+  <p:extLst>
+    <p:ext uri="{EFAFB233-063F-42B5-8137-9DF3F51BA10A}">
+      <p15:sldGuideLst xmlns:p15="http://schemas.microsoft.com/office/powerpoint/2012/main"/>
+    </p:ext>
+  </p:extLst>
 </p:presentation>
 </file>
 
@@ -163,7 +168,7 @@
           <a:noFill/>
           <a:extLst>
             <a:ext uri="{909E8E84-426E-40dd-AFC4-6F175D3DCCD1}">
-              <a14:hiddenFill xmlns:a14="http://schemas.microsoft.com/office/drawing/2010/main" xmlns="">
+              <a14:hiddenFill xmlns="" xmlns:a14="http://schemas.microsoft.com/office/drawing/2010/main">
                 <a:solidFill>
                   <a:srgbClr val="FFFFFF"/>
                 </a:solidFill>
@@ -223,7 +228,7 @@
             </a:ln>
             <a:extLst>
               <a:ext uri="{91240B29-F687-4f45-9708-019B960494DF}">
-                <a14:hiddenLine xmlns:a14="http://schemas.microsoft.com/office/drawing/2010/main" xmlns="" w="9525">
+                <a14:hiddenLine xmlns="" xmlns:a14="http://schemas.microsoft.com/office/drawing/2010/main" w="9525">
                   <a:solidFill>
                     <a:srgbClr val="000000"/>
                   </a:solidFill>
@@ -313,7 +318,7 @@
             </a:ln>
             <a:extLst>
               <a:ext uri="{91240B29-F687-4f45-9708-019B960494DF}">
-                <a14:hiddenLine xmlns:a14="http://schemas.microsoft.com/office/drawing/2010/main" xmlns="" w="9525">
+                <a14:hiddenLine xmlns="" xmlns:a14="http://schemas.microsoft.com/office/drawing/2010/main" w="9525">
                   <a:solidFill>
                     <a:srgbClr val="000000"/>
                   </a:solidFill>
@@ -403,7 +408,7 @@
             </a:ln>
             <a:extLst>
               <a:ext uri="{91240B29-F687-4f45-9708-019B960494DF}">
-                <a14:hiddenLine xmlns:a14="http://schemas.microsoft.com/office/drawing/2010/main" xmlns="" w="9525">
+                <a14:hiddenLine xmlns="" xmlns:a14="http://schemas.microsoft.com/office/drawing/2010/main" w="9525">
                   <a:solidFill>
                     <a:srgbClr val="000000"/>
                   </a:solidFill>
@@ -437,7 +442,7 @@
             </a:ln>
             <a:extLst>
               <a:ext uri="{91240B29-F687-4f45-9708-019B960494DF}">
-                <a14:hiddenLine xmlns:a14="http://schemas.microsoft.com/office/drawing/2010/main" xmlns="" w="9525">
+                <a14:hiddenLine xmlns="" xmlns:a14="http://schemas.microsoft.com/office/drawing/2010/main" w="9525">
                   <a:solidFill>
                     <a:srgbClr val="000000"/>
                   </a:solidFill>
@@ -527,7 +532,7 @@
             </a:ln>
             <a:extLst>
               <a:ext uri="{91240B29-F687-4f45-9708-019B960494DF}">
-                <a14:hiddenLine xmlns:a14="http://schemas.microsoft.com/office/drawing/2010/main" xmlns="" w="9525">
+                <a14:hiddenLine xmlns="" xmlns:a14="http://schemas.microsoft.com/office/drawing/2010/main" w="9525">
                   <a:solidFill>
                     <a:srgbClr val="000000"/>
                   </a:solidFill>
@@ -589,7 +594,7 @@
             </a:ln>
             <a:extLst>
               <a:ext uri="{91240B29-F687-4f45-9708-019B960494DF}">
-                <a14:hiddenLine xmlns:a14="http://schemas.microsoft.com/office/drawing/2010/main" xmlns="" w="9525">
+                <a14:hiddenLine xmlns="" xmlns:a14="http://schemas.microsoft.com/office/drawing/2010/main" w="9525">
                   <a:solidFill>
                     <a:srgbClr val="000000"/>
                   </a:solidFill>
@@ -651,7 +656,7 @@
             </a:ln>
             <a:extLst>
               <a:ext uri="{91240B29-F687-4f45-9708-019B960494DF}">
-                <a14:hiddenLine xmlns:a14="http://schemas.microsoft.com/office/drawing/2010/main" xmlns="" w="9525">
+                <a14:hiddenLine xmlns="" xmlns:a14="http://schemas.microsoft.com/office/drawing/2010/main" w="9525">
                   <a:solidFill>
                     <a:srgbClr val="000000"/>
                   </a:solidFill>
@@ -741,7 +746,7 @@
             </a:ln>
             <a:extLst>
               <a:ext uri="{91240B29-F687-4f45-9708-019B960494DF}">
-                <a14:hiddenLine xmlns:a14="http://schemas.microsoft.com/office/drawing/2010/main" xmlns="" w="9525">
+                <a14:hiddenLine xmlns="" xmlns:a14="http://schemas.microsoft.com/office/drawing/2010/main" w="9525">
                   <a:solidFill>
                     <a:srgbClr val="000000"/>
                   </a:solidFill>
@@ -803,7 +808,7 @@
             </a:ln>
             <a:extLst>
               <a:ext uri="{91240B29-F687-4f45-9708-019B960494DF}">
-                <a14:hiddenLine xmlns:a14="http://schemas.microsoft.com/office/drawing/2010/main" xmlns="" w="9525">
+                <a14:hiddenLine xmlns="" xmlns:a14="http://schemas.microsoft.com/office/drawing/2010/main" w="9525">
                   <a:solidFill>
                     <a:srgbClr val="000000"/>
                   </a:solidFill>
@@ -865,7 +870,7 @@
             </a:ln>
             <a:extLst>
               <a:ext uri="{91240B29-F687-4f45-9708-019B960494DF}">
-                <a14:hiddenLine xmlns:a14="http://schemas.microsoft.com/office/drawing/2010/main" xmlns="" w="9525">
+                <a14:hiddenLine xmlns="" xmlns:a14="http://schemas.microsoft.com/office/drawing/2010/main" w="9525">
                   <a:solidFill>
                     <a:srgbClr val="000000"/>
                   </a:solidFill>
@@ -955,7 +960,7 @@
             </a:ln>
             <a:extLst>
               <a:ext uri="{91240B29-F687-4f45-9708-019B960494DF}">
-                <a14:hiddenLine xmlns:a14="http://schemas.microsoft.com/office/drawing/2010/main" xmlns="" w="9525">
+                <a14:hiddenLine xmlns="" xmlns:a14="http://schemas.microsoft.com/office/drawing/2010/main" w="9525">
                   <a:solidFill>
                     <a:srgbClr val="000000"/>
                   </a:solidFill>
@@ -1045,7 +1050,7 @@
             </a:ln>
             <a:extLst>
               <a:ext uri="{91240B29-F687-4f45-9708-019B960494DF}">
-                <a14:hiddenLine xmlns:a14="http://schemas.microsoft.com/office/drawing/2010/main" xmlns="" w="9525">
+                <a14:hiddenLine xmlns="" xmlns:a14="http://schemas.microsoft.com/office/drawing/2010/main" w="9525">
                   <a:solidFill>
                     <a:srgbClr val="000000"/>
                   </a:solidFill>
@@ -1107,7 +1112,7 @@
             </a:ln>
             <a:extLst>
               <a:ext uri="{91240B29-F687-4f45-9708-019B960494DF}">
-                <a14:hiddenLine xmlns:a14="http://schemas.microsoft.com/office/drawing/2010/main" xmlns="" w="9525">
+                <a14:hiddenLine xmlns="" xmlns:a14="http://schemas.microsoft.com/office/drawing/2010/main" w="9525">
                   <a:solidFill>
                     <a:srgbClr val="000000"/>
                   </a:solidFill>
@@ -1217,7 +1222,7 @@
             </a:ln>
             <a:extLst>
               <a:ext uri="{91240B29-F687-4f45-9708-019B960494DF}">
-                <a14:hiddenLine xmlns:a14="http://schemas.microsoft.com/office/drawing/2010/main" xmlns="" w="9525">
+                <a14:hiddenLine xmlns="" xmlns:a14="http://schemas.microsoft.com/office/drawing/2010/main" w="9525">
                   <a:solidFill>
                     <a:srgbClr val="000000"/>
                   </a:solidFill>
@@ -1279,7 +1284,7 @@
             </a:ln>
             <a:extLst>
               <a:ext uri="{91240B29-F687-4f45-9708-019B960494DF}">
-                <a14:hiddenLine xmlns:a14="http://schemas.microsoft.com/office/drawing/2010/main" xmlns="" w="9525">
+                <a14:hiddenLine xmlns="" xmlns:a14="http://schemas.microsoft.com/office/drawing/2010/main" w="9525">
                   <a:solidFill>
                     <a:srgbClr val="000000"/>
                   </a:solidFill>
@@ -1369,7 +1374,7 @@
             </a:ln>
             <a:extLst>
               <a:ext uri="{91240B29-F687-4f45-9708-019B960494DF}">
-                <a14:hiddenLine xmlns:a14="http://schemas.microsoft.com/office/drawing/2010/main" xmlns="" w="9525">
+                <a14:hiddenLine xmlns="" xmlns:a14="http://schemas.microsoft.com/office/drawing/2010/main" w="9525">
                   <a:solidFill>
                     <a:srgbClr val="000000"/>
                   </a:solidFill>
@@ -1459,7 +1464,7 @@
             </a:ln>
             <a:extLst>
               <a:ext uri="{91240B29-F687-4f45-9708-019B960494DF}">
-                <a14:hiddenLine xmlns:a14="http://schemas.microsoft.com/office/drawing/2010/main" xmlns="" w="9525">
+                <a14:hiddenLine xmlns="" xmlns:a14="http://schemas.microsoft.com/office/drawing/2010/main" w="9525">
                   <a:solidFill>
                     <a:srgbClr val="000000"/>
                   </a:solidFill>
@@ -1521,7 +1526,7 @@
             </a:ln>
             <a:extLst>
               <a:ext uri="{91240B29-F687-4f45-9708-019B960494DF}">
-                <a14:hiddenLine xmlns:a14="http://schemas.microsoft.com/office/drawing/2010/main" xmlns="" w="9525">
+                <a14:hiddenLine xmlns="" xmlns:a14="http://schemas.microsoft.com/office/drawing/2010/main" w="9525">
                   <a:solidFill>
                     <a:srgbClr val="000000"/>
                   </a:solidFill>
@@ -1611,7 +1616,7 @@
             </a:ln>
             <a:extLst>
               <a:ext uri="{91240B29-F687-4f45-9708-019B960494DF}">
-                <a14:hiddenLine xmlns:a14="http://schemas.microsoft.com/office/drawing/2010/main" xmlns="" w="9525">
+                <a14:hiddenLine xmlns="" xmlns:a14="http://schemas.microsoft.com/office/drawing/2010/main" w="9525">
                   <a:solidFill>
                     <a:srgbClr val="000000"/>
                   </a:solidFill>
@@ -1701,7 +1706,7 @@
             </a:ln>
             <a:extLst>
               <a:ext uri="{91240B29-F687-4f45-9708-019B960494DF}">
-                <a14:hiddenLine xmlns:a14="http://schemas.microsoft.com/office/drawing/2010/main" xmlns="" w="9525">
+                <a14:hiddenLine xmlns="" xmlns:a14="http://schemas.microsoft.com/office/drawing/2010/main" w="9525">
                   <a:solidFill>
                     <a:srgbClr val="000000"/>
                   </a:solidFill>
@@ -1757,7 +1762,7 @@
             </a:ln>
             <a:extLst>
               <a:ext uri="{91240B29-F687-4f45-9708-019B960494DF}">
-                <a14:hiddenLine xmlns:a14="http://schemas.microsoft.com/office/drawing/2010/main" xmlns="" w="9525">
+                <a14:hiddenLine xmlns="" xmlns:a14="http://schemas.microsoft.com/office/drawing/2010/main" w="9525">
                   <a:solidFill>
                     <a:srgbClr val="000000"/>
                   </a:solidFill>
@@ -1847,7 +1852,7 @@
             </a:ln>
             <a:extLst>
               <a:ext uri="{91240B29-F687-4f45-9708-019B960494DF}">
-                <a14:hiddenLine xmlns:a14="http://schemas.microsoft.com/office/drawing/2010/main" xmlns="" w="9525">
+                <a14:hiddenLine xmlns="" xmlns:a14="http://schemas.microsoft.com/office/drawing/2010/main" w="9525">
                   <a:solidFill>
                     <a:srgbClr val="000000"/>
                   </a:solidFill>
@@ -1903,7 +1908,7 @@
             </a:ln>
             <a:extLst>
               <a:ext uri="{91240B29-F687-4f45-9708-019B960494DF}">
-                <a14:hiddenLine xmlns:a14="http://schemas.microsoft.com/office/drawing/2010/main" xmlns="" w="9525">
+                <a14:hiddenLine xmlns="" xmlns:a14="http://schemas.microsoft.com/office/drawing/2010/main" w="9525">
                   <a:solidFill>
                     <a:srgbClr val="000000"/>
                   </a:solidFill>
@@ -1993,7 +1998,7 @@
             </a:ln>
             <a:extLst>
               <a:ext uri="{91240B29-F687-4f45-9708-019B960494DF}">
-                <a14:hiddenLine xmlns:a14="http://schemas.microsoft.com/office/drawing/2010/main" xmlns="" w="9525">
+                <a14:hiddenLine xmlns="" xmlns:a14="http://schemas.microsoft.com/office/drawing/2010/main" w="9525">
                   <a:solidFill>
                     <a:srgbClr val="000000"/>
                   </a:solidFill>
@@ -2061,7 +2066,7 @@
             </a:ln>
             <a:extLst>
               <a:ext uri="{91240B29-F687-4f45-9708-019B960494DF}">
-                <a14:hiddenLine xmlns:a14="http://schemas.microsoft.com/office/drawing/2010/main" xmlns="" w="9525">
+                <a14:hiddenLine xmlns="" xmlns:a14="http://schemas.microsoft.com/office/drawing/2010/main" w="9525">
                   <a:solidFill>
                     <a:srgbClr val="000000"/>
                   </a:solidFill>
@@ -2151,7 +2156,7 @@
             </a:ln>
             <a:extLst>
               <a:ext uri="{91240B29-F687-4f45-9708-019B960494DF}">
-                <a14:hiddenLine xmlns:a14="http://schemas.microsoft.com/office/drawing/2010/main" xmlns="" w="9525">
+                <a14:hiddenLine xmlns="" xmlns:a14="http://schemas.microsoft.com/office/drawing/2010/main" w="9525">
                   <a:solidFill>
                     <a:srgbClr val="000000"/>
                   </a:solidFill>
@@ -2219,7 +2224,7 @@
             </a:ln>
             <a:extLst>
               <a:ext uri="{91240B29-F687-4f45-9708-019B960494DF}">
-                <a14:hiddenLine xmlns:a14="http://schemas.microsoft.com/office/drawing/2010/main" xmlns="" w="9525">
+                <a14:hiddenLine xmlns="" xmlns:a14="http://schemas.microsoft.com/office/drawing/2010/main" w="9525">
                   <a:solidFill>
                     <a:srgbClr val="000000"/>
                   </a:solidFill>
@@ -2309,7 +2314,7 @@
             </a:ln>
             <a:extLst>
               <a:ext uri="{91240B29-F687-4f45-9708-019B960494DF}">
-                <a14:hiddenLine xmlns:a14="http://schemas.microsoft.com/office/drawing/2010/main" xmlns="" w="9525">
+                <a14:hiddenLine xmlns="" xmlns:a14="http://schemas.microsoft.com/office/drawing/2010/main" w="9525">
                   <a:solidFill>
                     <a:srgbClr val="000000"/>
                   </a:solidFill>
@@ -2343,7 +2348,7 @@
             </a:ln>
             <a:extLst>
               <a:ext uri="{91240B29-F687-4f45-9708-019B960494DF}">
-                <a14:hiddenLine xmlns:a14="http://schemas.microsoft.com/office/drawing/2010/main" xmlns="" w="9525">
+                <a14:hiddenLine xmlns="" xmlns:a14="http://schemas.microsoft.com/office/drawing/2010/main" w="9525">
                   <a:solidFill>
                     <a:srgbClr val="000000"/>
                   </a:solidFill>
@@ -2433,7 +2438,7 @@
             </a:ln>
             <a:extLst>
               <a:ext uri="{91240B29-F687-4f45-9708-019B960494DF}">
-                <a14:hiddenLine xmlns:a14="http://schemas.microsoft.com/office/drawing/2010/main" xmlns="" w="9525">
+                <a14:hiddenLine xmlns="" xmlns:a14="http://schemas.microsoft.com/office/drawing/2010/main" w="9525">
                   <a:solidFill>
                     <a:srgbClr val="000000"/>
                   </a:solidFill>
@@ -2495,7 +2500,7 @@
             </a:ln>
             <a:extLst>
               <a:ext uri="{91240B29-F687-4f45-9708-019B960494DF}">
-                <a14:hiddenLine xmlns:a14="http://schemas.microsoft.com/office/drawing/2010/main" xmlns="" w="9525">
+                <a14:hiddenLine xmlns="" xmlns:a14="http://schemas.microsoft.com/office/drawing/2010/main" w="9525">
                   <a:solidFill>
                     <a:srgbClr val="000000"/>
                   </a:solidFill>
@@ -2557,7 +2562,7 @@
             </a:ln>
             <a:extLst>
               <a:ext uri="{91240B29-F687-4f45-9708-019B960494DF}">
-                <a14:hiddenLine xmlns:a14="http://schemas.microsoft.com/office/drawing/2010/main" xmlns="" w="9525">
+                <a14:hiddenLine xmlns="" xmlns:a14="http://schemas.microsoft.com/office/drawing/2010/main" w="9525">
                   <a:solidFill>
                     <a:srgbClr val="000000"/>
                   </a:solidFill>
@@ -2647,7 +2652,7 @@
             </a:ln>
             <a:extLst>
               <a:ext uri="{91240B29-F687-4f45-9708-019B960494DF}">
-                <a14:hiddenLine xmlns:a14="http://schemas.microsoft.com/office/drawing/2010/main" xmlns="" w="9525">
+                <a14:hiddenLine xmlns="" xmlns:a14="http://schemas.microsoft.com/office/drawing/2010/main" w="9525">
                   <a:solidFill>
                     <a:srgbClr val="000000"/>
                   </a:solidFill>
@@ -2715,7 +2720,7 @@
             </a:ln>
             <a:extLst>
               <a:ext uri="{91240B29-F687-4f45-9708-019B960494DF}">
-                <a14:hiddenLine xmlns:a14="http://schemas.microsoft.com/office/drawing/2010/main" xmlns="" w="9525">
+                <a14:hiddenLine xmlns="" xmlns:a14="http://schemas.microsoft.com/office/drawing/2010/main" w="9525">
                   <a:solidFill>
                     <a:srgbClr val="000000"/>
                   </a:solidFill>
@@ -2777,7 +2782,7 @@
             </a:ln>
             <a:extLst>
               <a:ext uri="{91240B29-F687-4f45-9708-019B960494DF}">
-                <a14:hiddenLine xmlns:a14="http://schemas.microsoft.com/office/drawing/2010/main" xmlns="" w="9525">
+                <a14:hiddenLine xmlns="" xmlns:a14="http://schemas.microsoft.com/office/drawing/2010/main" w="9525">
                   <a:solidFill>
                     <a:srgbClr val="000000"/>
                   </a:solidFill>
@@ -2867,7 +2872,7 @@
             </a:ln>
             <a:extLst>
               <a:ext uri="{91240B29-F687-4f45-9708-019B960494DF}">
-                <a14:hiddenLine xmlns:a14="http://schemas.microsoft.com/office/drawing/2010/main" xmlns="" w="9525">
+                <a14:hiddenLine xmlns="" xmlns:a14="http://schemas.microsoft.com/office/drawing/2010/main" w="9525">
                   <a:solidFill>
                     <a:srgbClr val="000000"/>
                   </a:solidFill>
@@ -2929,7 +2934,7 @@
             </a:ln>
             <a:extLst>
               <a:ext uri="{91240B29-F687-4f45-9708-019B960494DF}">
-                <a14:hiddenLine xmlns:a14="http://schemas.microsoft.com/office/drawing/2010/main" xmlns="" w="9525">
+                <a14:hiddenLine xmlns="" xmlns:a14="http://schemas.microsoft.com/office/drawing/2010/main" w="9525">
                   <a:solidFill>
                     <a:srgbClr val="000000"/>
                   </a:solidFill>
@@ -3019,7 +3024,7 @@
             </a:ln>
             <a:extLst>
               <a:ext uri="{91240B29-F687-4f45-9708-019B960494DF}">
-                <a14:hiddenLine xmlns:a14="http://schemas.microsoft.com/office/drawing/2010/main" xmlns="" w="9525">
+                <a14:hiddenLine xmlns="" xmlns:a14="http://schemas.microsoft.com/office/drawing/2010/main" w="9525">
                   <a:solidFill>
                     <a:srgbClr val="000000"/>
                   </a:solidFill>
@@ -3081,7 +3086,7 @@
             </a:ln>
             <a:extLst>
               <a:ext uri="{91240B29-F687-4f45-9708-019B960494DF}">
-                <a14:hiddenLine xmlns:a14="http://schemas.microsoft.com/office/drawing/2010/main" xmlns="" w="9525">
+                <a14:hiddenLine xmlns="" xmlns:a14="http://schemas.microsoft.com/office/drawing/2010/main" w="9525">
                   <a:solidFill>
                     <a:srgbClr val="000000"/>
                   </a:solidFill>
@@ -3171,7 +3176,7 @@
             </a:ln>
             <a:extLst>
               <a:ext uri="{91240B29-F687-4f45-9708-019B960494DF}">
-                <a14:hiddenLine xmlns:a14="http://schemas.microsoft.com/office/drawing/2010/main" xmlns="" w="9525">
+                <a14:hiddenLine xmlns="" xmlns:a14="http://schemas.microsoft.com/office/drawing/2010/main" w="9525">
                   <a:solidFill>
                     <a:srgbClr val="000000"/>
                   </a:solidFill>
@@ -3205,7 +3210,7 @@
             </a:ln>
             <a:extLst>
               <a:ext uri="{91240B29-F687-4f45-9708-019B960494DF}">
-                <a14:hiddenLine xmlns:a14="http://schemas.microsoft.com/office/drawing/2010/main" xmlns="" w="9525">
+                <a14:hiddenLine xmlns="" xmlns:a14="http://schemas.microsoft.com/office/drawing/2010/main" w="9525">
                   <a:solidFill>
                     <a:srgbClr val="000000"/>
                   </a:solidFill>
@@ -3270,7 +3275,7 @@
             </a:ln>
             <a:extLst>
               <a:ext uri="{91240B29-F687-4f45-9708-019B960494DF}">
-                <a14:hiddenLine xmlns:a14="http://schemas.microsoft.com/office/drawing/2010/main" xmlns="" w="9525">
+                <a14:hiddenLine xmlns="" xmlns:a14="http://schemas.microsoft.com/office/drawing/2010/main" w="9525">
                   <a:solidFill>
                     <a:srgbClr val="000000"/>
                   </a:solidFill>
@@ -3360,7 +3365,7 @@
             </a:ln>
             <a:extLst>
               <a:ext uri="{91240B29-F687-4f45-9708-019B960494DF}">
-                <a14:hiddenLine xmlns:a14="http://schemas.microsoft.com/office/drawing/2010/main" xmlns="" w="9525">
+                <a14:hiddenLine xmlns="" xmlns:a14="http://schemas.microsoft.com/office/drawing/2010/main" w="9525">
                   <a:solidFill>
                     <a:srgbClr val="000000"/>
                   </a:solidFill>
@@ -3422,7 +3427,7 @@
             </a:ln>
             <a:extLst>
               <a:ext uri="{91240B29-F687-4f45-9708-019B960494DF}">
-                <a14:hiddenLine xmlns:a14="http://schemas.microsoft.com/office/drawing/2010/main" xmlns="" w="9525">
+                <a14:hiddenLine xmlns="" xmlns:a14="http://schemas.microsoft.com/office/drawing/2010/main" w="9525">
                   <a:solidFill>
                     <a:srgbClr val="000000"/>
                   </a:solidFill>
@@ -3512,7 +3517,7 @@
             </a:ln>
             <a:extLst>
               <a:ext uri="{91240B29-F687-4f45-9708-019B960494DF}">
-                <a14:hiddenLine xmlns:a14="http://schemas.microsoft.com/office/drawing/2010/main" xmlns="" w="9525">
+                <a14:hiddenLine xmlns="" xmlns:a14="http://schemas.microsoft.com/office/drawing/2010/main" w="9525">
                   <a:solidFill>
                     <a:srgbClr val="000000"/>
                   </a:solidFill>
@@ -3602,7 +3607,7 @@
             </a:ln>
             <a:extLst>
               <a:ext uri="{91240B29-F687-4f45-9708-019B960494DF}">
-                <a14:hiddenLine xmlns:a14="http://schemas.microsoft.com/office/drawing/2010/main" xmlns="" w="9525">
+                <a14:hiddenLine xmlns="" xmlns:a14="http://schemas.microsoft.com/office/drawing/2010/main" w="9525">
                   <a:solidFill>
                     <a:srgbClr val="000000"/>
                   </a:solidFill>
@@ -3667,7 +3672,7 @@
             </a:ln>
             <a:extLst>
               <a:ext uri="{91240B29-F687-4f45-9708-019B960494DF}">
-                <a14:hiddenLine xmlns:a14="http://schemas.microsoft.com/office/drawing/2010/main" xmlns="" w="9525">
+                <a14:hiddenLine xmlns="" xmlns:a14="http://schemas.microsoft.com/office/drawing/2010/main" w="9525">
                   <a:solidFill>
                     <a:srgbClr val="000000"/>
                   </a:solidFill>
@@ -3729,7 +3734,7 @@
             </a:ln>
             <a:extLst>
               <a:ext uri="{91240B29-F687-4f45-9708-019B960494DF}">
-                <a14:hiddenLine xmlns:a14="http://schemas.microsoft.com/office/drawing/2010/main" xmlns="" w="9525">
+                <a14:hiddenLine xmlns="" xmlns:a14="http://schemas.microsoft.com/office/drawing/2010/main" w="9525">
                   <a:solidFill>
                     <a:srgbClr val="000000"/>
                   </a:solidFill>
@@ -3819,7 +3824,7 @@
             </a:ln>
             <a:extLst>
               <a:ext uri="{91240B29-F687-4f45-9708-019B960494DF}">
-                <a14:hiddenLine xmlns:a14="http://schemas.microsoft.com/office/drawing/2010/main" xmlns="" w="9525">
+                <a14:hiddenLine xmlns="" xmlns:a14="http://schemas.microsoft.com/office/drawing/2010/main" w="9525">
                   <a:solidFill>
                     <a:srgbClr val="000000"/>
                   </a:solidFill>
@@ -3909,7 +3914,7 @@
             </a:ln>
             <a:extLst>
               <a:ext uri="{91240B29-F687-4f45-9708-019B960494DF}">
-                <a14:hiddenLine xmlns:a14="http://schemas.microsoft.com/office/drawing/2010/main" xmlns="" w="9525">
+                <a14:hiddenLine xmlns="" xmlns:a14="http://schemas.microsoft.com/office/drawing/2010/main" w="9525">
                   <a:solidFill>
                     <a:srgbClr val="000000"/>
                   </a:solidFill>
@@ -3971,7 +3976,7 @@
             </a:ln>
             <a:extLst>
               <a:ext uri="{91240B29-F687-4f45-9708-019B960494DF}">
-                <a14:hiddenLine xmlns:a14="http://schemas.microsoft.com/office/drawing/2010/main" xmlns="" w="9525">
+                <a14:hiddenLine xmlns="" xmlns:a14="http://schemas.microsoft.com/office/drawing/2010/main" w="9525">
                   <a:solidFill>
                     <a:srgbClr val="000000"/>
                   </a:solidFill>
@@ -4091,7 +4096,7 @@
             </a:ln>
             <a:extLst>
               <a:ext uri="{91240B29-F687-4f45-9708-019B960494DF}">
-                <a14:hiddenLine xmlns:a14="http://schemas.microsoft.com/office/drawing/2010/main" xmlns="" w="9525">
+                <a14:hiddenLine xmlns="" xmlns:a14="http://schemas.microsoft.com/office/drawing/2010/main" w="9525">
                   <a:solidFill>
                     <a:srgbClr val="000000"/>
                   </a:solidFill>
@@ -4159,7 +4164,7 @@
             </a:ln>
             <a:extLst>
               <a:ext uri="{91240B29-F687-4f45-9708-019B960494DF}">
-                <a14:hiddenLine xmlns:a14="http://schemas.microsoft.com/office/drawing/2010/main" xmlns="" w="9525">
+                <a14:hiddenLine xmlns="" xmlns:a14="http://schemas.microsoft.com/office/drawing/2010/main" w="9525">
                   <a:solidFill>
                     <a:srgbClr val="000000"/>
                   </a:solidFill>
@@ -4249,7 +4254,7 @@
             </a:ln>
             <a:extLst>
               <a:ext uri="{91240B29-F687-4f45-9708-019B960494DF}">
-                <a14:hiddenLine xmlns:a14="http://schemas.microsoft.com/office/drawing/2010/main" xmlns="" w="9525">
+                <a14:hiddenLine xmlns="" xmlns:a14="http://schemas.microsoft.com/office/drawing/2010/main" w="9525">
                   <a:solidFill>
                     <a:srgbClr val="000000"/>
                   </a:solidFill>
@@ -4389,7 +4394,7 @@
           <a:p>
             <a:fld id="{48A87A34-81AB-432B-8DAE-1953F412C126}" type="datetimeFigureOut">
               <a:rPr lang="en-US" dirty="0"/>
-              <a:t>3/1/22</a:t>
+              <a:t>3/8/22</a:t>
             </a:fld>
             <a:endParaRPr lang="en-US" dirty="0"/>
           </a:p>
@@ -4651,7 +4656,7 @@
           <a:p>
             <a:fld id="{48A87A34-81AB-432B-8DAE-1953F412C126}" type="datetimeFigureOut">
               <a:rPr lang="en-US" dirty="0"/>
-              <a:t>3/1/22</a:t>
+              <a:t>3/8/22</a:t>
             </a:fld>
             <a:endParaRPr lang="en-US" dirty="0"/>
           </a:p>
@@ -4842,7 +4847,7 @@
           <a:p>
             <a:fld id="{48A87A34-81AB-432B-8DAE-1953F412C126}" type="datetimeFigureOut">
               <a:rPr lang="en-US" dirty="0"/>
-              <a:t>3/1/22</a:t>
+              <a:t>3/8/22</a:t>
             </a:fld>
             <a:endParaRPr lang="en-US" dirty="0"/>
           </a:p>
@@ -5100,7 +5105,7 @@
           <a:p>
             <a:fld id="{48A87A34-81AB-432B-8DAE-1953F412C126}" type="datetimeFigureOut">
               <a:rPr lang="en-US" dirty="0"/>
-              <a:t>3/1/22</a:t>
+              <a:t>3/8/22</a:t>
             </a:fld>
             <a:endParaRPr lang="en-US" dirty="0"/>
           </a:p>
@@ -5529,7 +5534,7 @@
           <a:p>
             <a:fld id="{48A87A34-81AB-432B-8DAE-1953F412C126}" type="datetimeFigureOut">
               <a:rPr lang="en-US" dirty="0"/>
-              <a:t>3/1/22</a:t>
+              <a:t>3/8/22</a:t>
             </a:fld>
             <a:endParaRPr lang="en-US" dirty="0"/>
           </a:p>
@@ -6070,7 +6075,7 @@
           <a:p>
             <a:fld id="{48A87A34-81AB-432B-8DAE-1953F412C126}" type="datetimeFigureOut">
               <a:rPr lang="en-US" dirty="0"/>
-              <a:t>3/1/22</a:t>
+              <a:t>3/8/22</a:t>
             </a:fld>
             <a:endParaRPr lang="en-US" dirty="0"/>
           </a:p>
@@ -6785,7 +6790,7 @@
           <a:p>
             <a:fld id="{48A87A34-81AB-432B-8DAE-1953F412C126}" type="datetimeFigureOut">
               <a:rPr lang="en-US" dirty="0"/>
-              <a:t>3/1/22</a:t>
+              <a:t>3/8/22</a:t>
             </a:fld>
             <a:endParaRPr lang="en-US" dirty="0"/>
           </a:p>
@@ -6950,7 +6955,7 @@
           <a:p>
             <a:fld id="{48A87A34-81AB-432B-8DAE-1953F412C126}" type="datetimeFigureOut">
               <a:rPr lang="en-US" dirty="0"/>
-              <a:t>3/1/22</a:t>
+              <a:t>3/8/22</a:t>
             </a:fld>
             <a:endParaRPr lang="en-US" dirty="0"/>
           </a:p>
@@ -7125,7 +7130,7 @@
           <a:p>
             <a:fld id="{48A87A34-81AB-432B-8DAE-1953F412C126}" type="datetimeFigureOut">
               <a:rPr lang="en-US" dirty="0"/>
-              <a:t>3/1/22</a:t>
+              <a:t>3/8/22</a:t>
             </a:fld>
             <a:endParaRPr lang="en-US" dirty="0"/>
           </a:p>
@@ -7290,7 +7295,7 @@
           <a:p>
             <a:fld id="{48A87A34-81AB-432B-8DAE-1953F412C126}" type="datetimeFigureOut">
               <a:rPr lang="en-US" dirty="0"/>
-              <a:t>3/1/22</a:t>
+              <a:t>3/8/22</a:t>
             </a:fld>
             <a:endParaRPr lang="en-US" dirty="0"/>
           </a:p>
@@ -7535,7 +7540,7 @@
           <a:p>
             <a:fld id="{48A87A34-81AB-432B-8DAE-1953F412C126}" type="datetimeFigureOut">
               <a:rPr lang="en-US" dirty="0"/>
-              <a:t>3/1/22</a:t>
+              <a:t>3/8/22</a:t>
             </a:fld>
             <a:endParaRPr lang="en-US" dirty="0"/>
           </a:p>
@@ -7762,7 +7767,7 @@
           <a:p>
             <a:fld id="{48A87A34-81AB-432B-8DAE-1953F412C126}" type="datetimeFigureOut">
               <a:rPr lang="en-US" dirty="0"/>
-              <a:t>3/1/22</a:t>
+              <a:t>3/8/22</a:t>
             </a:fld>
             <a:endParaRPr lang="en-US" dirty="0"/>
           </a:p>
@@ -8138,7 +8143,7 @@
           <a:p>
             <a:fld id="{48A87A34-81AB-432B-8DAE-1953F412C126}" type="datetimeFigureOut">
               <a:rPr lang="en-US" dirty="0"/>
-              <a:t>3/1/22</a:t>
+              <a:t>3/8/22</a:t>
             </a:fld>
             <a:endParaRPr lang="en-US" dirty="0"/>
           </a:p>
@@ -8251,7 +8256,7 @@
           <a:p>
             <a:fld id="{48A87A34-81AB-432B-8DAE-1953F412C126}" type="datetimeFigureOut">
               <a:rPr lang="en-US" dirty="0"/>
-              <a:t>3/1/22</a:t>
+              <a:t>3/8/22</a:t>
             </a:fld>
             <a:endParaRPr lang="en-US" dirty="0"/>
           </a:p>
@@ -8341,7 +8346,7 @@
           <a:p>
             <a:fld id="{48A87A34-81AB-432B-8DAE-1953F412C126}" type="datetimeFigureOut">
               <a:rPr lang="en-US" dirty="0"/>
-              <a:t>3/1/22</a:t>
+              <a:t>3/8/22</a:t>
             </a:fld>
             <a:endParaRPr lang="en-US" dirty="0"/>
           </a:p>
@@ -8585,7 +8590,7 @@
           <a:p>
             <a:fld id="{48A87A34-81AB-432B-8DAE-1953F412C126}" type="datetimeFigureOut">
               <a:rPr lang="en-US" dirty="0"/>
-              <a:t>3/1/22</a:t>
+              <a:t>3/8/22</a:t>
             </a:fld>
             <a:endParaRPr lang="en-US" dirty="0"/>
           </a:p>
@@ -8860,7 +8865,7 @@
           <a:p>
             <a:fld id="{48A87A34-81AB-432B-8DAE-1953F412C126}" type="datetimeFigureOut">
               <a:rPr lang="en-US" dirty="0"/>
-              <a:t>3/1/22</a:t>
+              <a:t>3/8/22</a:t>
             </a:fld>
             <a:endParaRPr lang="en-US" dirty="0"/>
           </a:p>
@@ -8971,7 +8976,7 @@
           <a:noFill/>
           <a:extLst>
             <a:ext uri="{909E8E84-426E-40dd-AFC4-6F175D3DCCD1}">
-              <a14:hiddenFill xmlns:a14="http://schemas.microsoft.com/office/drawing/2010/main" xmlns="">
+              <a14:hiddenFill xmlns="" xmlns:a14="http://schemas.microsoft.com/office/drawing/2010/main">
                 <a:solidFill>
                   <a:srgbClr val="FFFFFF"/>
                 </a:solidFill>
@@ -9045,7 +9050,7 @@
               </a:ln>
               <a:extLst>
                 <a:ext uri="{91240B29-F687-4f45-9708-019B960494DF}">
-                  <a14:hiddenLine xmlns:a14="http://schemas.microsoft.com/office/drawing/2010/main" xmlns="" w="9525">
+                  <a14:hiddenLine xmlns="" xmlns:a14="http://schemas.microsoft.com/office/drawing/2010/main" w="9525">
                     <a:solidFill>
                       <a:srgbClr val="000000"/>
                     </a:solidFill>
@@ -9135,7 +9140,7 @@
               </a:ln>
               <a:extLst>
                 <a:ext uri="{91240B29-F687-4f45-9708-019B960494DF}">
-                  <a14:hiddenLine xmlns:a14="http://schemas.microsoft.com/office/drawing/2010/main" xmlns="" w="9525">
+                  <a14:hiddenLine xmlns="" xmlns:a14="http://schemas.microsoft.com/office/drawing/2010/main" w="9525">
                     <a:solidFill>
                       <a:srgbClr val="000000"/>
                     </a:solidFill>
@@ -9225,7 +9230,7 @@
               </a:ln>
               <a:extLst>
                 <a:ext uri="{91240B29-F687-4f45-9708-019B960494DF}">
-                  <a14:hiddenLine xmlns:a14="http://schemas.microsoft.com/office/drawing/2010/main" xmlns="" w="9525">
+                  <a14:hiddenLine xmlns="" xmlns:a14="http://schemas.microsoft.com/office/drawing/2010/main" w="9525">
                     <a:solidFill>
                       <a:srgbClr val="000000"/>
                     </a:solidFill>
@@ -9287,7 +9292,7 @@
               </a:ln>
               <a:extLst>
                 <a:ext uri="{91240B29-F687-4f45-9708-019B960494DF}">
-                  <a14:hiddenLine xmlns:a14="http://schemas.microsoft.com/office/drawing/2010/main" xmlns="" w="9525">
+                  <a14:hiddenLine xmlns="" xmlns:a14="http://schemas.microsoft.com/office/drawing/2010/main" w="9525">
                     <a:solidFill>
                       <a:srgbClr val="000000"/>
                     </a:solidFill>
@@ -9377,7 +9382,7 @@
               </a:ln>
               <a:extLst>
                 <a:ext uri="{91240B29-F687-4f45-9708-019B960494DF}">
-                  <a14:hiddenLine xmlns:a14="http://schemas.microsoft.com/office/drawing/2010/main" xmlns="" w="9525">
+                  <a14:hiddenLine xmlns="" xmlns:a14="http://schemas.microsoft.com/office/drawing/2010/main" w="9525">
                     <a:solidFill>
                       <a:srgbClr val="000000"/>
                     </a:solidFill>
@@ -9439,7 +9444,7 @@
               </a:ln>
               <a:extLst>
                 <a:ext uri="{91240B29-F687-4f45-9708-019B960494DF}">
-                  <a14:hiddenLine xmlns:a14="http://schemas.microsoft.com/office/drawing/2010/main" xmlns="" w="9525">
+                  <a14:hiddenLine xmlns="" xmlns:a14="http://schemas.microsoft.com/office/drawing/2010/main" w="9525">
                     <a:solidFill>
                       <a:srgbClr val="000000"/>
                     </a:solidFill>
@@ -9501,7 +9506,7 @@
               </a:ln>
               <a:extLst>
                 <a:ext uri="{91240B29-F687-4f45-9708-019B960494DF}">
-                  <a14:hiddenLine xmlns:a14="http://schemas.microsoft.com/office/drawing/2010/main" xmlns="" w="9525">
+                  <a14:hiddenLine xmlns="" xmlns:a14="http://schemas.microsoft.com/office/drawing/2010/main" w="9525">
                     <a:solidFill>
                       <a:srgbClr val="000000"/>
                     </a:solidFill>
@@ -9591,7 +9596,7 @@
               </a:ln>
               <a:extLst>
                 <a:ext uri="{91240B29-F687-4f45-9708-019B960494DF}">
-                  <a14:hiddenLine xmlns:a14="http://schemas.microsoft.com/office/drawing/2010/main" xmlns="" w="9525">
+                  <a14:hiddenLine xmlns="" xmlns:a14="http://schemas.microsoft.com/office/drawing/2010/main" w="9525">
                     <a:solidFill>
                       <a:srgbClr val="000000"/>
                     </a:solidFill>
@@ -9681,7 +9686,7 @@
               </a:ln>
               <a:extLst>
                 <a:ext uri="{91240B29-F687-4f45-9708-019B960494DF}">
-                  <a14:hiddenLine xmlns:a14="http://schemas.microsoft.com/office/drawing/2010/main" xmlns="" w="9525">
+                  <a14:hiddenLine xmlns="" xmlns:a14="http://schemas.microsoft.com/office/drawing/2010/main" w="9525">
                     <a:solidFill>
                       <a:srgbClr val="000000"/>
                     </a:solidFill>
@@ -9743,7 +9748,7 @@
               </a:ln>
               <a:extLst>
                 <a:ext uri="{91240B29-F687-4f45-9708-019B960494DF}">
-                  <a14:hiddenLine xmlns:a14="http://schemas.microsoft.com/office/drawing/2010/main" xmlns="" w="9525">
+                  <a14:hiddenLine xmlns="" xmlns:a14="http://schemas.microsoft.com/office/drawing/2010/main" w="9525">
                     <a:solidFill>
                       <a:srgbClr val="000000"/>
                     </a:solidFill>
@@ -9853,7 +9858,7 @@
               </a:ln>
               <a:extLst>
                 <a:ext uri="{91240B29-F687-4f45-9708-019B960494DF}">
-                  <a14:hiddenLine xmlns:a14="http://schemas.microsoft.com/office/drawing/2010/main" xmlns="" w="9525">
+                  <a14:hiddenLine xmlns="" xmlns:a14="http://schemas.microsoft.com/office/drawing/2010/main" w="9525">
                     <a:solidFill>
                       <a:srgbClr val="000000"/>
                     </a:solidFill>
@@ -9937,7 +9942,7 @@
               </a:ln>
               <a:extLst>
                 <a:ext uri="{91240B29-F687-4f45-9708-019B960494DF}">
-                  <a14:hiddenLine xmlns:a14="http://schemas.microsoft.com/office/drawing/2010/main" xmlns="" w="9525">
+                  <a14:hiddenLine xmlns="" xmlns:a14="http://schemas.microsoft.com/office/drawing/2010/main" w="9525">
                     <a:solidFill>
                       <a:srgbClr val="000000"/>
                     </a:solidFill>
@@ -9999,7 +10004,7 @@
               </a:ln>
               <a:extLst>
                 <a:ext uri="{91240B29-F687-4f45-9708-019B960494DF}">
-                  <a14:hiddenLine xmlns:a14="http://schemas.microsoft.com/office/drawing/2010/main" xmlns="" w="9525">
+                  <a14:hiddenLine xmlns="" xmlns:a14="http://schemas.microsoft.com/office/drawing/2010/main" w="9525">
                     <a:solidFill>
                       <a:srgbClr val="000000"/>
                     </a:solidFill>
@@ -10061,7 +10066,7 @@
               </a:ln>
               <a:extLst>
                 <a:ext uri="{91240B29-F687-4f45-9708-019B960494DF}">
-                  <a14:hiddenLine xmlns:a14="http://schemas.microsoft.com/office/drawing/2010/main" xmlns="" w="9525">
+                  <a14:hiddenLine xmlns="" xmlns:a14="http://schemas.microsoft.com/office/drawing/2010/main" w="9525">
                     <a:solidFill>
                       <a:srgbClr val="000000"/>
                     </a:solidFill>
@@ -10151,7 +10156,7 @@
               </a:ln>
               <a:extLst>
                 <a:ext uri="{91240B29-F687-4f45-9708-019B960494DF}">
-                  <a14:hiddenLine xmlns:a14="http://schemas.microsoft.com/office/drawing/2010/main" xmlns="" w="9525">
+                  <a14:hiddenLine xmlns="" xmlns:a14="http://schemas.microsoft.com/office/drawing/2010/main" w="9525">
                     <a:solidFill>
                       <a:srgbClr val="000000"/>
                     </a:solidFill>
@@ -10185,7 +10190,7 @@
               </a:ln>
               <a:extLst>
                 <a:ext uri="{91240B29-F687-4f45-9708-019B960494DF}">
-                  <a14:hiddenLine xmlns:a14="http://schemas.microsoft.com/office/drawing/2010/main" xmlns="" w="9525">
+                  <a14:hiddenLine xmlns="" xmlns:a14="http://schemas.microsoft.com/office/drawing/2010/main" w="9525">
                     <a:solidFill>
                       <a:srgbClr val="000000"/>
                     </a:solidFill>
@@ -10250,7 +10255,7 @@
               </a:ln>
               <a:extLst>
                 <a:ext uri="{91240B29-F687-4f45-9708-019B960494DF}">
-                  <a14:hiddenLine xmlns:a14="http://schemas.microsoft.com/office/drawing/2010/main" xmlns="" w="9525">
+                  <a14:hiddenLine xmlns="" xmlns:a14="http://schemas.microsoft.com/office/drawing/2010/main" w="9525">
                     <a:solidFill>
                       <a:srgbClr val="000000"/>
                     </a:solidFill>
@@ -10340,7 +10345,7 @@
               </a:ln>
               <a:extLst>
                 <a:ext uri="{91240B29-F687-4f45-9708-019B960494DF}">
-                  <a14:hiddenLine xmlns:a14="http://schemas.microsoft.com/office/drawing/2010/main" xmlns="" w="9525">
+                  <a14:hiddenLine xmlns="" xmlns:a14="http://schemas.microsoft.com/office/drawing/2010/main" w="9525">
                     <a:solidFill>
                       <a:srgbClr val="000000"/>
                     </a:solidFill>
@@ -10402,7 +10407,7 @@
               </a:ln>
               <a:extLst>
                 <a:ext uri="{91240B29-F687-4f45-9708-019B960494DF}">
-                  <a14:hiddenLine xmlns:a14="http://schemas.microsoft.com/office/drawing/2010/main" xmlns="" w="9525">
+                  <a14:hiddenLine xmlns="" xmlns:a14="http://schemas.microsoft.com/office/drawing/2010/main" w="9525">
                     <a:solidFill>
                       <a:srgbClr val="000000"/>
                     </a:solidFill>
@@ -10492,7 +10497,7 @@
               </a:ln>
               <a:extLst>
                 <a:ext uri="{91240B29-F687-4f45-9708-019B960494DF}">
-                  <a14:hiddenLine xmlns:a14="http://schemas.microsoft.com/office/drawing/2010/main" xmlns="" w="9525">
+                  <a14:hiddenLine xmlns="" xmlns:a14="http://schemas.microsoft.com/office/drawing/2010/main" w="9525">
                     <a:solidFill>
                       <a:srgbClr val="000000"/>
                     </a:solidFill>
@@ -10557,7 +10562,7 @@
               </a:ln>
               <a:extLst>
                 <a:ext uri="{91240B29-F687-4f45-9708-019B960494DF}">
-                  <a14:hiddenLine xmlns:a14="http://schemas.microsoft.com/office/drawing/2010/main" xmlns="" w="9525">
+                  <a14:hiddenLine xmlns="" xmlns:a14="http://schemas.microsoft.com/office/drawing/2010/main" w="9525">
                     <a:solidFill>
                       <a:srgbClr val="000000"/>
                     </a:solidFill>
@@ -10619,7 +10624,7 @@
               </a:ln>
               <a:extLst>
                 <a:ext uri="{91240B29-F687-4f45-9708-019B960494DF}">
-                  <a14:hiddenLine xmlns:a14="http://schemas.microsoft.com/office/drawing/2010/main" xmlns="" w="9525">
+                  <a14:hiddenLine xmlns="" xmlns:a14="http://schemas.microsoft.com/office/drawing/2010/main" w="9525">
                     <a:solidFill>
                       <a:srgbClr val="000000"/>
                     </a:solidFill>
@@ -10709,7 +10714,7 @@
               </a:ln>
               <a:extLst>
                 <a:ext uri="{91240B29-F687-4f45-9708-019B960494DF}">
-                  <a14:hiddenLine xmlns:a14="http://schemas.microsoft.com/office/drawing/2010/main" xmlns="" w="9525">
+                  <a14:hiddenLine xmlns="" xmlns:a14="http://schemas.microsoft.com/office/drawing/2010/main" w="9525">
                     <a:solidFill>
                       <a:srgbClr val="000000"/>
                     </a:solidFill>
@@ -10799,7 +10804,7 @@
               </a:ln>
               <a:extLst>
                 <a:ext uri="{91240B29-F687-4f45-9708-019B960494DF}">
-                  <a14:hiddenLine xmlns:a14="http://schemas.microsoft.com/office/drawing/2010/main" xmlns="" w="9525">
+                  <a14:hiddenLine xmlns="" xmlns:a14="http://schemas.microsoft.com/office/drawing/2010/main" w="9525">
                     <a:solidFill>
                       <a:srgbClr val="000000"/>
                     </a:solidFill>
@@ -10864,7 +10869,7 @@
               </a:ln>
               <a:extLst>
                 <a:ext uri="{91240B29-F687-4f45-9708-019B960494DF}">
-                  <a14:hiddenLine xmlns:a14="http://schemas.microsoft.com/office/drawing/2010/main" xmlns="" w="9525">
+                  <a14:hiddenLine xmlns="" xmlns:a14="http://schemas.microsoft.com/office/drawing/2010/main" w="9525">
                     <a:solidFill>
                       <a:srgbClr val="000000"/>
                     </a:solidFill>
@@ -10984,7 +10989,7 @@
               </a:ln>
               <a:extLst>
                 <a:ext uri="{91240B29-F687-4f45-9708-019B960494DF}">
-                  <a14:hiddenLine xmlns:a14="http://schemas.microsoft.com/office/drawing/2010/main" xmlns="" w="9525">
+                  <a14:hiddenLine xmlns="" xmlns:a14="http://schemas.microsoft.com/office/drawing/2010/main" w="9525">
                     <a:solidFill>
                       <a:srgbClr val="000000"/>
                     </a:solidFill>
@@ -11082,7 +11087,7 @@
               </a:ln>
               <a:extLst>
                 <a:ext uri="{91240B29-F687-4f45-9708-019B960494DF}">
-                  <a14:hiddenLine xmlns:a14="http://schemas.microsoft.com/office/drawing/2010/main" xmlns="" w="9525">
+                  <a14:hiddenLine xmlns="" xmlns:a14="http://schemas.microsoft.com/office/drawing/2010/main" w="9525">
                     <a:solidFill>
                       <a:srgbClr val="000000"/>
                     </a:solidFill>
@@ -11197,7 +11202,7 @@
               </a:ln>
               <a:extLst>
                 <a:ext uri="{91240B29-F687-4f45-9708-019B960494DF}">
-                  <a14:hiddenLine xmlns:a14="http://schemas.microsoft.com/office/drawing/2010/main" xmlns="" w="9525">
+                  <a14:hiddenLine xmlns="" xmlns:a14="http://schemas.microsoft.com/office/drawing/2010/main" w="9525">
                     <a:solidFill>
                       <a:srgbClr val="000000"/>
                     </a:solidFill>
@@ -11287,7 +11292,7 @@
               </a:ln>
               <a:extLst>
                 <a:ext uri="{91240B29-F687-4f45-9708-019B960494DF}">
-                  <a14:hiddenLine xmlns:a14="http://schemas.microsoft.com/office/drawing/2010/main" xmlns="" w="9525">
+                  <a14:hiddenLine xmlns="" xmlns:a14="http://schemas.microsoft.com/office/drawing/2010/main" w="9525">
                     <a:solidFill>
                       <a:srgbClr val="000000"/>
                     </a:solidFill>
@@ -11352,7 +11357,7 @@
               </a:ln>
               <a:extLst>
                 <a:ext uri="{91240B29-F687-4f45-9708-019B960494DF}">
-                  <a14:hiddenLine xmlns:a14="http://schemas.microsoft.com/office/drawing/2010/main" xmlns="" w="9525">
+                  <a14:hiddenLine xmlns="" xmlns:a14="http://schemas.microsoft.com/office/drawing/2010/main" w="9525">
                     <a:solidFill>
                       <a:srgbClr val="000000"/>
                     </a:solidFill>
@@ -11442,7 +11447,7 @@
               </a:ln>
               <a:extLst>
                 <a:ext uri="{91240B29-F687-4f45-9708-019B960494DF}">
-                  <a14:hiddenLine xmlns:a14="http://schemas.microsoft.com/office/drawing/2010/main" xmlns="" w="9525">
+                  <a14:hiddenLine xmlns="" xmlns:a14="http://schemas.microsoft.com/office/drawing/2010/main" w="9525">
                     <a:solidFill>
                       <a:srgbClr val="000000"/>
                     </a:solidFill>
@@ -11510,7 +11515,7 @@
               </a:ln>
               <a:extLst>
                 <a:ext uri="{91240B29-F687-4f45-9708-019B960494DF}">
-                  <a14:hiddenLine xmlns:a14="http://schemas.microsoft.com/office/drawing/2010/main" xmlns="" w="9525">
+                  <a14:hiddenLine xmlns="" xmlns:a14="http://schemas.microsoft.com/office/drawing/2010/main" w="9525">
                     <a:solidFill>
                       <a:srgbClr val="000000"/>
                     </a:solidFill>
@@ -11600,7 +11605,7 @@
               </a:ln>
               <a:extLst>
                 <a:ext uri="{91240B29-F687-4f45-9708-019B960494DF}">
-                  <a14:hiddenLine xmlns:a14="http://schemas.microsoft.com/office/drawing/2010/main" xmlns="" w="9525">
+                  <a14:hiddenLine xmlns="" xmlns:a14="http://schemas.microsoft.com/office/drawing/2010/main" w="9525">
                     <a:solidFill>
                       <a:srgbClr val="000000"/>
                     </a:solidFill>
@@ -11668,7 +11673,7 @@
               </a:ln>
               <a:extLst>
                 <a:ext uri="{91240B29-F687-4f45-9708-019B960494DF}">
-                  <a14:hiddenLine xmlns:a14="http://schemas.microsoft.com/office/drawing/2010/main" xmlns="" w="9525">
+                  <a14:hiddenLine xmlns="" xmlns:a14="http://schemas.microsoft.com/office/drawing/2010/main" w="9525">
                     <a:solidFill>
                       <a:srgbClr val="000000"/>
                     </a:solidFill>
@@ -11758,7 +11763,7 @@
               </a:ln>
               <a:extLst>
                 <a:ext uri="{91240B29-F687-4f45-9708-019B960494DF}">
-                  <a14:hiddenLine xmlns:a14="http://schemas.microsoft.com/office/drawing/2010/main" xmlns="" w="9525">
+                  <a14:hiddenLine xmlns="" xmlns:a14="http://schemas.microsoft.com/office/drawing/2010/main" w="9525">
                     <a:solidFill>
                       <a:srgbClr val="000000"/>
                     </a:solidFill>
@@ -11792,7 +11797,7 @@
               </a:ln>
               <a:extLst>
                 <a:ext uri="{91240B29-F687-4f45-9708-019B960494DF}">
-                  <a14:hiddenLine xmlns:a14="http://schemas.microsoft.com/office/drawing/2010/main" xmlns="" w="9525">
+                  <a14:hiddenLine xmlns="" xmlns:a14="http://schemas.microsoft.com/office/drawing/2010/main" w="9525">
                     <a:solidFill>
                       <a:srgbClr val="000000"/>
                     </a:solidFill>
@@ -11933,7 +11938,7 @@
             <a:fld id="{48A87A34-81AB-432B-8DAE-1953F412C126}" type="datetimeFigureOut">
               <a:rPr lang="en-US" dirty="0"/>
               <a:pPr/>
-              <a:t>3/1/22</a:t>
+              <a:t>3/8/22</a:t>
             </a:fld>
             <a:endParaRPr lang="en-US" dirty="0"/>
           </a:p>
@@ -13021,7 +13026,7 @@
               <a:rPr lang="en-US" sz="2800" cap="none" dirty="0">
                 <a:latin typeface="Ford Antenna Medium Cnd" panose="02000505000000020004" pitchFamily="2" charset="0"/>
               </a:rPr>
-              <a:t>Description</a:t>
+              <a:t>Why this Building Block?</a:t>
             </a:r>
           </a:p>
         </p:txBody>

</xml_diff>

<commit_message>
renaming slide to "web concepts"
</commit_message>
<xml_diff>
--- a/assets/slides/rfc8594.pptx
+++ b/assets/slides/rfc8594.pptx
@@ -171,7 +171,7 @@
           <a:noFill/>
           <a:extLst>
             <a:ext uri="{909E8E84-426E-40dd-AFC4-6F175D3DCCD1}">
-              <a14:hiddenFill xmlns="" xmlns:a14="http://schemas.microsoft.com/office/drawing/2010/main">
+              <a14:hiddenFill xmlns:a14="http://schemas.microsoft.com/office/drawing/2010/main" xmlns="">
                 <a:solidFill>
                   <a:srgbClr val="FFFFFF"/>
                 </a:solidFill>
@@ -231,7 +231,7 @@
             </a:ln>
             <a:extLst>
               <a:ext uri="{91240B29-F687-4f45-9708-019B960494DF}">
-                <a14:hiddenLine xmlns="" xmlns:a14="http://schemas.microsoft.com/office/drawing/2010/main" w="9525">
+                <a14:hiddenLine xmlns:a14="http://schemas.microsoft.com/office/drawing/2010/main" xmlns="" w="9525">
                   <a:solidFill>
                     <a:srgbClr val="000000"/>
                   </a:solidFill>
@@ -321,7 +321,7 @@
             </a:ln>
             <a:extLst>
               <a:ext uri="{91240B29-F687-4f45-9708-019B960494DF}">
-                <a14:hiddenLine xmlns="" xmlns:a14="http://schemas.microsoft.com/office/drawing/2010/main" w="9525">
+                <a14:hiddenLine xmlns:a14="http://schemas.microsoft.com/office/drawing/2010/main" xmlns="" w="9525">
                   <a:solidFill>
                     <a:srgbClr val="000000"/>
                   </a:solidFill>
@@ -411,7 +411,7 @@
             </a:ln>
             <a:extLst>
               <a:ext uri="{91240B29-F687-4f45-9708-019B960494DF}">
-                <a14:hiddenLine xmlns="" xmlns:a14="http://schemas.microsoft.com/office/drawing/2010/main" w="9525">
+                <a14:hiddenLine xmlns:a14="http://schemas.microsoft.com/office/drawing/2010/main" xmlns="" w="9525">
                   <a:solidFill>
                     <a:srgbClr val="000000"/>
                   </a:solidFill>
@@ -445,7 +445,7 @@
             </a:ln>
             <a:extLst>
               <a:ext uri="{91240B29-F687-4f45-9708-019B960494DF}">
-                <a14:hiddenLine xmlns="" xmlns:a14="http://schemas.microsoft.com/office/drawing/2010/main" w="9525">
+                <a14:hiddenLine xmlns:a14="http://schemas.microsoft.com/office/drawing/2010/main" xmlns="" w="9525">
                   <a:solidFill>
                     <a:srgbClr val="000000"/>
                   </a:solidFill>
@@ -535,7 +535,7 @@
             </a:ln>
             <a:extLst>
               <a:ext uri="{91240B29-F687-4f45-9708-019B960494DF}">
-                <a14:hiddenLine xmlns="" xmlns:a14="http://schemas.microsoft.com/office/drawing/2010/main" w="9525">
+                <a14:hiddenLine xmlns:a14="http://schemas.microsoft.com/office/drawing/2010/main" xmlns="" w="9525">
                   <a:solidFill>
                     <a:srgbClr val="000000"/>
                   </a:solidFill>
@@ -597,7 +597,7 @@
             </a:ln>
             <a:extLst>
               <a:ext uri="{91240B29-F687-4f45-9708-019B960494DF}">
-                <a14:hiddenLine xmlns="" xmlns:a14="http://schemas.microsoft.com/office/drawing/2010/main" w="9525">
+                <a14:hiddenLine xmlns:a14="http://schemas.microsoft.com/office/drawing/2010/main" xmlns="" w="9525">
                   <a:solidFill>
                     <a:srgbClr val="000000"/>
                   </a:solidFill>
@@ -659,7 +659,7 @@
             </a:ln>
             <a:extLst>
               <a:ext uri="{91240B29-F687-4f45-9708-019B960494DF}">
-                <a14:hiddenLine xmlns="" xmlns:a14="http://schemas.microsoft.com/office/drawing/2010/main" w="9525">
+                <a14:hiddenLine xmlns:a14="http://schemas.microsoft.com/office/drawing/2010/main" xmlns="" w="9525">
                   <a:solidFill>
                     <a:srgbClr val="000000"/>
                   </a:solidFill>
@@ -749,7 +749,7 @@
             </a:ln>
             <a:extLst>
               <a:ext uri="{91240B29-F687-4f45-9708-019B960494DF}">
-                <a14:hiddenLine xmlns="" xmlns:a14="http://schemas.microsoft.com/office/drawing/2010/main" w="9525">
+                <a14:hiddenLine xmlns:a14="http://schemas.microsoft.com/office/drawing/2010/main" xmlns="" w="9525">
                   <a:solidFill>
                     <a:srgbClr val="000000"/>
                   </a:solidFill>
@@ -811,7 +811,7 @@
             </a:ln>
             <a:extLst>
               <a:ext uri="{91240B29-F687-4f45-9708-019B960494DF}">
-                <a14:hiddenLine xmlns="" xmlns:a14="http://schemas.microsoft.com/office/drawing/2010/main" w="9525">
+                <a14:hiddenLine xmlns:a14="http://schemas.microsoft.com/office/drawing/2010/main" xmlns="" w="9525">
                   <a:solidFill>
                     <a:srgbClr val="000000"/>
                   </a:solidFill>
@@ -873,7 +873,7 @@
             </a:ln>
             <a:extLst>
               <a:ext uri="{91240B29-F687-4f45-9708-019B960494DF}">
-                <a14:hiddenLine xmlns="" xmlns:a14="http://schemas.microsoft.com/office/drawing/2010/main" w="9525">
+                <a14:hiddenLine xmlns:a14="http://schemas.microsoft.com/office/drawing/2010/main" xmlns="" w="9525">
                   <a:solidFill>
                     <a:srgbClr val="000000"/>
                   </a:solidFill>
@@ -963,7 +963,7 @@
             </a:ln>
             <a:extLst>
               <a:ext uri="{91240B29-F687-4f45-9708-019B960494DF}">
-                <a14:hiddenLine xmlns="" xmlns:a14="http://schemas.microsoft.com/office/drawing/2010/main" w="9525">
+                <a14:hiddenLine xmlns:a14="http://schemas.microsoft.com/office/drawing/2010/main" xmlns="" w="9525">
                   <a:solidFill>
                     <a:srgbClr val="000000"/>
                   </a:solidFill>
@@ -1053,7 +1053,7 @@
             </a:ln>
             <a:extLst>
               <a:ext uri="{91240B29-F687-4f45-9708-019B960494DF}">
-                <a14:hiddenLine xmlns="" xmlns:a14="http://schemas.microsoft.com/office/drawing/2010/main" w="9525">
+                <a14:hiddenLine xmlns:a14="http://schemas.microsoft.com/office/drawing/2010/main" xmlns="" w="9525">
                   <a:solidFill>
                     <a:srgbClr val="000000"/>
                   </a:solidFill>
@@ -1115,7 +1115,7 @@
             </a:ln>
             <a:extLst>
               <a:ext uri="{91240B29-F687-4f45-9708-019B960494DF}">
-                <a14:hiddenLine xmlns="" xmlns:a14="http://schemas.microsoft.com/office/drawing/2010/main" w="9525">
+                <a14:hiddenLine xmlns:a14="http://schemas.microsoft.com/office/drawing/2010/main" xmlns="" w="9525">
                   <a:solidFill>
                     <a:srgbClr val="000000"/>
                   </a:solidFill>
@@ -1225,7 +1225,7 @@
             </a:ln>
             <a:extLst>
               <a:ext uri="{91240B29-F687-4f45-9708-019B960494DF}">
-                <a14:hiddenLine xmlns="" xmlns:a14="http://schemas.microsoft.com/office/drawing/2010/main" w="9525">
+                <a14:hiddenLine xmlns:a14="http://schemas.microsoft.com/office/drawing/2010/main" xmlns="" w="9525">
                   <a:solidFill>
                     <a:srgbClr val="000000"/>
                   </a:solidFill>
@@ -1287,7 +1287,7 @@
             </a:ln>
             <a:extLst>
               <a:ext uri="{91240B29-F687-4f45-9708-019B960494DF}">
-                <a14:hiddenLine xmlns="" xmlns:a14="http://schemas.microsoft.com/office/drawing/2010/main" w="9525">
+                <a14:hiddenLine xmlns:a14="http://schemas.microsoft.com/office/drawing/2010/main" xmlns="" w="9525">
                   <a:solidFill>
                     <a:srgbClr val="000000"/>
                   </a:solidFill>
@@ -1377,7 +1377,7 @@
             </a:ln>
             <a:extLst>
               <a:ext uri="{91240B29-F687-4f45-9708-019B960494DF}">
-                <a14:hiddenLine xmlns="" xmlns:a14="http://schemas.microsoft.com/office/drawing/2010/main" w="9525">
+                <a14:hiddenLine xmlns:a14="http://schemas.microsoft.com/office/drawing/2010/main" xmlns="" w="9525">
                   <a:solidFill>
                     <a:srgbClr val="000000"/>
                   </a:solidFill>
@@ -1467,7 +1467,7 @@
             </a:ln>
             <a:extLst>
               <a:ext uri="{91240B29-F687-4f45-9708-019B960494DF}">
-                <a14:hiddenLine xmlns="" xmlns:a14="http://schemas.microsoft.com/office/drawing/2010/main" w="9525">
+                <a14:hiddenLine xmlns:a14="http://schemas.microsoft.com/office/drawing/2010/main" xmlns="" w="9525">
                   <a:solidFill>
                     <a:srgbClr val="000000"/>
                   </a:solidFill>
@@ -1529,7 +1529,7 @@
             </a:ln>
             <a:extLst>
               <a:ext uri="{91240B29-F687-4f45-9708-019B960494DF}">
-                <a14:hiddenLine xmlns="" xmlns:a14="http://schemas.microsoft.com/office/drawing/2010/main" w="9525">
+                <a14:hiddenLine xmlns:a14="http://schemas.microsoft.com/office/drawing/2010/main" xmlns="" w="9525">
                   <a:solidFill>
                     <a:srgbClr val="000000"/>
                   </a:solidFill>
@@ -1619,7 +1619,7 @@
             </a:ln>
             <a:extLst>
               <a:ext uri="{91240B29-F687-4f45-9708-019B960494DF}">
-                <a14:hiddenLine xmlns="" xmlns:a14="http://schemas.microsoft.com/office/drawing/2010/main" w="9525">
+                <a14:hiddenLine xmlns:a14="http://schemas.microsoft.com/office/drawing/2010/main" xmlns="" w="9525">
                   <a:solidFill>
                     <a:srgbClr val="000000"/>
                   </a:solidFill>
@@ -1709,7 +1709,7 @@
             </a:ln>
             <a:extLst>
               <a:ext uri="{91240B29-F687-4f45-9708-019B960494DF}">
-                <a14:hiddenLine xmlns="" xmlns:a14="http://schemas.microsoft.com/office/drawing/2010/main" w="9525">
+                <a14:hiddenLine xmlns:a14="http://schemas.microsoft.com/office/drawing/2010/main" xmlns="" w="9525">
                   <a:solidFill>
                     <a:srgbClr val="000000"/>
                   </a:solidFill>
@@ -1765,7 +1765,7 @@
             </a:ln>
             <a:extLst>
               <a:ext uri="{91240B29-F687-4f45-9708-019B960494DF}">
-                <a14:hiddenLine xmlns="" xmlns:a14="http://schemas.microsoft.com/office/drawing/2010/main" w="9525">
+                <a14:hiddenLine xmlns:a14="http://schemas.microsoft.com/office/drawing/2010/main" xmlns="" w="9525">
                   <a:solidFill>
                     <a:srgbClr val="000000"/>
                   </a:solidFill>
@@ -1855,7 +1855,7 @@
             </a:ln>
             <a:extLst>
               <a:ext uri="{91240B29-F687-4f45-9708-019B960494DF}">
-                <a14:hiddenLine xmlns="" xmlns:a14="http://schemas.microsoft.com/office/drawing/2010/main" w="9525">
+                <a14:hiddenLine xmlns:a14="http://schemas.microsoft.com/office/drawing/2010/main" xmlns="" w="9525">
                   <a:solidFill>
                     <a:srgbClr val="000000"/>
                   </a:solidFill>
@@ -1911,7 +1911,7 @@
             </a:ln>
             <a:extLst>
               <a:ext uri="{91240B29-F687-4f45-9708-019B960494DF}">
-                <a14:hiddenLine xmlns="" xmlns:a14="http://schemas.microsoft.com/office/drawing/2010/main" w="9525">
+                <a14:hiddenLine xmlns:a14="http://schemas.microsoft.com/office/drawing/2010/main" xmlns="" w="9525">
                   <a:solidFill>
                     <a:srgbClr val="000000"/>
                   </a:solidFill>
@@ -2001,7 +2001,7 @@
             </a:ln>
             <a:extLst>
               <a:ext uri="{91240B29-F687-4f45-9708-019B960494DF}">
-                <a14:hiddenLine xmlns="" xmlns:a14="http://schemas.microsoft.com/office/drawing/2010/main" w="9525">
+                <a14:hiddenLine xmlns:a14="http://schemas.microsoft.com/office/drawing/2010/main" xmlns="" w="9525">
                   <a:solidFill>
                     <a:srgbClr val="000000"/>
                   </a:solidFill>
@@ -2069,7 +2069,7 @@
             </a:ln>
             <a:extLst>
               <a:ext uri="{91240B29-F687-4f45-9708-019B960494DF}">
-                <a14:hiddenLine xmlns="" xmlns:a14="http://schemas.microsoft.com/office/drawing/2010/main" w="9525">
+                <a14:hiddenLine xmlns:a14="http://schemas.microsoft.com/office/drawing/2010/main" xmlns="" w="9525">
                   <a:solidFill>
                     <a:srgbClr val="000000"/>
                   </a:solidFill>
@@ -2159,7 +2159,7 @@
             </a:ln>
             <a:extLst>
               <a:ext uri="{91240B29-F687-4f45-9708-019B960494DF}">
-                <a14:hiddenLine xmlns="" xmlns:a14="http://schemas.microsoft.com/office/drawing/2010/main" w="9525">
+                <a14:hiddenLine xmlns:a14="http://schemas.microsoft.com/office/drawing/2010/main" xmlns="" w="9525">
                   <a:solidFill>
                     <a:srgbClr val="000000"/>
                   </a:solidFill>
@@ -2227,7 +2227,7 @@
             </a:ln>
             <a:extLst>
               <a:ext uri="{91240B29-F687-4f45-9708-019B960494DF}">
-                <a14:hiddenLine xmlns="" xmlns:a14="http://schemas.microsoft.com/office/drawing/2010/main" w="9525">
+                <a14:hiddenLine xmlns:a14="http://schemas.microsoft.com/office/drawing/2010/main" xmlns="" w="9525">
                   <a:solidFill>
                     <a:srgbClr val="000000"/>
                   </a:solidFill>
@@ -2317,7 +2317,7 @@
             </a:ln>
             <a:extLst>
               <a:ext uri="{91240B29-F687-4f45-9708-019B960494DF}">
-                <a14:hiddenLine xmlns="" xmlns:a14="http://schemas.microsoft.com/office/drawing/2010/main" w="9525">
+                <a14:hiddenLine xmlns:a14="http://schemas.microsoft.com/office/drawing/2010/main" xmlns="" w="9525">
                   <a:solidFill>
                     <a:srgbClr val="000000"/>
                   </a:solidFill>
@@ -2351,7 +2351,7 @@
             </a:ln>
             <a:extLst>
               <a:ext uri="{91240B29-F687-4f45-9708-019B960494DF}">
-                <a14:hiddenLine xmlns="" xmlns:a14="http://schemas.microsoft.com/office/drawing/2010/main" w="9525">
+                <a14:hiddenLine xmlns:a14="http://schemas.microsoft.com/office/drawing/2010/main" xmlns="" w="9525">
                   <a:solidFill>
                     <a:srgbClr val="000000"/>
                   </a:solidFill>
@@ -2441,7 +2441,7 @@
             </a:ln>
             <a:extLst>
               <a:ext uri="{91240B29-F687-4f45-9708-019B960494DF}">
-                <a14:hiddenLine xmlns="" xmlns:a14="http://schemas.microsoft.com/office/drawing/2010/main" w="9525">
+                <a14:hiddenLine xmlns:a14="http://schemas.microsoft.com/office/drawing/2010/main" xmlns="" w="9525">
                   <a:solidFill>
                     <a:srgbClr val="000000"/>
                   </a:solidFill>
@@ -2503,7 +2503,7 @@
             </a:ln>
             <a:extLst>
               <a:ext uri="{91240B29-F687-4f45-9708-019B960494DF}">
-                <a14:hiddenLine xmlns="" xmlns:a14="http://schemas.microsoft.com/office/drawing/2010/main" w="9525">
+                <a14:hiddenLine xmlns:a14="http://schemas.microsoft.com/office/drawing/2010/main" xmlns="" w="9525">
                   <a:solidFill>
                     <a:srgbClr val="000000"/>
                   </a:solidFill>
@@ -2565,7 +2565,7 @@
             </a:ln>
             <a:extLst>
               <a:ext uri="{91240B29-F687-4f45-9708-019B960494DF}">
-                <a14:hiddenLine xmlns="" xmlns:a14="http://schemas.microsoft.com/office/drawing/2010/main" w="9525">
+                <a14:hiddenLine xmlns:a14="http://schemas.microsoft.com/office/drawing/2010/main" xmlns="" w="9525">
                   <a:solidFill>
                     <a:srgbClr val="000000"/>
                   </a:solidFill>
@@ -2655,7 +2655,7 @@
             </a:ln>
             <a:extLst>
               <a:ext uri="{91240B29-F687-4f45-9708-019B960494DF}">
-                <a14:hiddenLine xmlns="" xmlns:a14="http://schemas.microsoft.com/office/drawing/2010/main" w="9525">
+                <a14:hiddenLine xmlns:a14="http://schemas.microsoft.com/office/drawing/2010/main" xmlns="" w="9525">
                   <a:solidFill>
                     <a:srgbClr val="000000"/>
                   </a:solidFill>
@@ -2723,7 +2723,7 @@
             </a:ln>
             <a:extLst>
               <a:ext uri="{91240B29-F687-4f45-9708-019B960494DF}">
-                <a14:hiddenLine xmlns="" xmlns:a14="http://schemas.microsoft.com/office/drawing/2010/main" w="9525">
+                <a14:hiddenLine xmlns:a14="http://schemas.microsoft.com/office/drawing/2010/main" xmlns="" w="9525">
                   <a:solidFill>
                     <a:srgbClr val="000000"/>
                   </a:solidFill>
@@ -2785,7 +2785,7 @@
             </a:ln>
             <a:extLst>
               <a:ext uri="{91240B29-F687-4f45-9708-019B960494DF}">
-                <a14:hiddenLine xmlns="" xmlns:a14="http://schemas.microsoft.com/office/drawing/2010/main" w="9525">
+                <a14:hiddenLine xmlns:a14="http://schemas.microsoft.com/office/drawing/2010/main" xmlns="" w="9525">
                   <a:solidFill>
                     <a:srgbClr val="000000"/>
                   </a:solidFill>
@@ -2875,7 +2875,7 @@
             </a:ln>
             <a:extLst>
               <a:ext uri="{91240B29-F687-4f45-9708-019B960494DF}">
-                <a14:hiddenLine xmlns="" xmlns:a14="http://schemas.microsoft.com/office/drawing/2010/main" w="9525">
+                <a14:hiddenLine xmlns:a14="http://schemas.microsoft.com/office/drawing/2010/main" xmlns="" w="9525">
                   <a:solidFill>
                     <a:srgbClr val="000000"/>
                   </a:solidFill>
@@ -2937,7 +2937,7 @@
             </a:ln>
             <a:extLst>
               <a:ext uri="{91240B29-F687-4f45-9708-019B960494DF}">
-                <a14:hiddenLine xmlns="" xmlns:a14="http://schemas.microsoft.com/office/drawing/2010/main" w="9525">
+                <a14:hiddenLine xmlns:a14="http://schemas.microsoft.com/office/drawing/2010/main" xmlns="" w="9525">
                   <a:solidFill>
                     <a:srgbClr val="000000"/>
                   </a:solidFill>
@@ -3027,7 +3027,7 @@
             </a:ln>
             <a:extLst>
               <a:ext uri="{91240B29-F687-4f45-9708-019B960494DF}">
-                <a14:hiddenLine xmlns="" xmlns:a14="http://schemas.microsoft.com/office/drawing/2010/main" w="9525">
+                <a14:hiddenLine xmlns:a14="http://schemas.microsoft.com/office/drawing/2010/main" xmlns="" w="9525">
                   <a:solidFill>
                     <a:srgbClr val="000000"/>
                   </a:solidFill>
@@ -3089,7 +3089,7 @@
             </a:ln>
             <a:extLst>
               <a:ext uri="{91240B29-F687-4f45-9708-019B960494DF}">
-                <a14:hiddenLine xmlns="" xmlns:a14="http://schemas.microsoft.com/office/drawing/2010/main" w="9525">
+                <a14:hiddenLine xmlns:a14="http://schemas.microsoft.com/office/drawing/2010/main" xmlns="" w="9525">
                   <a:solidFill>
                     <a:srgbClr val="000000"/>
                   </a:solidFill>
@@ -3179,7 +3179,7 @@
             </a:ln>
             <a:extLst>
               <a:ext uri="{91240B29-F687-4f45-9708-019B960494DF}">
-                <a14:hiddenLine xmlns="" xmlns:a14="http://schemas.microsoft.com/office/drawing/2010/main" w="9525">
+                <a14:hiddenLine xmlns:a14="http://schemas.microsoft.com/office/drawing/2010/main" xmlns="" w="9525">
                   <a:solidFill>
                     <a:srgbClr val="000000"/>
                   </a:solidFill>
@@ -3213,7 +3213,7 @@
             </a:ln>
             <a:extLst>
               <a:ext uri="{91240B29-F687-4f45-9708-019B960494DF}">
-                <a14:hiddenLine xmlns="" xmlns:a14="http://schemas.microsoft.com/office/drawing/2010/main" w="9525">
+                <a14:hiddenLine xmlns:a14="http://schemas.microsoft.com/office/drawing/2010/main" xmlns="" w="9525">
                   <a:solidFill>
                     <a:srgbClr val="000000"/>
                   </a:solidFill>
@@ -3278,7 +3278,7 @@
             </a:ln>
             <a:extLst>
               <a:ext uri="{91240B29-F687-4f45-9708-019B960494DF}">
-                <a14:hiddenLine xmlns="" xmlns:a14="http://schemas.microsoft.com/office/drawing/2010/main" w="9525">
+                <a14:hiddenLine xmlns:a14="http://schemas.microsoft.com/office/drawing/2010/main" xmlns="" w="9525">
                   <a:solidFill>
                     <a:srgbClr val="000000"/>
                   </a:solidFill>
@@ -3368,7 +3368,7 @@
             </a:ln>
             <a:extLst>
               <a:ext uri="{91240B29-F687-4f45-9708-019B960494DF}">
-                <a14:hiddenLine xmlns="" xmlns:a14="http://schemas.microsoft.com/office/drawing/2010/main" w="9525">
+                <a14:hiddenLine xmlns:a14="http://schemas.microsoft.com/office/drawing/2010/main" xmlns="" w="9525">
                   <a:solidFill>
                     <a:srgbClr val="000000"/>
                   </a:solidFill>
@@ -3430,7 +3430,7 @@
             </a:ln>
             <a:extLst>
               <a:ext uri="{91240B29-F687-4f45-9708-019B960494DF}">
-                <a14:hiddenLine xmlns="" xmlns:a14="http://schemas.microsoft.com/office/drawing/2010/main" w="9525">
+                <a14:hiddenLine xmlns:a14="http://schemas.microsoft.com/office/drawing/2010/main" xmlns="" w="9525">
                   <a:solidFill>
                     <a:srgbClr val="000000"/>
                   </a:solidFill>
@@ -3520,7 +3520,7 @@
             </a:ln>
             <a:extLst>
               <a:ext uri="{91240B29-F687-4f45-9708-019B960494DF}">
-                <a14:hiddenLine xmlns="" xmlns:a14="http://schemas.microsoft.com/office/drawing/2010/main" w="9525">
+                <a14:hiddenLine xmlns:a14="http://schemas.microsoft.com/office/drawing/2010/main" xmlns="" w="9525">
                   <a:solidFill>
                     <a:srgbClr val="000000"/>
                   </a:solidFill>
@@ -3610,7 +3610,7 @@
             </a:ln>
             <a:extLst>
               <a:ext uri="{91240B29-F687-4f45-9708-019B960494DF}">
-                <a14:hiddenLine xmlns="" xmlns:a14="http://schemas.microsoft.com/office/drawing/2010/main" w="9525">
+                <a14:hiddenLine xmlns:a14="http://schemas.microsoft.com/office/drawing/2010/main" xmlns="" w="9525">
                   <a:solidFill>
                     <a:srgbClr val="000000"/>
                   </a:solidFill>
@@ -3675,7 +3675,7 @@
             </a:ln>
             <a:extLst>
               <a:ext uri="{91240B29-F687-4f45-9708-019B960494DF}">
-                <a14:hiddenLine xmlns="" xmlns:a14="http://schemas.microsoft.com/office/drawing/2010/main" w="9525">
+                <a14:hiddenLine xmlns:a14="http://schemas.microsoft.com/office/drawing/2010/main" xmlns="" w="9525">
                   <a:solidFill>
                     <a:srgbClr val="000000"/>
                   </a:solidFill>
@@ -3737,7 +3737,7 @@
             </a:ln>
             <a:extLst>
               <a:ext uri="{91240B29-F687-4f45-9708-019B960494DF}">
-                <a14:hiddenLine xmlns="" xmlns:a14="http://schemas.microsoft.com/office/drawing/2010/main" w="9525">
+                <a14:hiddenLine xmlns:a14="http://schemas.microsoft.com/office/drawing/2010/main" xmlns="" w="9525">
                   <a:solidFill>
                     <a:srgbClr val="000000"/>
                   </a:solidFill>
@@ -3827,7 +3827,7 @@
             </a:ln>
             <a:extLst>
               <a:ext uri="{91240B29-F687-4f45-9708-019B960494DF}">
-                <a14:hiddenLine xmlns="" xmlns:a14="http://schemas.microsoft.com/office/drawing/2010/main" w="9525">
+                <a14:hiddenLine xmlns:a14="http://schemas.microsoft.com/office/drawing/2010/main" xmlns="" w="9525">
                   <a:solidFill>
                     <a:srgbClr val="000000"/>
                   </a:solidFill>
@@ -3917,7 +3917,7 @@
             </a:ln>
             <a:extLst>
               <a:ext uri="{91240B29-F687-4f45-9708-019B960494DF}">
-                <a14:hiddenLine xmlns="" xmlns:a14="http://schemas.microsoft.com/office/drawing/2010/main" w="9525">
+                <a14:hiddenLine xmlns:a14="http://schemas.microsoft.com/office/drawing/2010/main" xmlns="" w="9525">
                   <a:solidFill>
                     <a:srgbClr val="000000"/>
                   </a:solidFill>
@@ -3979,7 +3979,7 @@
             </a:ln>
             <a:extLst>
               <a:ext uri="{91240B29-F687-4f45-9708-019B960494DF}">
-                <a14:hiddenLine xmlns="" xmlns:a14="http://schemas.microsoft.com/office/drawing/2010/main" w="9525">
+                <a14:hiddenLine xmlns:a14="http://schemas.microsoft.com/office/drawing/2010/main" xmlns="" w="9525">
                   <a:solidFill>
                     <a:srgbClr val="000000"/>
                   </a:solidFill>
@@ -4099,7 +4099,7 @@
             </a:ln>
             <a:extLst>
               <a:ext uri="{91240B29-F687-4f45-9708-019B960494DF}">
-                <a14:hiddenLine xmlns="" xmlns:a14="http://schemas.microsoft.com/office/drawing/2010/main" w="9525">
+                <a14:hiddenLine xmlns:a14="http://schemas.microsoft.com/office/drawing/2010/main" xmlns="" w="9525">
                   <a:solidFill>
                     <a:srgbClr val="000000"/>
                   </a:solidFill>
@@ -4167,7 +4167,7 @@
             </a:ln>
             <a:extLst>
               <a:ext uri="{91240B29-F687-4f45-9708-019B960494DF}">
-                <a14:hiddenLine xmlns="" xmlns:a14="http://schemas.microsoft.com/office/drawing/2010/main" w="9525">
+                <a14:hiddenLine xmlns:a14="http://schemas.microsoft.com/office/drawing/2010/main" xmlns="" w="9525">
                   <a:solidFill>
                     <a:srgbClr val="000000"/>
                   </a:solidFill>
@@ -4257,7 +4257,7 @@
             </a:ln>
             <a:extLst>
               <a:ext uri="{91240B29-F687-4f45-9708-019B960494DF}">
-                <a14:hiddenLine xmlns="" xmlns:a14="http://schemas.microsoft.com/office/drawing/2010/main" w="9525">
+                <a14:hiddenLine xmlns:a14="http://schemas.microsoft.com/office/drawing/2010/main" xmlns="" w="9525">
                   <a:solidFill>
                     <a:srgbClr val="000000"/>
                   </a:solidFill>
@@ -4397,7 +4397,7 @@
           <a:p>
             <a:fld id="{48A87A34-81AB-432B-8DAE-1953F412C126}" type="datetimeFigureOut">
               <a:rPr lang="en-US" dirty="0"/>
-              <a:t>3/8/22</a:t>
+              <a:t>3/15/22</a:t>
             </a:fld>
             <a:endParaRPr lang="en-US" dirty="0"/>
           </a:p>
@@ -4659,7 +4659,7 @@
           <a:p>
             <a:fld id="{48A87A34-81AB-432B-8DAE-1953F412C126}" type="datetimeFigureOut">
               <a:rPr lang="en-US" dirty="0"/>
-              <a:t>3/8/22</a:t>
+              <a:t>3/15/22</a:t>
             </a:fld>
             <a:endParaRPr lang="en-US" dirty="0"/>
           </a:p>
@@ -4850,7 +4850,7 @@
           <a:p>
             <a:fld id="{48A87A34-81AB-432B-8DAE-1953F412C126}" type="datetimeFigureOut">
               <a:rPr lang="en-US" dirty="0"/>
-              <a:t>3/8/22</a:t>
+              <a:t>3/15/22</a:t>
             </a:fld>
             <a:endParaRPr lang="en-US" dirty="0"/>
           </a:p>
@@ -5108,7 +5108,7 @@
           <a:p>
             <a:fld id="{48A87A34-81AB-432B-8DAE-1953F412C126}" type="datetimeFigureOut">
               <a:rPr lang="en-US" dirty="0"/>
-              <a:t>3/8/22</a:t>
+              <a:t>3/15/22</a:t>
             </a:fld>
             <a:endParaRPr lang="en-US" dirty="0"/>
           </a:p>
@@ -5537,7 +5537,7 @@
           <a:p>
             <a:fld id="{48A87A34-81AB-432B-8DAE-1953F412C126}" type="datetimeFigureOut">
               <a:rPr lang="en-US" dirty="0"/>
-              <a:t>3/8/22</a:t>
+              <a:t>3/15/22</a:t>
             </a:fld>
             <a:endParaRPr lang="en-US" dirty="0"/>
           </a:p>
@@ -6078,7 +6078,7 @@
           <a:p>
             <a:fld id="{48A87A34-81AB-432B-8DAE-1953F412C126}" type="datetimeFigureOut">
               <a:rPr lang="en-US" dirty="0"/>
-              <a:t>3/8/22</a:t>
+              <a:t>3/15/22</a:t>
             </a:fld>
             <a:endParaRPr lang="en-US" dirty="0"/>
           </a:p>
@@ -6793,7 +6793,7 @@
           <a:p>
             <a:fld id="{48A87A34-81AB-432B-8DAE-1953F412C126}" type="datetimeFigureOut">
               <a:rPr lang="en-US" dirty="0"/>
-              <a:t>3/8/22</a:t>
+              <a:t>3/15/22</a:t>
             </a:fld>
             <a:endParaRPr lang="en-US" dirty="0"/>
           </a:p>
@@ -6958,7 +6958,7 @@
           <a:p>
             <a:fld id="{48A87A34-81AB-432B-8DAE-1953F412C126}" type="datetimeFigureOut">
               <a:rPr lang="en-US" dirty="0"/>
-              <a:t>3/8/22</a:t>
+              <a:t>3/15/22</a:t>
             </a:fld>
             <a:endParaRPr lang="en-US" dirty="0"/>
           </a:p>
@@ -7133,7 +7133,7 @@
           <a:p>
             <a:fld id="{48A87A34-81AB-432B-8DAE-1953F412C126}" type="datetimeFigureOut">
               <a:rPr lang="en-US" dirty="0"/>
-              <a:t>3/8/22</a:t>
+              <a:t>3/15/22</a:t>
             </a:fld>
             <a:endParaRPr lang="en-US" dirty="0"/>
           </a:p>
@@ -7298,7 +7298,7 @@
           <a:p>
             <a:fld id="{48A87A34-81AB-432B-8DAE-1953F412C126}" type="datetimeFigureOut">
               <a:rPr lang="en-US" dirty="0"/>
-              <a:t>3/8/22</a:t>
+              <a:t>3/15/22</a:t>
             </a:fld>
             <a:endParaRPr lang="en-US" dirty="0"/>
           </a:p>
@@ -7543,7 +7543,7 @@
           <a:p>
             <a:fld id="{48A87A34-81AB-432B-8DAE-1953F412C126}" type="datetimeFigureOut">
               <a:rPr lang="en-US" dirty="0"/>
-              <a:t>3/8/22</a:t>
+              <a:t>3/15/22</a:t>
             </a:fld>
             <a:endParaRPr lang="en-US" dirty="0"/>
           </a:p>
@@ -7770,7 +7770,7 @@
           <a:p>
             <a:fld id="{48A87A34-81AB-432B-8DAE-1953F412C126}" type="datetimeFigureOut">
               <a:rPr lang="en-US" dirty="0"/>
-              <a:t>3/8/22</a:t>
+              <a:t>3/15/22</a:t>
             </a:fld>
             <a:endParaRPr lang="en-US" dirty="0"/>
           </a:p>
@@ -8146,7 +8146,7 @@
           <a:p>
             <a:fld id="{48A87A34-81AB-432B-8DAE-1953F412C126}" type="datetimeFigureOut">
               <a:rPr lang="en-US" dirty="0"/>
-              <a:t>3/8/22</a:t>
+              <a:t>3/15/22</a:t>
             </a:fld>
             <a:endParaRPr lang="en-US" dirty="0"/>
           </a:p>
@@ -8259,7 +8259,7 @@
           <a:p>
             <a:fld id="{48A87A34-81AB-432B-8DAE-1953F412C126}" type="datetimeFigureOut">
               <a:rPr lang="en-US" dirty="0"/>
-              <a:t>3/8/22</a:t>
+              <a:t>3/15/22</a:t>
             </a:fld>
             <a:endParaRPr lang="en-US" dirty="0"/>
           </a:p>
@@ -8349,7 +8349,7 @@
           <a:p>
             <a:fld id="{48A87A34-81AB-432B-8DAE-1953F412C126}" type="datetimeFigureOut">
               <a:rPr lang="en-US" dirty="0"/>
-              <a:t>3/8/22</a:t>
+              <a:t>3/15/22</a:t>
             </a:fld>
             <a:endParaRPr lang="en-US" dirty="0"/>
           </a:p>
@@ -8593,7 +8593,7 @@
           <a:p>
             <a:fld id="{48A87A34-81AB-432B-8DAE-1953F412C126}" type="datetimeFigureOut">
               <a:rPr lang="en-US" dirty="0"/>
-              <a:t>3/8/22</a:t>
+              <a:t>3/15/22</a:t>
             </a:fld>
             <a:endParaRPr lang="en-US" dirty="0"/>
           </a:p>
@@ -8868,7 +8868,7 @@
           <a:p>
             <a:fld id="{48A87A34-81AB-432B-8DAE-1953F412C126}" type="datetimeFigureOut">
               <a:rPr lang="en-US" dirty="0"/>
-              <a:t>3/8/22</a:t>
+              <a:t>3/15/22</a:t>
             </a:fld>
             <a:endParaRPr lang="en-US" dirty="0"/>
           </a:p>
@@ -8979,7 +8979,7 @@
           <a:noFill/>
           <a:extLst>
             <a:ext uri="{909E8E84-426E-40dd-AFC4-6F175D3DCCD1}">
-              <a14:hiddenFill xmlns="" xmlns:a14="http://schemas.microsoft.com/office/drawing/2010/main">
+              <a14:hiddenFill xmlns:a14="http://schemas.microsoft.com/office/drawing/2010/main" xmlns="">
                 <a:solidFill>
                   <a:srgbClr val="FFFFFF"/>
                 </a:solidFill>
@@ -9053,7 +9053,7 @@
               </a:ln>
               <a:extLst>
                 <a:ext uri="{91240B29-F687-4f45-9708-019B960494DF}">
-                  <a14:hiddenLine xmlns="" xmlns:a14="http://schemas.microsoft.com/office/drawing/2010/main" w="9525">
+                  <a14:hiddenLine xmlns:a14="http://schemas.microsoft.com/office/drawing/2010/main" xmlns="" w="9525">
                     <a:solidFill>
                       <a:srgbClr val="000000"/>
                     </a:solidFill>
@@ -9143,7 +9143,7 @@
               </a:ln>
               <a:extLst>
                 <a:ext uri="{91240B29-F687-4f45-9708-019B960494DF}">
-                  <a14:hiddenLine xmlns="" xmlns:a14="http://schemas.microsoft.com/office/drawing/2010/main" w="9525">
+                  <a14:hiddenLine xmlns:a14="http://schemas.microsoft.com/office/drawing/2010/main" xmlns="" w="9525">
                     <a:solidFill>
                       <a:srgbClr val="000000"/>
                     </a:solidFill>
@@ -9233,7 +9233,7 @@
               </a:ln>
               <a:extLst>
                 <a:ext uri="{91240B29-F687-4f45-9708-019B960494DF}">
-                  <a14:hiddenLine xmlns="" xmlns:a14="http://schemas.microsoft.com/office/drawing/2010/main" w="9525">
+                  <a14:hiddenLine xmlns:a14="http://schemas.microsoft.com/office/drawing/2010/main" xmlns="" w="9525">
                     <a:solidFill>
                       <a:srgbClr val="000000"/>
                     </a:solidFill>
@@ -9295,7 +9295,7 @@
               </a:ln>
               <a:extLst>
                 <a:ext uri="{91240B29-F687-4f45-9708-019B960494DF}">
-                  <a14:hiddenLine xmlns="" xmlns:a14="http://schemas.microsoft.com/office/drawing/2010/main" w="9525">
+                  <a14:hiddenLine xmlns:a14="http://schemas.microsoft.com/office/drawing/2010/main" xmlns="" w="9525">
                     <a:solidFill>
                       <a:srgbClr val="000000"/>
                     </a:solidFill>
@@ -9385,7 +9385,7 @@
               </a:ln>
               <a:extLst>
                 <a:ext uri="{91240B29-F687-4f45-9708-019B960494DF}">
-                  <a14:hiddenLine xmlns="" xmlns:a14="http://schemas.microsoft.com/office/drawing/2010/main" w="9525">
+                  <a14:hiddenLine xmlns:a14="http://schemas.microsoft.com/office/drawing/2010/main" xmlns="" w="9525">
                     <a:solidFill>
                       <a:srgbClr val="000000"/>
                     </a:solidFill>
@@ -9447,7 +9447,7 @@
               </a:ln>
               <a:extLst>
                 <a:ext uri="{91240B29-F687-4f45-9708-019B960494DF}">
-                  <a14:hiddenLine xmlns="" xmlns:a14="http://schemas.microsoft.com/office/drawing/2010/main" w="9525">
+                  <a14:hiddenLine xmlns:a14="http://schemas.microsoft.com/office/drawing/2010/main" xmlns="" w="9525">
                     <a:solidFill>
                       <a:srgbClr val="000000"/>
                     </a:solidFill>
@@ -9509,7 +9509,7 @@
               </a:ln>
               <a:extLst>
                 <a:ext uri="{91240B29-F687-4f45-9708-019B960494DF}">
-                  <a14:hiddenLine xmlns="" xmlns:a14="http://schemas.microsoft.com/office/drawing/2010/main" w="9525">
+                  <a14:hiddenLine xmlns:a14="http://schemas.microsoft.com/office/drawing/2010/main" xmlns="" w="9525">
                     <a:solidFill>
                       <a:srgbClr val="000000"/>
                     </a:solidFill>
@@ -9599,7 +9599,7 @@
               </a:ln>
               <a:extLst>
                 <a:ext uri="{91240B29-F687-4f45-9708-019B960494DF}">
-                  <a14:hiddenLine xmlns="" xmlns:a14="http://schemas.microsoft.com/office/drawing/2010/main" w="9525">
+                  <a14:hiddenLine xmlns:a14="http://schemas.microsoft.com/office/drawing/2010/main" xmlns="" w="9525">
                     <a:solidFill>
                       <a:srgbClr val="000000"/>
                     </a:solidFill>
@@ -9689,7 +9689,7 @@
               </a:ln>
               <a:extLst>
                 <a:ext uri="{91240B29-F687-4f45-9708-019B960494DF}">
-                  <a14:hiddenLine xmlns="" xmlns:a14="http://schemas.microsoft.com/office/drawing/2010/main" w="9525">
+                  <a14:hiddenLine xmlns:a14="http://schemas.microsoft.com/office/drawing/2010/main" xmlns="" w="9525">
                     <a:solidFill>
                       <a:srgbClr val="000000"/>
                     </a:solidFill>
@@ -9751,7 +9751,7 @@
               </a:ln>
               <a:extLst>
                 <a:ext uri="{91240B29-F687-4f45-9708-019B960494DF}">
-                  <a14:hiddenLine xmlns="" xmlns:a14="http://schemas.microsoft.com/office/drawing/2010/main" w="9525">
+                  <a14:hiddenLine xmlns:a14="http://schemas.microsoft.com/office/drawing/2010/main" xmlns="" w="9525">
                     <a:solidFill>
                       <a:srgbClr val="000000"/>
                     </a:solidFill>
@@ -9861,7 +9861,7 @@
               </a:ln>
               <a:extLst>
                 <a:ext uri="{91240B29-F687-4f45-9708-019B960494DF}">
-                  <a14:hiddenLine xmlns="" xmlns:a14="http://schemas.microsoft.com/office/drawing/2010/main" w="9525">
+                  <a14:hiddenLine xmlns:a14="http://schemas.microsoft.com/office/drawing/2010/main" xmlns="" w="9525">
                     <a:solidFill>
                       <a:srgbClr val="000000"/>
                     </a:solidFill>
@@ -9945,7 +9945,7 @@
               </a:ln>
               <a:extLst>
                 <a:ext uri="{91240B29-F687-4f45-9708-019B960494DF}">
-                  <a14:hiddenLine xmlns="" xmlns:a14="http://schemas.microsoft.com/office/drawing/2010/main" w="9525">
+                  <a14:hiddenLine xmlns:a14="http://schemas.microsoft.com/office/drawing/2010/main" xmlns="" w="9525">
                     <a:solidFill>
                       <a:srgbClr val="000000"/>
                     </a:solidFill>
@@ -10007,7 +10007,7 @@
               </a:ln>
               <a:extLst>
                 <a:ext uri="{91240B29-F687-4f45-9708-019B960494DF}">
-                  <a14:hiddenLine xmlns="" xmlns:a14="http://schemas.microsoft.com/office/drawing/2010/main" w="9525">
+                  <a14:hiddenLine xmlns:a14="http://schemas.microsoft.com/office/drawing/2010/main" xmlns="" w="9525">
                     <a:solidFill>
                       <a:srgbClr val="000000"/>
                     </a:solidFill>
@@ -10069,7 +10069,7 @@
               </a:ln>
               <a:extLst>
                 <a:ext uri="{91240B29-F687-4f45-9708-019B960494DF}">
-                  <a14:hiddenLine xmlns="" xmlns:a14="http://schemas.microsoft.com/office/drawing/2010/main" w="9525">
+                  <a14:hiddenLine xmlns:a14="http://schemas.microsoft.com/office/drawing/2010/main" xmlns="" w="9525">
                     <a:solidFill>
                       <a:srgbClr val="000000"/>
                     </a:solidFill>
@@ -10159,7 +10159,7 @@
               </a:ln>
               <a:extLst>
                 <a:ext uri="{91240B29-F687-4f45-9708-019B960494DF}">
-                  <a14:hiddenLine xmlns="" xmlns:a14="http://schemas.microsoft.com/office/drawing/2010/main" w="9525">
+                  <a14:hiddenLine xmlns:a14="http://schemas.microsoft.com/office/drawing/2010/main" xmlns="" w="9525">
                     <a:solidFill>
                       <a:srgbClr val="000000"/>
                     </a:solidFill>
@@ -10193,7 +10193,7 @@
               </a:ln>
               <a:extLst>
                 <a:ext uri="{91240B29-F687-4f45-9708-019B960494DF}">
-                  <a14:hiddenLine xmlns="" xmlns:a14="http://schemas.microsoft.com/office/drawing/2010/main" w="9525">
+                  <a14:hiddenLine xmlns:a14="http://schemas.microsoft.com/office/drawing/2010/main" xmlns="" w="9525">
                     <a:solidFill>
                       <a:srgbClr val="000000"/>
                     </a:solidFill>
@@ -10258,7 +10258,7 @@
               </a:ln>
               <a:extLst>
                 <a:ext uri="{91240B29-F687-4f45-9708-019B960494DF}">
-                  <a14:hiddenLine xmlns="" xmlns:a14="http://schemas.microsoft.com/office/drawing/2010/main" w="9525">
+                  <a14:hiddenLine xmlns:a14="http://schemas.microsoft.com/office/drawing/2010/main" xmlns="" w="9525">
                     <a:solidFill>
                       <a:srgbClr val="000000"/>
                     </a:solidFill>
@@ -10348,7 +10348,7 @@
               </a:ln>
               <a:extLst>
                 <a:ext uri="{91240B29-F687-4f45-9708-019B960494DF}">
-                  <a14:hiddenLine xmlns="" xmlns:a14="http://schemas.microsoft.com/office/drawing/2010/main" w="9525">
+                  <a14:hiddenLine xmlns:a14="http://schemas.microsoft.com/office/drawing/2010/main" xmlns="" w="9525">
                     <a:solidFill>
                       <a:srgbClr val="000000"/>
                     </a:solidFill>
@@ -10410,7 +10410,7 @@
               </a:ln>
               <a:extLst>
                 <a:ext uri="{91240B29-F687-4f45-9708-019B960494DF}">
-                  <a14:hiddenLine xmlns="" xmlns:a14="http://schemas.microsoft.com/office/drawing/2010/main" w="9525">
+                  <a14:hiddenLine xmlns:a14="http://schemas.microsoft.com/office/drawing/2010/main" xmlns="" w="9525">
                     <a:solidFill>
                       <a:srgbClr val="000000"/>
                     </a:solidFill>
@@ -10500,7 +10500,7 @@
               </a:ln>
               <a:extLst>
                 <a:ext uri="{91240B29-F687-4f45-9708-019B960494DF}">
-                  <a14:hiddenLine xmlns="" xmlns:a14="http://schemas.microsoft.com/office/drawing/2010/main" w="9525">
+                  <a14:hiddenLine xmlns:a14="http://schemas.microsoft.com/office/drawing/2010/main" xmlns="" w="9525">
                     <a:solidFill>
                       <a:srgbClr val="000000"/>
                     </a:solidFill>
@@ -10565,7 +10565,7 @@
               </a:ln>
               <a:extLst>
                 <a:ext uri="{91240B29-F687-4f45-9708-019B960494DF}">
-                  <a14:hiddenLine xmlns="" xmlns:a14="http://schemas.microsoft.com/office/drawing/2010/main" w="9525">
+                  <a14:hiddenLine xmlns:a14="http://schemas.microsoft.com/office/drawing/2010/main" xmlns="" w="9525">
                     <a:solidFill>
                       <a:srgbClr val="000000"/>
                     </a:solidFill>
@@ -10627,7 +10627,7 @@
               </a:ln>
               <a:extLst>
                 <a:ext uri="{91240B29-F687-4f45-9708-019B960494DF}">
-                  <a14:hiddenLine xmlns="" xmlns:a14="http://schemas.microsoft.com/office/drawing/2010/main" w="9525">
+                  <a14:hiddenLine xmlns:a14="http://schemas.microsoft.com/office/drawing/2010/main" xmlns="" w="9525">
                     <a:solidFill>
                       <a:srgbClr val="000000"/>
                     </a:solidFill>
@@ -10717,7 +10717,7 @@
               </a:ln>
               <a:extLst>
                 <a:ext uri="{91240B29-F687-4f45-9708-019B960494DF}">
-                  <a14:hiddenLine xmlns="" xmlns:a14="http://schemas.microsoft.com/office/drawing/2010/main" w="9525">
+                  <a14:hiddenLine xmlns:a14="http://schemas.microsoft.com/office/drawing/2010/main" xmlns="" w="9525">
                     <a:solidFill>
                       <a:srgbClr val="000000"/>
                     </a:solidFill>
@@ -10807,7 +10807,7 @@
               </a:ln>
               <a:extLst>
                 <a:ext uri="{91240B29-F687-4f45-9708-019B960494DF}">
-                  <a14:hiddenLine xmlns="" xmlns:a14="http://schemas.microsoft.com/office/drawing/2010/main" w="9525">
+                  <a14:hiddenLine xmlns:a14="http://schemas.microsoft.com/office/drawing/2010/main" xmlns="" w="9525">
                     <a:solidFill>
                       <a:srgbClr val="000000"/>
                     </a:solidFill>
@@ -10872,7 +10872,7 @@
               </a:ln>
               <a:extLst>
                 <a:ext uri="{91240B29-F687-4f45-9708-019B960494DF}">
-                  <a14:hiddenLine xmlns="" xmlns:a14="http://schemas.microsoft.com/office/drawing/2010/main" w="9525">
+                  <a14:hiddenLine xmlns:a14="http://schemas.microsoft.com/office/drawing/2010/main" xmlns="" w="9525">
                     <a:solidFill>
                       <a:srgbClr val="000000"/>
                     </a:solidFill>
@@ -10992,7 +10992,7 @@
               </a:ln>
               <a:extLst>
                 <a:ext uri="{91240B29-F687-4f45-9708-019B960494DF}">
-                  <a14:hiddenLine xmlns="" xmlns:a14="http://schemas.microsoft.com/office/drawing/2010/main" w="9525">
+                  <a14:hiddenLine xmlns:a14="http://schemas.microsoft.com/office/drawing/2010/main" xmlns="" w="9525">
                     <a:solidFill>
                       <a:srgbClr val="000000"/>
                     </a:solidFill>
@@ -11090,7 +11090,7 @@
               </a:ln>
               <a:extLst>
                 <a:ext uri="{91240B29-F687-4f45-9708-019B960494DF}">
-                  <a14:hiddenLine xmlns="" xmlns:a14="http://schemas.microsoft.com/office/drawing/2010/main" w="9525">
+                  <a14:hiddenLine xmlns:a14="http://schemas.microsoft.com/office/drawing/2010/main" xmlns="" w="9525">
                     <a:solidFill>
                       <a:srgbClr val="000000"/>
                     </a:solidFill>
@@ -11205,7 +11205,7 @@
               </a:ln>
               <a:extLst>
                 <a:ext uri="{91240B29-F687-4f45-9708-019B960494DF}">
-                  <a14:hiddenLine xmlns="" xmlns:a14="http://schemas.microsoft.com/office/drawing/2010/main" w="9525">
+                  <a14:hiddenLine xmlns:a14="http://schemas.microsoft.com/office/drawing/2010/main" xmlns="" w="9525">
                     <a:solidFill>
                       <a:srgbClr val="000000"/>
                     </a:solidFill>
@@ -11295,7 +11295,7 @@
               </a:ln>
               <a:extLst>
                 <a:ext uri="{91240B29-F687-4f45-9708-019B960494DF}">
-                  <a14:hiddenLine xmlns="" xmlns:a14="http://schemas.microsoft.com/office/drawing/2010/main" w="9525">
+                  <a14:hiddenLine xmlns:a14="http://schemas.microsoft.com/office/drawing/2010/main" xmlns="" w="9525">
                     <a:solidFill>
                       <a:srgbClr val="000000"/>
                     </a:solidFill>
@@ -11360,7 +11360,7 @@
               </a:ln>
               <a:extLst>
                 <a:ext uri="{91240B29-F687-4f45-9708-019B960494DF}">
-                  <a14:hiddenLine xmlns="" xmlns:a14="http://schemas.microsoft.com/office/drawing/2010/main" w="9525">
+                  <a14:hiddenLine xmlns:a14="http://schemas.microsoft.com/office/drawing/2010/main" xmlns="" w="9525">
                     <a:solidFill>
                       <a:srgbClr val="000000"/>
                     </a:solidFill>
@@ -11450,7 +11450,7 @@
               </a:ln>
               <a:extLst>
                 <a:ext uri="{91240B29-F687-4f45-9708-019B960494DF}">
-                  <a14:hiddenLine xmlns="" xmlns:a14="http://schemas.microsoft.com/office/drawing/2010/main" w="9525">
+                  <a14:hiddenLine xmlns:a14="http://schemas.microsoft.com/office/drawing/2010/main" xmlns="" w="9525">
                     <a:solidFill>
                       <a:srgbClr val="000000"/>
                     </a:solidFill>
@@ -11518,7 +11518,7 @@
               </a:ln>
               <a:extLst>
                 <a:ext uri="{91240B29-F687-4f45-9708-019B960494DF}">
-                  <a14:hiddenLine xmlns="" xmlns:a14="http://schemas.microsoft.com/office/drawing/2010/main" w="9525">
+                  <a14:hiddenLine xmlns:a14="http://schemas.microsoft.com/office/drawing/2010/main" xmlns="" w="9525">
                     <a:solidFill>
                       <a:srgbClr val="000000"/>
                     </a:solidFill>
@@ -11608,7 +11608,7 @@
               </a:ln>
               <a:extLst>
                 <a:ext uri="{91240B29-F687-4f45-9708-019B960494DF}">
-                  <a14:hiddenLine xmlns="" xmlns:a14="http://schemas.microsoft.com/office/drawing/2010/main" w="9525">
+                  <a14:hiddenLine xmlns:a14="http://schemas.microsoft.com/office/drawing/2010/main" xmlns="" w="9525">
                     <a:solidFill>
                       <a:srgbClr val="000000"/>
                     </a:solidFill>
@@ -11676,7 +11676,7 @@
               </a:ln>
               <a:extLst>
                 <a:ext uri="{91240B29-F687-4f45-9708-019B960494DF}">
-                  <a14:hiddenLine xmlns="" xmlns:a14="http://schemas.microsoft.com/office/drawing/2010/main" w="9525">
+                  <a14:hiddenLine xmlns:a14="http://schemas.microsoft.com/office/drawing/2010/main" xmlns="" w="9525">
                     <a:solidFill>
                       <a:srgbClr val="000000"/>
                     </a:solidFill>
@@ -11766,7 +11766,7 @@
               </a:ln>
               <a:extLst>
                 <a:ext uri="{91240B29-F687-4f45-9708-019B960494DF}">
-                  <a14:hiddenLine xmlns="" xmlns:a14="http://schemas.microsoft.com/office/drawing/2010/main" w="9525">
+                  <a14:hiddenLine xmlns:a14="http://schemas.microsoft.com/office/drawing/2010/main" xmlns="" w="9525">
                     <a:solidFill>
                       <a:srgbClr val="000000"/>
                     </a:solidFill>
@@ -11800,7 +11800,7 @@
               </a:ln>
               <a:extLst>
                 <a:ext uri="{91240B29-F687-4f45-9708-019B960494DF}">
-                  <a14:hiddenLine xmlns="" xmlns:a14="http://schemas.microsoft.com/office/drawing/2010/main" w="9525">
+                  <a14:hiddenLine xmlns:a14="http://schemas.microsoft.com/office/drawing/2010/main" xmlns="" w="9525">
                     <a:solidFill>
                       <a:srgbClr val="000000"/>
                     </a:solidFill>
@@ -11941,7 +11941,7 @@
             <a:fld id="{48A87A34-81AB-432B-8DAE-1953F412C126}" type="datetimeFigureOut">
               <a:rPr lang="en-US" dirty="0"/>
               <a:pPr/>
-              <a:t>3/8/22</a:t>
+              <a:t>3/15/22</a:t>
             </a:fld>
             <a:endParaRPr lang="en-US" dirty="0"/>
           </a:p>
@@ -14188,7 +14188,14 @@
               <a:rPr lang="en-US" dirty="0">
                 <a:latin typeface="Ford Antenna Medium" panose="02000505000000020004" pitchFamily="2" charset="0"/>
               </a:rPr>
-              <a:t>Sunset Header Field</a:t>
+              <a:t>Header Field: </a:t>
+            </a:r>
+            <a:r>
+              <a:rPr lang="en-US" dirty="0">
+                <a:latin typeface="Consolas" panose="020B0609020204030204" pitchFamily="49" charset="0"/>
+                <a:cs typeface="Consolas" panose="020B0609020204030204" pitchFamily="49" charset="0"/>
+              </a:rPr>
+              <a:t>Sunset</a:t>
             </a:r>
           </a:p>
           <a:p>
@@ -14196,7 +14203,14 @@
               <a:rPr lang="en-US" dirty="0">
                 <a:latin typeface="Ford Antenna Medium" panose="02000505000000020004" pitchFamily="2" charset="0"/>
               </a:rPr>
-              <a:t>Sunset Link Relation</a:t>
+              <a:t>Link Relation: </a:t>
+            </a:r>
+            <a:r>
+              <a:rPr lang="en-US" dirty="0">
+                <a:latin typeface="Consolas" panose="020B0609020204030204" pitchFamily="49" charset="0"/>
+                <a:cs typeface="Consolas" panose="020B0609020204030204" pitchFamily="49" charset="0"/>
+              </a:rPr>
+              <a:t>Sunset</a:t>
             </a:r>
           </a:p>
         </p:txBody>
@@ -14311,7 +14325,7 @@
               <a:rPr lang="en-US" sz="2800" cap="none" dirty="0">
                 <a:latin typeface="Ford Antenna Medium Cnd" panose="02000505000000020004" pitchFamily="2" charset="0"/>
               </a:rPr>
-              <a:t>Building Block Overview</a:t>
+              <a:t>Web Concepts:</a:t>
             </a:r>
           </a:p>
         </p:txBody>

</xml_diff>